<commit_message>
Fix presentation and the quality graphs
</commit_message>
<xml_diff>
--- a/presentazione/presentazione.pptx
+++ b/presentazione/presentazione.pptx
@@ -5,7 +5,7 @@
     <p:sldMasterId id="2147483739" r:id="rId1"/>
   </p:sldMasterIdLst>
   <p:notesMasterIdLst>
-    <p:notesMasterId r:id="rId14"/>
+    <p:notesMasterId r:id="rId15"/>
   </p:notesMasterIdLst>
   <p:sldIdLst>
     <p:sldId id="256" r:id="rId2"/>
@@ -19,7 +19,8 @@
     <p:sldId id="263" r:id="rId10"/>
     <p:sldId id="264" r:id="rId11"/>
     <p:sldId id="260" r:id="rId12"/>
-    <p:sldId id="267" r:id="rId13"/>
+    <p:sldId id="268" r:id="rId13"/>
+    <p:sldId id="267" r:id="rId14"/>
   </p:sldIdLst>
   <p:sldSz cx="12192000" cy="6858000"/>
   <p:notesSz cx="6858000" cy="9144000"/>
@@ -134,6 +135,7 @@
             <p14:sldId id="263"/>
             <p14:sldId id="264"/>
             <p14:sldId id="260"/>
+            <p14:sldId id="268"/>
             <p14:sldId id="267"/>
           </p14:sldIdLst>
         </p14:section>
@@ -6961,7 +6963,7 @@
           <a:p>
             <a:fld id="{5030D8C6-8935-5E47-AB3F-62EA49D23738}" type="datetimeFigureOut">
               <a:rPr lang="it-IT" smtClean="0"/>
-              <a:t>13/06/2020</a:t>
+              <a:t>14/06/20</a:t>
             </a:fld>
             <a:endParaRPr lang="it-IT"/>
           </a:p>
@@ -7382,9 +7384,9 @@
           <a:bodyPr/>
           <a:lstStyle/>
           <a:p>
-            <a:fld id="{364DE4F0-2CBE-CF41-B6F8-AC5F0FFDC7CF}" type="datetime1">
+            <a:fld id="{5927EEF2-1028-B14B-8880-BF80AABFFD88}" type="datetime1">
               <a:rPr lang="it-IT" smtClean="0"/>
-              <a:t>13/06/2020</a:t>
+              <a:t>14/06/20</a:t>
             </a:fld>
             <a:endParaRPr lang="en-US" dirty="0"/>
           </a:p>
@@ -7412,9 +7414,10 @@
           <a:lstStyle/>
           <a:p>
             <a:r>
-              <a:rPr lang="en-US" dirty="0"/>
-              <a:t>Gabriele Celeri, Federico Luzzi, Marco Peracchi, Christian Uccheddu </a:t>
+              <a:rPr lang="en-US"/>
+              <a:t>YouTube ai tempi del Covid-19</a:t>
             </a:r>
+            <a:endParaRPr lang="en-US" dirty="0"/>
           </a:p>
         </p:txBody>
       </p:sp>
@@ -7755,9 +7758,9 @@
           <a:bodyPr/>
           <a:lstStyle/>
           <a:p>
-            <a:fld id="{C10757F6-B467-6B4A-B1A2-38DAC6411899}" type="datetime1">
+            <a:fld id="{ADD2F0E7-99DD-7248-B3AF-B22FE1EEB9A3}" type="datetime1">
               <a:rPr lang="it-IT" smtClean="0"/>
-              <a:t>13/06/2020</a:t>
+              <a:t>14/06/20</a:t>
             </a:fld>
             <a:endParaRPr lang="en-US"/>
           </a:p>
@@ -7785,9 +7788,10 @@
           <a:lstStyle/>
           <a:p>
             <a:r>
-              <a:rPr lang="en-US" dirty="0"/>
-              <a:t>Gabriele Celeri, Federico Luzzi, Marco Peracchi, Christian Uccheddu </a:t>
+              <a:rPr lang="en-US"/>
+              <a:t>YouTube ai tempi del Covid-19</a:t>
             </a:r>
+            <a:endParaRPr lang="en-US" dirty="0"/>
           </a:p>
         </p:txBody>
       </p:sp>
@@ -7967,9 +7971,9 @@
           <a:bodyPr/>
           <a:lstStyle/>
           <a:p>
-            <a:fld id="{AD73CC98-FF54-A743-9211-4C1331ABF042}" type="datetime1">
+            <a:fld id="{3A6E445A-5A43-BE4E-8F7D-463728FB0AE3}" type="datetime1">
               <a:rPr lang="it-IT" smtClean="0"/>
-              <a:t>13/06/2020</a:t>
+              <a:t>14/06/20</a:t>
             </a:fld>
             <a:endParaRPr lang="en-US"/>
           </a:p>
@@ -7997,9 +8001,10 @@
           <a:lstStyle/>
           <a:p>
             <a:r>
-              <a:rPr lang="en-US" dirty="0"/>
-              <a:t>Gabriele Celeri, Federico Luzzi, Marco Peracchi, Christian Uccheddu </a:t>
+              <a:rPr lang="en-US"/>
+              <a:t>YouTube ai tempi del Covid-19</a:t>
             </a:r>
+            <a:endParaRPr lang="en-US" dirty="0"/>
           </a:p>
         </p:txBody>
       </p:sp>
@@ -8440,9 +8445,9 @@
           <a:bodyPr/>
           <a:lstStyle/>
           <a:p>
-            <a:fld id="{5681DCB8-0D76-8145-B631-EE4B51C430EA}" type="datetime1">
+            <a:fld id="{CF66A625-8208-F44C-B62F-756814EDEBC2}" type="datetime1">
               <a:rPr lang="it-IT" smtClean="0"/>
-              <a:t>13/06/2020</a:t>
+              <a:t>14/06/20</a:t>
             </a:fld>
             <a:endParaRPr lang="en-US"/>
           </a:p>
@@ -8470,9 +8475,10 @@
           <a:lstStyle/>
           <a:p>
             <a:r>
-              <a:rPr lang="en-US" dirty="0"/>
-              <a:t>Gabriele Celeri, Federico Luzzi, Marco Peracchi, Christian Uccheddu </a:t>
+              <a:rPr lang="en-US"/>
+              <a:t>YouTube ai tempi del Covid-19</a:t>
             </a:r>
+            <a:endParaRPr lang="en-US" dirty="0"/>
           </a:p>
         </p:txBody>
       </p:sp>
@@ -8897,9 +8903,9 @@
           <a:bodyPr/>
           <a:lstStyle/>
           <a:p>
-            <a:fld id="{A3CC6F53-352D-8D4D-BC84-8408EDB0800A}" type="datetime1">
+            <a:fld id="{23D1705C-4E0B-4F4E-BF63-BA798587F4D7}" type="datetime1">
               <a:rPr lang="it-IT" smtClean="0"/>
-              <a:t>13/06/2020</a:t>
+              <a:t>14/06/20</a:t>
             </a:fld>
             <a:endParaRPr lang="en-US"/>
           </a:p>
@@ -8927,9 +8933,10 @@
           <a:lstStyle/>
           <a:p>
             <a:r>
-              <a:rPr lang="en-US" dirty="0"/>
-              <a:t>Gabriele Celeri, Federico Luzzi, Marco Peracchi, Christian Uccheddu </a:t>
+              <a:rPr lang="en-US"/>
+              <a:t>YouTube ai tempi del Covid-19</a:t>
             </a:r>
+            <a:endParaRPr lang="en-US" dirty="0"/>
           </a:p>
         </p:txBody>
       </p:sp>
@@ -9432,9 +9439,9 @@
           <a:bodyPr/>
           <a:lstStyle/>
           <a:p>
-            <a:fld id="{79D4AAF2-4C8B-BF41-9FBF-85464E660409}" type="datetime1">
+            <a:fld id="{B4541556-65D6-E34D-AE1E-5A50024DA286}" type="datetime1">
               <a:rPr lang="it-IT" smtClean="0"/>
-              <a:t>13/06/2020</a:t>
+              <a:t>14/06/20</a:t>
             </a:fld>
             <a:endParaRPr lang="en-US"/>
           </a:p>
@@ -9462,9 +9469,10 @@
           <a:lstStyle/>
           <a:p>
             <a:r>
-              <a:rPr lang="en-US" dirty="0"/>
-              <a:t>Gabriele Celeri, Federico Luzzi, Marco Peracchi, Christian Uccheddu </a:t>
+              <a:rPr lang="en-US"/>
+              <a:t>YouTube ai tempi del Covid-19</a:t>
             </a:r>
+            <a:endParaRPr lang="en-US" dirty="0"/>
           </a:p>
         </p:txBody>
       </p:sp>
@@ -10134,9 +10142,9 @@
           <a:bodyPr/>
           <a:lstStyle/>
           <a:p>
-            <a:fld id="{E2C4C7C1-4EA5-7749-AB1B-4C06E0B9A8E0}" type="datetime1">
+            <a:fld id="{10E37808-EBF4-024B-8551-FAEF55DCED40}" type="datetime1">
               <a:rPr lang="it-IT" smtClean="0"/>
-              <a:t>13/06/2020</a:t>
+              <a:t>14/06/20</a:t>
             </a:fld>
             <a:endParaRPr lang="en-US"/>
           </a:p>
@@ -10164,9 +10172,10 @@
           <a:lstStyle/>
           <a:p>
             <a:r>
-              <a:rPr lang="en-US" dirty="0"/>
-              <a:t>Gabriele Celeri, Federico Luzzi, Marco Peracchi, Christian Uccheddu </a:t>
+              <a:rPr lang="en-US"/>
+              <a:t>YouTube ai tempi del Covid-19</a:t>
             </a:r>
+            <a:endParaRPr lang="en-US" dirty="0"/>
           </a:p>
         </p:txBody>
       </p:sp>
@@ -10466,9 +10475,9 @@
           <a:bodyPr/>
           <a:lstStyle/>
           <a:p>
-            <a:fld id="{3650E2AE-ED4D-A644-BA76-EBD0D561A6D5}" type="datetime1">
+            <a:fld id="{7518B78B-0BD1-2647-B2B6-B165EA2248D3}" type="datetime1">
               <a:rPr lang="it-IT" smtClean="0"/>
-              <a:t>13/06/2020</a:t>
+              <a:t>14/06/20</a:t>
             </a:fld>
             <a:endParaRPr lang="en-US"/>
           </a:p>
@@ -10496,9 +10505,10 @@
           <a:lstStyle/>
           <a:p>
             <a:r>
-              <a:rPr lang="en-US" dirty="0"/>
-              <a:t>Gabriele Celeri, Federico Luzzi, Marco Peracchi, Christian Uccheddu </a:t>
+              <a:rPr lang="en-US"/>
+              <a:t>YouTube ai tempi del Covid-19</a:t>
             </a:r>
+            <a:endParaRPr lang="en-US" dirty="0"/>
           </a:p>
         </p:txBody>
       </p:sp>
@@ -10582,9 +10592,9 @@
           <a:bodyPr/>
           <a:lstStyle/>
           <a:p>
-            <a:fld id="{AAF4AF0E-EE69-2645-AFF8-BC96E84FFA04}" type="datetime1">
+            <a:fld id="{E390B5C8-FF7F-A946-973B-6F279F61853F}" type="datetime1">
               <a:rPr lang="it-IT" smtClean="0"/>
-              <a:t>13/06/2020</a:t>
+              <a:t>14/06/20</a:t>
             </a:fld>
             <a:endParaRPr lang="en-US"/>
           </a:p>
@@ -10612,9 +10622,10 @@
           <a:lstStyle/>
           <a:p>
             <a:r>
-              <a:rPr lang="en-US" dirty="0"/>
-              <a:t>Gabriele Celeri, Federico Luzzi, Marco Peracchi, Christian Uccheddu </a:t>
+              <a:rPr lang="en-US"/>
+              <a:t>YouTube ai tempi del Covid-19</a:t>
             </a:r>
+            <a:endParaRPr lang="en-US" dirty="0"/>
           </a:p>
         </p:txBody>
       </p:sp>
@@ -11080,9 +11091,9 @@
           <a:bodyPr/>
           <a:lstStyle/>
           <a:p>
-            <a:fld id="{E5374CEA-FF22-134D-B622-51C59AEA9083}" type="datetime1">
+            <a:fld id="{694A84A1-2BCC-134B-A487-D400AFE4DC7A}" type="datetime1">
               <a:rPr lang="it-IT" smtClean="0"/>
-              <a:t>13/06/2020</a:t>
+              <a:t>14/06/20</a:t>
             </a:fld>
             <a:endParaRPr lang="en-US" dirty="0"/>
           </a:p>
@@ -11110,9 +11121,10 @@
           <a:lstStyle/>
           <a:p>
             <a:r>
-              <a:rPr lang="en-US" dirty="0"/>
-              <a:t>Gabriele Celeri, Federico Luzzi, Marco Peracchi, Christian Uccheddu </a:t>
+              <a:rPr lang="en-US"/>
+              <a:t>YouTube ai tempi del Covid-19</a:t>
             </a:r>
+            <a:endParaRPr lang="en-US" dirty="0"/>
           </a:p>
         </p:txBody>
       </p:sp>
@@ -11560,9 +11572,9 @@
           <a:bodyPr/>
           <a:lstStyle/>
           <a:p>
-            <a:fld id="{BCF7E7B4-2A73-1C4F-8E3D-BE954D6EE862}" type="datetime1">
+            <a:fld id="{4771BB6F-DA11-6548-A837-D909066AA708}" type="datetime1">
               <a:rPr lang="it-IT" smtClean="0"/>
-              <a:t>13/06/2020</a:t>
+              <a:t>14/06/20</a:t>
             </a:fld>
             <a:endParaRPr lang="en-US"/>
           </a:p>
@@ -11590,9 +11602,10 @@
           <a:lstStyle/>
           <a:p>
             <a:r>
-              <a:rPr lang="en-US" dirty="0"/>
-              <a:t>Gabriele Celeri, Federico Luzzi, Marco Peracchi, Christian Uccheddu </a:t>
+              <a:rPr lang="en-US"/>
+              <a:t>YouTube ai tempi del Covid-19</a:t>
             </a:r>
+            <a:endParaRPr lang="en-US" dirty="0"/>
           </a:p>
         </p:txBody>
       </p:sp>
@@ -11806,9 +11819,9 @@
             </a:lvl1pPr>
           </a:lstStyle>
           <a:p>
-            <a:fld id="{445E8948-03FD-9446-B7B9-967E0F03ACF2}" type="datetime1">
+            <a:fld id="{F37B283B-76FB-0647-A01F-CF48E4565E8B}" type="datetime1">
               <a:rPr lang="it-IT" smtClean="0"/>
-              <a:t>13/06/2020</a:t>
+              <a:t>14/06/20</a:t>
             </a:fld>
             <a:endParaRPr lang="en-US"/>
           </a:p>
@@ -11854,9 +11867,10 @@
           </a:lstStyle>
           <a:p>
             <a:r>
-              <a:rPr lang="en-US" dirty="0"/>
-              <a:t>Gabriele Celeri, Federico Luzzi, Marco Peracchi, Christian Uccheddu </a:t>
+              <a:rPr lang="en-US"/>
+              <a:t>YouTube ai tempi del Covid-19</a:t>
             </a:r>
+            <a:endParaRPr lang="en-US" dirty="0"/>
           </a:p>
         </p:txBody>
       </p:sp>
@@ -12677,10 +12691,10 @@
       </p:sp>
       <p:sp>
         <p:nvSpPr>
-          <p:cNvPr id="5" name="Segnaposto piè di pagina 4">
+          <p:cNvPr id="7" name="Segnaposto piè di pagina 6">
             <a:extLst>
               <a:ext uri="{FF2B5EF4-FFF2-40B4-BE49-F238E27FC236}">
-                <a16:creationId xmlns:a16="http://schemas.microsoft.com/office/drawing/2014/main" id="{AC64F236-471D-FA46-8A52-9D74767F8BF6}"/>
+                <a16:creationId xmlns:a16="http://schemas.microsoft.com/office/drawing/2014/main" id="{6552B47E-368B-2C44-BD6B-63FD1F753EC3}"/>
               </a:ext>
             </a:extLst>
           </p:cNvPr>
@@ -12698,37 +12712,8 @@
           <a:p>
             <a:r>
               <a:rPr lang="en-US"/>
-              <a:t>Gabriele Celeri, Federico Luzzi, Marco Peracchi, Christian Uccheddu </a:t>
+              <a:t>Gabriele Celeri, Federico Luzzi, Marco Peracchi, Christian Uccheddu</a:t>
             </a:r>
-            <a:endParaRPr lang="en-US" dirty="0"/>
-          </a:p>
-        </p:txBody>
-      </p:sp>
-      <p:sp>
-        <p:nvSpPr>
-          <p:cNvPr id="6" name="Segnaposto numero diapositiva 5">
-            <a:extLst>
-              <a:ext uri="{FF2B5EF4-FFF2-40B4-BE49-F238E27FC236}">
-                <a16:creationId xmlns:a16="http://schemas.microsoft.com/office/drawing/2014/main" id="{3A7B4450-351F-8744-9748-A2A5CD5DE342}"/>
-              </a:ext>
-            </a:extLst>
-          </p:cNvPr>
-          <p:cNvSpPr>
-            <a:spLocks noGrp="1"/>
-          </p:cNvSpPr>
-          <p:nvPr>
-            <p:ph type="sldNum" sz="quarter" idx="12"/>
-          </p:nvPr>
-        </p:nvSpPr>
-        <p:spPr/>
-        <p:txBody>
-          <a:bodyPr/>
-          <a:lstStyle/>
-          <a:p>
-            <a:fld id="{B2DC25EE-239B-4C5F-AAD1-255A7D5F1EE2}" type="slidenum">
-              <a:rPr lang="en-US" smtClean="0"/>
-              <a:t>1</a:t>
-            </a:fld>
             <a:endParaRPr lang="en-US" dirty="0"/>
           </a:p>
         </p:txBody>
@@ -12809,7 +12794,12 @@
             <p:ph idx="1"/>
           </p:nvPr>
         </p:nvSpPr>
-        <p:spPr/>
+        <p:spPr>
+          <a:xfrm>
+            <a:off x="1115568" y="2478024"/>
+            <a:ext cx="4980432" cy="3694176"/>
+          </a:xfrm>
+        </p:spPr>
         <p:txBody>
           <a:bodyPr/>
           <a:lstStyle/>
@@ -12828,14 +12818,26 @@
           <a:p>
             <a:r>
               <a:rPr lang="it-IT" dirty="0"/>
-              <a:t>Timestamp</a:t>
+              <a:t>Like</a:t>
             </a:r>
           </a:p>
           <a:p>
             <a:r>
               <a:rPr lang="it-IT" dirty="0"/>
-              <a:t>Category Name</a:t>
+              <a:t>Dislike</a:t>
             </a:r>
+          </a:p>
+          <a:p>
+            <a:r>
+              <a:rPr lang="it-IT" dirty="0"/>
+              <a:t>Comment Count</a:t>
+            </a:r>
+          </a:p>
+          <a:p>
+            <a:endParaRPr lang="it-IT" dirty="0"/>
+          </a:p>
+          <a:p>
+            <a:endParaRPr lang="it-IT" dirty="0"/>
           </a:p>
           <a:p>
             <a:endParaRPr lang="it-IT" dirty="0"/>
@@ -12870,10 +12872,9 @@
           <a:lstStyle/>
           <a:p>
             <a:r>
-              <a:rPr lang="en-US"/>
-              <a:t>Gabriele Celeri, Federico Luzzi, Marco Peracchi, Christian Uccheddu </a:t>
+              <a:rPr lang="en-US" dirty="0"/>
+              <a:t>YouTube ai tempi del Covid-19</a:t>
             </a:r>
-            <a:endParaRPr lang="en-US" dirty="0"/>
           </a:p>
         </p:txBody>
       </p:sp>
@@ -12903,6 +12904,247 @@
               <a:t>10</a:t>
             </a:fld>
             <a:endParaRPr lang="en-US"/>
+          </a:p>
+        </p:txBody>
+      </p:sp>
+      <p:sp>
+        <p:nvSpPr>
+          <p:cNvPr id="6" name="Segnaposto contenuto 2">
+            <a:extLst>
+              <a:ext uri="{FF2B5EF4-FFF2-40B4-BE49-F238E27FC236}">
+                <a16:creationId xmlns:a16="http://schemas.microsoft.com/office/drawing/2014/main" id="{CB75E52B-ED72-3149-9BC3-4AA19AA10EE3}"/>
+              </a:ext>
+            </a:extLst>
+          </p:cNvPr>
+          <p:cNvSpPr txBox="1">
+            <a:spLocks/>
+          </p:cNvSpPr>
+          <p:nvPr/>
+        </p:nvSpPr>
+        <p:spPr>
+          <a:xfrm>
+            <a:off x="6199632" y="2478024"/>
+            <a:ext cx="4980432" cy="3694176"/>
+          </a:xfrm>
+          <a:prstGeom prst="rect">
+            <a:avLst/>
+          </a:prstGeom>
+        </p:spPr>
+        <p:txBody>
+          <a:bodyPr vert="horz" lIns="91440" tIns="45720" rIns="91440" bIns="45720" rtlCol="0">
+            <a:normAutofit/>
+          </a:bodyPr>
+          <a:lstStyle>
+            <a:lvl1pPr marL="228600" indent="-228600" algn="l" defTabSz="914400" rtl="0" eaLnBrk="1" latinLnBrk="0" hangingPunct="1">
+              <a:lnSpc>
+                <a:spcPct val="110000"/>
+              </a:lnSpc>
+              <a:spcBef>
+                <a:spcPts val="1000"/>
+              </a:spcBef>
+              <a:buFont typeface="Arial" panose="020B0604020202020204" pitchFamily="34" charset="0"/>
+              <a:buChar char="•"/>
+              <a:defRPr sz="2800" kern="1200">
+                <a:solidFill>
+                  <a:schemeClr val="tx1"/>
+                </a:solidFill>
+                <a:latin typeface="+mn-lt"/>
+                <a:ea typeface="+mn-ea"/>
+                <a:cs typeface="+mn-cs"/>
+              </a:defRPr>
+            </a:lvl1pPr>
+            <a:lvl2pPr marL="685800" indent="-228600" algn="l" defTabSz="914400" rtl="0" eaLnBrk="1" latinLnBrk="0" hangingPunct="1">
+              <a:lnSpc>
+                <a:spcPct val="110000"/>
+              </a:lnSpc>
+              <a:spcBef>
+                <a:spcPts val="500"/>
+              </a:spcBef>
+              <a:buFont typeface="Arial" panose="020B0604020202020204" pitchFamily="34" charset="0"/>
+              <a:buChar char="•"/>
+              <a:defRPr sz="2400" kern="1200">
+                <a:solidFill>
+                  <a:schemeClr val="tx1"/>
+                </a:solidFill>
+                <a:latin typeface="+mn-lt"/>
+                <a:ea typeface="+mn-ea"/>
+                <a:cs typeface="+mn-cs"/>
+              </a:defRPr>
+            </a:lvl2pPr>
+            <a:lvl3pPr marL="1143000" indent="-228600" algn="l" defTabSz="914400" rtl="0" eaLnBrk="1" latinLnBrk="0" hangingPunct="1">
+              <a:lnSpc>
+                <a:spcPct val="110000"/>
+              </a:lnSpc>
+              <a:spcBef>
+                <a:spcPts val="500"/>
+              </a:spcBef>
+              <a:buFont typeface="Arial" panose="020B0604020202020204" pitchFamily="34" charset="0"/>
+              <a:buChar char="•"/>
+              <a:defRPr sz="2000" kern="1200">
+                <a:solidFill>
+                  <a:schemeClr val="tx1"/>
+                </a:solidFill>
+                <a:latin typeface="+mn-lt"/>
+                <a:ea typeface="+mn-ea"/>
+                <a:cs typeface="+mn-cs"/>
+              </a:defRPr>
+            </a:lvl3pPr>
+            <a:lvl4pPr marL="1600200" indent="-228600" algn="l" defTabSz="914400" rtl="0" eaLnBrk="1" latinLnBrk="0" hangingPunct="1">
+              <a:lnSpc>
+                <a:spcPct val="110000"/>
+              </a:lnSpc>
+              <a:spcBef>
+                <a:spcPts val="500"/>
+              </a:spcBef>
+              <a:buFont typeface="Arial" panose="020B0604020202020204" pitchFamily="34" charset="0"/>
+              <a:buChar char="•"/>
+              <a:defRPr sz="1800" kern="1200">
+                <a:solidFill>
+                  <a:schemeClr val="tx1"/>
+                </a:solidFill>
+                <a:latin typeface="+mn-lt"/>
+                <a:ea typeface="+mn-ea"/>
+                <a:cs typeface="+mn-cs"/>
+              </a:defRPr>
+            </a:lvl4pPr>
+            <a:lvl5pPr marL="2057400" indent="-228600" algn="l" defTabSz="914400" rtl="0" eaLnBrk="1" latinLnBrk="0" hangingPunct="1">
+              <a:lnSpc>
+                <a:spcPct val="110000"/>
+              </a:lnSpc>
+              <a:spcBef>
+                <a:spcPts val="500"/>
+              </a:spcBef>
+              <a:buFont typeface="Arial" panose="020B0604020202020204" pitchFamily="34" charset="0"/>
+              <a:buChar char="•"/>
+              <a:defRPr sz="1800" kern="1200">
+                <a:solidFill>
+                  <a:schemeClr val="tx1"/>
+                </a:solidFill>
+                <a:latin typeface="+mn-lt"/>
+                <a:ea typeface="+mn-ea"/>
+                <a:cs typeface="+mn-cs"/>
+              </a:defRPr>
+            </a:lvl5pPr>
+            <a:lvl6pPr marL="2514600" indent="-228600" algn="l" defTabSz="914400" rtl="0" eaLnBrk="1" latinLnBrk="0" hangingPunct="1">
+              <a:lnSpc>
+                <a:spcPct val="90000"/>
+              </a:lnSpc>
+              <a:spcBef>
+                <a:spcPts val="500"/>
+              </a:spcBef>
+              <a:buFont typeface="Arial" panose="020B0604020202020204" pitchFamily="34" charset="0"/>
+              <a:buChar char="•"/>
+              <a:defRPr sz="1800" kern="1200">
+                <a:solidFill>
+                  <a:schemeClr val="tx1"/>
+                </a:solidFill>
+                <a:latin typeface="+mn-lt"/>
+                <a:ea typeface="+mn-ea"/>
+                <a:cs typeface="+mn-cs"/>
+              </a:defRPr>
+            </a:lvl6pPr>
+            <a:lvl7pPr marL="2971800" indent="-228600" algn="l" defTabSz="914400" rtl="0" eaLnBrk="1" latinLnBrk="0" hangingPunct="1">
+              <a:lnSpc>
+                <a:spcPct val="90000"/>
+              </a:lnSpc>
+              <a:spcBef>
+                <a:spcPts val="500"/>
+              </a:spcBef>
+              <a:buFont typeface="Arial" panose="020B0604020202020204" pitchFamily="34" charset="0"/>
+              <a:buChar char="•"/>
+              <a:defRPr sz="1800" kern="1200">
+                <a:solidFill>
+                  <a:schemeClr val="tx1"/>
+                </a:solidFill>
+                <a:latin typeface="+mn-lt"/>
+                <a:ea typeface="+mn-ea"/>
+                <a:cs typeface="+mn-cs"/>
+              </a:defRPr>
+            </a:lvl7pPr>
+            <a:lvl8pPr marL="3429000" indent="-228600" algn="l" defTabSz="914400" rtl="0" eaLnBrk="1" latinLnBrk="0" hangingPunct="1">
+              <a:lnSpc>
+                <a:spcPct val="90000"/>
+              </a:lnSpc>
+              <a:spcBef>
+                <a:spcPts val="500"/>
+              </a:spcBef>
+              <a:buFont typeface="Arial" panose="020B0604020202020204" pitchFamily="34" charset="0"/>
+              <a:buChar char="•"/>
+              <a:defRPr sz="1800" kern="1200">
+                <a:solidFill>
+                  <a:schemeClr val="tx1"/>
+                </a:solidFill>
+                <a:latin typeface="+mn-lt"/>
+                <a:ea typeface="+mn-ea"/>
+                <a:cs typeface="+mn-cs"/>
+              </a:defRPr>
+            </a:lvl8pPr>
+            <a:lvl9pPr marL="3886200" indent="-228600" algn="l" defTabSz="914400" rtl="0" eaLnBrk="1" latinLnBrk="0" hangingPunct="1">
+              <a:lnSpc>
+                <a:spcPct val="90000"/>
+              </a:lnSpc>
+              <a:spcBef>
+                <a:spcPts val="500"/>
+              </a:spcBef>
+              <a:buFont typeface="Arial" panose="020B0604020202020204" pitchFamily="34" charset="0"/>
+              <a:buChar char="•"/>
+              <a:defRPr sz="1800" kern="1200">
+                <a:solidFill>
+                  <a:schemeClr val="tx1"/>
+                </a:solidFill>
+                <a:latin typeface="+mn-lt"/>
+                <a:ea typeface="+mn-ea"/>
+                <a:cs typeface="+mn-cs"/>
+              </a:defRPr>
+            </a:lvl9pPr>
+          </a:lstStyle>
+          <a:p>
+            <a:r>
+              <a:rPr lang="it-IT" dirty="0"/>
+              <a:t>Category Name</a:t>
+            </a:r>
+          </a:p>
+          <a:p>
+            <a:r>
+              <a:rPr lang="it-IT" dirty="0"/>
+              <a:t>Channel Title</a:t>
+            </a:r>
+          </a:p>
+          <a:p>
+            <a:r>
+              <a:rPr lang="it-IT" dirty="0"/>
+              <a:t>Country Name</a:t>
+            </a:r>
+          </a:p>
+          <a:p>
+            <a:r>
+              <a:rPr lang="it-IT" dirty="0"/>
+              <a:t>Covid Title</a:t>
+            </a:r>
+          </a:p>
+          <a:p>
+            <a:r>
+              <a:rPr lang="it-IT" dirty="0"/>
+              <a:t>New Cases</a:t>
+            </a:r>
+          </a:p>
+          <a:p>
+            <a:pPr marL="0" indent="0">
+              <a:buNone/>
+            </a:pPr>
+            <a:endParaRPr lang="it-IT" dirty="0"/>
+          </a:p>
+          <a:p>
+            <a:endParaRPr lang="it-IT" dirty="0"/>
+          </a:p>
+          <a:p>
+            <a:endParaRPr lang="it-IT" dirty="0"/>
+          </a:p>
+          <a:p>
+            <a:endParaRPr lang="it-IT" dirty="0"/>
+          </a:p>
+          <a:p>
+            <a:endParaRPr lang="it-IT" dirty="0"/>
           </a:p>
         </p:txBody>
       </p:sp>
@@ -13006,35 +13248,6 @@
           </a:p>
         </p:txBody>
       </p:sp>
-      <p:pic>
-        <p:nvPicPr>
-          <p:cNvPr id="9" name="Segnaposto contenuto 8" descr="Immagine che contiene screenshot&#10;&#10;Descrizione generata automaticamente">
-            <a:extLst>
-              <a:ext uri="{FF2B5EF4-FFF2-40B4-BE49-F238E27FC236}">
-                <a16:creationId xmlns:a16="http://schemas.microsoft.com/office/drawing/2014/main" id="{AE1819A8-B4CD-444F-97ED-9408711E862F}"/>
-              </a:ext>
-            </a:extLst>
-          </p:cNvPr>
-          <p:cNvPicPr>
-            <a:picLocks noGrp="1" noChangeAspect="1"/>
-          </p:cNvPicPr>
-          <p:nvPr>
-            <p:ph sz="half" idx="2"/>
-          </p:nvPr>
-        </p:nvPicPr>
-        <p:blipFill>
-          <a:blip r:embed="rId2"/>
-          <a:stretch>
-            <a:fillRect/>
-          </a:stretch>
-        </p:blipFill>
-        <p:spPr>
-          <a:xfrm>
-            <a:off x="1551713" y="3203575"/>
-            <a:ext cx="4350323" cy="2968625"/>
-          </a:xfrm>
-        </p:spPr>
-      </p:pic>
       <p:sp>
         <p:nvSpPr>
           <p:cNvPr id="5" name="Segnaposto testo 4">
@@ -13063,35 +13276,6 @@
           </a:p>
         </p:txBody>
       </p:sp>
-      <p:pic>
-        <p:nvPicPr>
-          <p:cNvPr id="11" name="Segnaposto contenuto 10" descr="Immagine che contiene screenshot&#10;&#10;Descrizione generata automaticamente">
-            <a:extLst>
-              <a:ext uri="{FF2B5EF4-FFF2-40B4-BE49-F238E27FC236}">
-                <a16:creationId xmlns:a16="http://schemas.microsoft.com/office/drawing/2014/main" id="{BA61819A-0AAC-1847-89BE-EA4BB9613B4F}"/>
-              </a:ext>
-            </a:extLst>
-          </p:cNvPr>
-          <p:cNvPicPr>
-            <a:picLocks noGrp="1" noChangeAspect="1"/>
-          </p:cNvPicPr>
-          <p:nvPr>
-            <p:ph sz="quarter" idx="4"/>
-          </p:nvPr>
-        </p:nvPicPr>
-        <p:blipFill>
-          <a:blip r:embed="rId3"/>
-          <a:stretch>
-            <a:fillRect/>
-          </a:stretch>
-        </p:blipFill>
-        <p:spPr>
-          <a:xfrm>
-            <a:off x="7032656" y="3203575"/>
-            <a:ext cx="3488882" cy="2968625"/>
-          </a:xfrm>
-        </p:spPr>
-      </p:pic>
       <p:sp>
         <p:nvSpPr>
           <p:cNvPr id="7" name="Segnaposto piè di pagina 6">
@@ -13114,10 +13298,9 @@
           <a:lstStyle/>
           <a:p>
             <a:r>
-              <a:rPr lang="en-US"/>
-              <a:t>Gabriele Celeri, Federico Luzzi, Marco Peracchi, Christian Uccheddu </a:t>
+              <a:rPr lang="en-US" dirty="0"/>
+              <a:t>YouTube ai tempi del Covid-19</a:t>
             </a:r>
-            <a:endParaRPr lang="en-US" dirty="0"/>
           </a:p>
         </p:txBody>
       </p:sp>
@@ -13150,6 +13333,64 @@
           </a:p>
         </p:txBody>
       </p:sp>
+      <p:pic>
+        <p:nvPicPr>
+          <p:cNvPr id="10" name="Segnaposto contenuto 9" descr="Immagine che contiene screenshot&#10;&#10;Descrizione generata automaticamente">
+            <a:extLst>
+              <a:ext uri="{FF2B5EF4-FFF2-40B4-BE49-F238E27FC236}">
+                <a16:creationId xmlns:a16="http://schemas.microsoft.com/office/drawing/2014/main" id="{9F450600-97A4-7241-A23A-AD8CDDDFF107}"/>
+              </a:ext>
+            </a:extLst>
+          </p:cNvPr>
+          <p:cNvPicPr>
+            <a:picLocks noGrp="1" noChangeAspect="1"/>
+          </p:cNvPicPr>
+          <p:nvPr>
+            <p:ph sz="quarter" idx="4"/>
+          </p:nvPr>
+        </p:nvPicPr>
+        <p:blipFill>
+          <a:blip r:embed="rId2"/>
+          <a:stretch>
+            <a:fillRect/>
+          </a:stretch>
+        </p:blipFill>
+        <p:spPr>
+          <a:xfrm>
+            <a:off x="6345238" y="3232477"/>
+            <a:ext cx="4938712" cy="2910821"/>
+          </a:xfrm>
+        </p:spPr>
+      </p:pic>
+      <p:pic>
+        <p:nvPicPr>
+          <p:cNvPr id="16" name="Segnaposto contenuto 15" descr="Immagine che contiene screenshot&#10;&#10;Descrizione generata automaticamente">
+            <a:extLst>
+              <a:ext uri="{FF2B5EF4-FFF2-40B4-BE49-F238E27FC236}">
+                <a16:creationId xmlns:a16="http://schemas.microsoft.com/office/drawing/2014/main" id="{3B179A3D-829A-4F41-9ABF-1F2D45C19815}"/>
+              </a:ext>
+            </a:extLst>
+          </p:cNvPr>
+          <p:cNvPicPr>
+            <a:picLocks noGrp="1" noChangeAspect="1"/>
+          </p:cNvPicPr>
+          <p:nvPr>
+            <p:ph sz="half" idx="2"/>
+          </p:nvPr>
+        </p:nvPicPr>
+        <p:blipFill>
+          <a:blip r:embed="rId3"/>
+          <a:stretch>
+            <a:fillRect/>
+          </a:stretch>
+        </p:blipFill>
+        <p:spPr>
+          <a:xfrm>
+            <a:off x="1542664" y="3203575"/>
+            <a:ext cx="4083822" cy="2968625"/>
+          </a:xfrm>
+        </p:spPr>
+      </p:pic>
     </p:spTree>
     <p:extLst>
       <p:ext uri="{BB962C8B-B14F-4D97-AF65-F5344CB8AC3E}">
@@ -13197,6 +13438,247 @@
           <p:cNvPr id="2" name="Titolo 1">
             <a:extLst>
               <a:ext uri="{FF2B5EF4-FFF2-40B4-BE49-F238E27FC236}">
+                <a16:creationId xmlns:a16="http://schemas.microsoft.com/office/drawing/2014/main" id="{8665D680-B550-2843-9927-09322E453DA3}"/>
+              </a:ext>
+            </a:extLst>
+          </p:cNvPr>
+          <p:cNvSpPr>
+            <a:spLocks noGrp="1"/>
+          </p:cNvSpPr>
+          <p:nvPr>
+            <p:ph type="title"/>
+          </p:nvPr>
+        </p:nvSpPr>
+        <p:spPr/>
+        <p:txBody>
+          <a:bodyPr/>
+          <a:lstStyle/>
+          <a:p>
+            <a:r>
+              <a:rPr lang="it-IT" dirty="0"/>
+              <a:t>Questionari sulla qualità</a:t>
+            </a:r>
+          </a:p>
+        </p:txBody>
+      </p:sp>
+      <p:sp>
+        <p:nvSpPr>
+          <p:cNvPr id="3" name="Segnaposto testo 2">
+            <a:extLst>
+              <a:ext uri="{FF2B5EF4-FFF2-40B4-BE49-F238E27FC236}">
+                <a16:creationId xmlns:a16="http://schemas.microsoft.com/office/drawing/2014/main" id="{AB56D3B5-C106-2740-ACCB-31900F74C1A4}"/>
+              </a:ext>
+            </a:extLst>
+          </p:cNvPr>
+          <p:cNvSpPr>
+            <a:spLocks noGrp="1"/>
+          </p:cNvSpPr>
+          <p:nvPr>
+            <p:ph type="body" idx="1"/>
+          </p:nvPr>
+        </p:nvSpPr>
+        <p:spPr/>
+        <p:txBody>
+          <a:bodyPr/>
+          <a:lstStyle/>
+          <a:p>
+            <a:r>
+              <a:rPr lang="it-IT" dirty="0"/>
+              <a:t>Prima infografica</a:t>
+            </a:r>
+          </a:p>
+        </p:txBody>
+      </p:sp>
+      <p:pic>
+        <p:nvPicPr>
+          <p:cNvPr id="10" name="Segnaposto contenuto 9">
+            <a:extLst>
+              <a:ext uri="{FF2B5EF4-FFF2-40B4-BE49-F238E27FC236}">
+                <a16:creationId xmlns:a16="http://schemas.microsoft.com/office/drawing/2014/main" id="{F89147F9-FBC1-864C-9EAE-831FCDE047E7}"/>
+              </a:ext>
+            </a:extLst>
+          </p:cNvPr>
+          <p:cNvPicPr>
+            <a:picLocks noGrp="1" noChangeAspect="1"/>
+          </p:cNvPicPr>
+          <p:nvPr>
+            <p:ph sz="half" idx="2"/>
+          </p:nvPr>
+        </p:nvPicPr>
+        <p:blipFill>
+          <a:blip r:embed="rId2"/>
+          <a:srcRect/>
+          <a:stretch/>
+        </p:blipFill>
+        <p:spPr>
+          <a:xfrm>
+            <a:off x="1115568" y="3203575"/>
+            <a:ext cx="4937760" cy="2968625"/>
+          </a:xfrm>
+        </p:spPr>
+      </p:pic>
+      <p:sp>
+        <p:nvSpPr>
+          <p:cNvPr id="5" name="Segnaposto testo 4">
+            <a:extLst>
+              <a:ext uri="{FF2B5EF4-FFF2-40B4-BE49-F238E27FC236}">
+                <a16:creationId xmlns:a16="http://schemas.microsoft.com/office/drawing/2014/main" id="{080C4274-9A0C-AC4B-BCD0-7EFFFF6150FF}"/>
+              </a:ext>
+            </a:extLst>
+          </p:cNvPr>
+          <p:cNvSpPr>
+            <a:spLocks noGrp="1"/>
+          </p:cNvSpPr>
+          <p:nvPr>
+            <p:ph type="body" sz="quarter" idx="3"/>
+          </p:nvPr>
+        </p:nvSpPr>
+        <p:spPr/>
+        <p:txBody>
+          <a:bodyPr/>
+          <a:lstStyle/>
+          <a:p>
+            <a:r>
+              <a:rPr lang="it-IT"/>
+              <a:t>Seconda infografica</a:t>
+            </a:r>
+          </a:p>
+        </p:txBody>
+      </p:sp>
+      <p:pic>
+        <p:nvPicPr>
+          <p:cNvPr id="12" name="Segnaposto contenuto 11" descr="Immagine che contiene volando, orologio, aria&#10;&#10;Descrizione generata automaticamente">
+            <a:extLst>
+              <a:ext uri="{FF2B5EF4-FFF2-40B4-BE49-F238E27FC236}">
+                <a16:creationId xmlns:a16="http://schemas.microsoft.com/office/drawing/2014/main" id="{B5ABC8BF-EB89-4B41-88A6-2E1C6E2DBA6B}"/>
+              </a:ext>
+            </a:extLst>
+          </p:cNvPr>
+          <p:cNvPicPr>
+            <a:picLocks noGrp="1" noChangeAspect="1"/>
+          </p:cNvPicPr>
+          <p:nvPr>
+            <p:ph sz="quarter" idx="4"/>
+          </p:nvPr>
+        </p:nvPicPr>
+        <p:blipFill>
+          <a:blip r:embed="rId3"/>
+          <a:stretch>
+            <a:fillRect/>
+          </a:stretch>
+        </p:blipFill>
+        <p:spPr>
+          <a:xfrm>
+            <a:off x="6378657" y="3203575"/>
+            <a:ext cx="4871874" cy="2968625"/>
+          </a:xfrm>
+        </p:spPr>
+      </p:pic>
+      <p:sp>
+        <p:nvSpPr>
+          <p:cNvPr id="7" name="Segnaposto piè di pagina 6">
+            <a:extLst>
+              <a:ext uri="{FF2B5EF4-FFF2-40B4-BE49-F238E27FC236}">
+                <a16:creationId xmlns:a16="http://schemas.microsoft.com/office/drawing/2014/main" id="{D125F69E-A13A-7A45-A053-F7CADB141395}"/>
+              </a:ext>
+            </a:extLst>
+          </p:cNvPr>
+          <p:cNvSpPr>
+            <a:spLocks noGrp="1"/>
+          </p:cNvSpPr>
+          <p:nvPr>
+            <p:ph type="ftr" sz="quarter" idx="11"/>
+          </p:nvPr>
+        </p:nvSpPr>
+        <p:spPr/>
+        <p:txBody>
+          <a:bodyPr/>
+          <a:lstStyle/>
+          <a:p>
+            <a:r>
+              <a:rPr lang="en-US"/>
+              <a:t>YouTube ai tempi del Covid-19</a:t>
+            </a:r>
+            <a:endParaRPr lang="en-US" dirty="0"/>
+          </a:p>
+        </p:txBody>
+      </p:sp>
+      <p:sp>
+        <p:nvSpPr>
+          <p:cNvPr id="8" name="Segnaposto numero diapositiva 7">
+            <a:extLst>
+              <a:ext uri="{FF2B5EF4-FFF2-40B4-BE49-F238E27FC236}">
+                <a16:creationId xmlns:a16="http://schemas.microsoft.com/office/drawing/2014/main" id="{FCD11205-BE8D-1840-AC00-8306B5E11269}"/>
+              </a:ext>
+            </a:extLst>
+          </p:cNvPr>
+          <p:cNvSpPr>
+            <a:spLocks noGrp="1"/>
+          </p:cNvSpPr>
+          <p:nvPr>
+            <p:ph type="sldNum" sz="quarter" idx="12"/>
+          </p:nvPr>
+        </p:nvSpPr>
+        <p:spPr/>
+        <p:txBody>
+          <a:bodyPr/>
+          <a:lstStyle/>
+          <a:p>
+            <a:fld id="{B2DC25EE-239B-4C5F-AAD1-255A7D5F1EE2}" type="slidenum">
+              <a:rPr lang="en-US" smtClean="0"/>
+              <a:t>12</a:t>
+            </a:fld>
+            <a:endParaRPr lang="en-US"/>
+          </a:p>
+        </p:txBody>
+      </p:sp>
+    </p:spTree>
+    <p:extLst>
+      <p:ext uri="{BB962C8B-B14F-4D97-AF65-F5344CB8AC3E}">
+        <p14:creationId xmlns:p14="http://schemas.microsoft.com/office/powerpoint/2010/main" val="1193279826"/>
+      </p:ext>
+    </p:extLst>
+  </p:cSld>
+  <p:clrMapOvr>
+    <a:masterClrMapping/>
+  </p:clrMapOvr>
+  <mc:AlternateContent xmlns:mc="http://schemas.openxmlformats.org/markup-compatibility/2006">
+    <mc:Choice xmlns:p14="http://schemas.microsoft.com/office/powerpoint/2010/main" Requires="p14">
+      <p:transition spd="med" p14:dur="700">
+        <p:fade/>
+      </p:transition>
+    </mc:Choice>
+    <mc:Fallback>
+      <p:transition spd="med">
+        <p:fade/>
+      </p:transition>
+    </mc:Fallback>
+  </mc:AlternateContent>
+</p:sld>
+</file>
+
+<file path=ppt/slides/slide13.xml><?xml version="1.0" encoding="utf-8"?>
+<p:sld xmlns:a="http://schemas.openxmlformats.org/drawingml/2006/main" xmlns:r="http://schemas.openxmlformats.org/officeDocument/2006/relationships" xmlns:p="http://schemas.openxmlformats.org/presentationml/2006/main">
+  <p:cSld>
+    <p:spTree>
+      <p:nvGrpSpPr>
+        <p:cNvPr id="1" name=""/>
+        <p:cNvGrpSpPr/>
+        <p:nvPr/>
+      </p:nvGrpSpPr>
+      <p:grpSpPr>
+        <a:xfrm>
+          <a:off x="0" y="0"/>
+          <a:ext cx="0" cy="0"/>
+          <a:chOff x="0" y="0"/>
+          <a:chExt cx="0" cy="0"/>
+        </a:xfrm>
+      </p:grpSpPr>
+      <p:sp>
+        <p:nvSpPr>
+          <p:cNvPr id="2" name="Titolo 1">
+            <a:extLst>
+              <a:ext uri="{FF2B5EF4-FFF2-40B4-BE49-F238E27FC236}">
                 <a16:creationId xmlns:a16="http://schemas.microsoft.com/office/drawing/2014/main" id="{5D5A6BF5-C9B1-134E-8E0F-A0C6B7FBD28D}"/>
               </a:ext>
             </a:extLst>
@@ -13339,15 +13821,7 @@
           <a:p>
             <a:r>
               <a:rPr lang="it-IT" dirty="0"/>
-              <a:t>Dipendenza tra il numero di video </a:t>
-            </a:r>
-            <a:r>
-              <a:rPr lang="it-IT" dirty="0" err="1"/>
-              <a:t>Covid</a:t>
-            </a:r>
-            <a:r>
-              <a:rPr lang="it-IT" dirty="0"/>
-              <a:t> e l'incremento nei contagi.</a:t>
+              <a:t>Dipendenza tra il numero di video Covid-19 e l'incremento nei contagi.</a:t>
             </a:r>
           </a:p>
           <a:p>
@@ -13381,31 +13855,7 @@
           <a:p>
             <a:r>
               <a:rPr lang="en-US" dirty="0"/>
-              <a:t>Gabriele </a:t>
-            </a:r>
-            <a:r>
-              <a:rPr lang="en-US" dirty="0" err="1"/>
-              <a:t>Celeri</a:t>
-            </a:r>
-            <a:r>
-              <a:rPr lang="en-US" dirty="0"/>
-              <a:t>, Federico Luzzi, Marco </a:t>
-            </a:r>
-            <a:r>
-              <a:rPr lang="en-US" dirty="0" err="1"/>
-              <a:t>Peracchi</a:t>
-            </a:r>
-            <a:r>
-              <a:rPr lang="en-US" dirty="0"/>
-              <a:t>, Christian </a:t>
-            </a:r>
-            <a:r>
-              <a:rPr lang="en-US" dirty="0" err="1"/>
-              <a:t>Uccheddu</a:t>
-            </a:r>
-            <a:r>
-              <a:rPr lang="en-US" dirty="0"/>
-              <a:t> </a:t>
+              <a:t>YouTube ai tempi del Covid-19</a:t>
             </a:r>
           </a:p>
         </p:txBody>
@@ -13433,7 +13883,7 @@
           <a:p>
             <a:fld id="{B2DC25EE-239B-4C5F-AAD1-255A7D5F1EE2}" type="slidenum">
               <a:rPr lang="en-US" dirty="0" smtClean="0"/>
-              <a:t>12</a:t>
+              <a:t>13</a:t>
             </a:fld>
             <a:endParaRPr lang="en-US" dirty="0"/>
           </a:p>
@@ -13894,102 +14344,6 @@
       </p:sp>
       <p:sp>
         <p:nvSpPr>
-          <p:cNvPr id="4" name="Segnaposto piè di pagina 3">
-            <a:extLst>
-              <a:ext uri="{FF2B5EF4-FFF2-40B4-BE49-F238E27FC236}">
-                <a16:creationId xmlns:a16="http://schemas.microsoft.com/office/drawing/2014/main" id="{D994DCFE-5FB1-674A-B4C5-D070FD18D273}"/>
-              </a:ext>
-            </a:extLst>
-          </p:cNvPr>
-          <p:cNvSpPr>
-            <a:spLocks noGrp="1"/>
-          </p:cNvSpPr>
-          <p:nvPr>
-            <p:ph type="ftr" sz="quarter" idx="11"/>
-          </p:nvPr>
-        </p:nvSpPr>
-        <p:spPr>
-          <a:xfrm>
-            <a:off x="4038600" y="6356350"/>
-            <a:ext cx="4114800" cy="365125"/>
-          </a:xfrm>
-        </p:spPr>
-        <p:txBody>
-          <a:bodyPr>
-            <a:normAutofit lnSpcReduction="10000"/>
-          </a:bodyPr>
-          <a:lstStyle/>
-          <a:p>
-            <a:pPr>
-              <a:lnSpc>
-                <a:spcPct val="90000"/>
-              </a:lnSpc>
-              <a:spcAft>
-                <a:spcPts val="600"/>
-              </a:spcAft>
-            </a:pPr>
-            <a:r>
-              <a:rPr lang="en-US" sz="1000" dirty="0"/>
-              <a:t>Gabriele </a:t>
-            </a:r>
-            <a:r>
-              <a:rPr lang="en-US" sz="1000" dirty="0" err="1"/>
-              <a:t>Celeri</a:t>
-            </a:r>
-            <a:r>
-              <a:rPr lang="en-US" sz="1000" dirty="0"/>
-              <a:t>, Federico Luzzi, Marco </a:t>
-            </a:r>
-            <a:r>
-              <a:rPr lang="en-US" sz="1000" dirty="0" err="1"/>
-              <a:t>Peracchi</a:t>
-            </a:r>
-            <a:r>
-              <a:rPr lang="en-US" sz="1000" dirty="0"/>
-              <a:t>, Christian </a:t>
-            </a:r>
-            <a:r>
-              <a:rPr lang="en-US" sz="1000" dirty="0" err="1"/>
-              <a:t>Uccheddu</a:t>
-            </a:r>
-            <a:r>
-              <a:rPr lang="en-US" sz="1000" dirty="0"/>
-              <a:t> </a:t>
-            </a:r>
-          </a:p>
-        </p:txBody>
-      </p:sp>
-      <p:sp>
-        <p:nvSpPr>
-          <p:cNvPr id="6" name="Segnaposto numero diapositiva 5">
-            <a:extLst>
-              <a:ext uri="{FF2B5EF4-FFF2-40B4-BE49-F238E27FC236}">
-                <a16:creationId xmlns:a16="http://schemas.microsoft.com/office/drawing/2014/main" id="{864441BA-5D87-4F4E-91C8-08298B574B81}"/>
-              </a:ext>
-            </a:extLst>
-          </p:cNvPr>
-          <p:cNvSpPr>
-            <a:spLocks noGrp="1"/>
-          </p:cNvSpPr>
-          <p:nvPr>
-            <p:ph type="sldNum" sz="quarter" idx="12"/>
-          </p:nvPr>
-        </p:nvSpPr>
-        <p:spPr/>
-        <p:txBody>
-          <a:bodyPr/>
-          <a:lstStyle/>
-          <a:p>
-            <a:fld id="{B2DC25EE-239B-4C5F-AAD1-255A7D5F1EE2}" type="slidenum">
-              <a:rPr lang="en-US" smtClean="0"/>
-              <a:t>2</a:t>
-            </a:fld>
-            <a:endParaRPr lang="en-US" dirty="0"/>
-          </a:p>
-        </p:txBody>
-      </p:sp>
-      <p:sp>
-        <p:nvSpPr>
           <p:cNvPr id="5" name="CasellaDiTesto 4">
             <a:extLst>
               <a:ext uri="{FF2B5EF4-FFF2-40B4-BE49-F238E27FC236}">
@@ -14183,6 +14537,35 @@
               </a:rPr>
               <a:t>2.</a:t>
             </a:r>
+          </a:p>
+        </p:txBody>
+      </p:sp>
+      <p:sp>
+        <p:nvSpPr>
+          <p:cNvPr id="3" name="Segnaposto piè di pagina 2">
+            <a:extLst>
+              <a:ext uri="{FF2B5EF4-FFF2-40B4-BE49-F238E27FC236}">
+                <a16:creationId xmlns:a16="http://schemas.microsoft.com/office/drawing/2014/main" id="{9B4579A9-27FA-AC45-A3A0-216C696B4FD4}"/>
+              </a:ext>
+            </a:extLst>
+          </p:cNvPr>
+          <p:cNvSpPr>
+            <a:spLocks noGrp="1"/>
+          </p:cNvSpPr>
+          <p:nvPr>
+            <p:ph type="ftr" sz="quarter" idx="11"/>
+          </p:nvPr>
+        </p:nvSpPr>
+        <p:spPr/>
+        <p:txBody>
+          <a:bodyPr/>
+          <a:lstStyle/>
+          <a:p>
+            <a:r>
+              <a:rPr lang="en-US"/>
+              <a:t>YouTube ai tempi del Covid-19</a:t>
+            </a:r>
+            <a:endParaRPr lang="en-US" dirty="0"/>
           </a:p>
         </p:txBody>
       </p:sp>
@@ -14433,7 +14816,7 @@
           <a:p>
             <a:r>
               <a:rPr lang="en-US" dirty="0"/>
-              <a:t>Gabriele Celeri, Federico Luzzi, Marco Peracchi, Christian Uccheddu </a:t>
+              <a:t>YouTube ai tempi del Covid-19</a:t>
             </a:r>
           </a:p>
         </p:txBody>
@@ -14901,7 +15284,7 @@
         </p:spPr>
         <p:txBody>
           <a:bodyPr>
-            <a:normAutofit lnSpcReduction="10000"/>
+            <a:normAutofit/>
           </a:bodyPr>
           <a:lstStyle/>
           <a:p>
@@ -14914,7 +15297,7 @@
               </a:spcAft>
             </a:pPr>
             <a:r>
-              <a:rPr lang="en-US" sz="1000">
+              <a:rPr lang="en-US" dirty="0">
                 <a:solidFill>
                   <a:schemeClr val="tx2">
                     <a:lumMod val="50000"/>
@@ -14922,7 +15305,7 @@
                   </a:schemeClr>
                 </a:solidFill>
               </a:rPr>
-              <a:t>Gabriele Celeri, Federico Luzzi, Marco Peracchi, Christian Uccheddu </a:t>
+              <a:t>YouTube ai tempi del Covid-19</a:t>
             </a:r>
           </a:p>
         </p:txBody>
@@ -15470,15 +15853,7 @@
             </a:r>
             <a:r>
               <a:rPr lang="it-IT" sz="2000" dirty="0"/>
-              <a:t>, dati suddivisi su tre </a:t>
-            </a:r>
-            <a:r>
-              <a:rPr lang="it-IT" sz="2000" dirty="0" err="1"/>
-              <a:t>shard</a:t>
-            </a:r>
-            <a:r>
-              <a:rPr lang="it-IT" sz="2000" dirty="0"/>
-              <a:t>.</a:t>
+              <a:t>, dati suddivisi su tre shard.</a:t>
             </a:r>
           </a:p>
           <a:p>
@@ -15533,7 +15908,7 @@
               </a:spcAft>
             </a:pPr>
             <a:r>
-              <a:rPr lang="en-US" sz="900">
+              <a:rPr lang="en-US" dirty="0">
                 <a:solidFill>
                   <a:schemeClr val="tx2">
                     <a:lumMod val="50000"/>
@@ -15541,7 +15916,7 @@
                   </a:schemeClr>
                 </a:solidFill>
               </a:rPr>
-              <a:t>Gabriele Celeri, Federico Luzzi, Marco Peracchi, Christian Uccheddu </a:t>
+              <a:t>YouTube ai tempi del Covid-19</a:t>
             </a:r>
           </a:p>
         </p:txBody>
@@ -15711,7 +16086,7 @@
           <a:bodyPr/>
           <a:lstStyle/>
           <a:p>
-            <a:endParaRPr lang="it-IT"/>
+            <a:endParaRPr lang="it-IT" dirty="0"/>
           </a:p>
         </p:txBody>
       </p:sp>
@@ -15737,10 +16112,9 @@
           <a:lstStyle/>
           <a:p>
             <a:r>
-              <a:rPr lang="en-US"/>
-              <a:t>Gabriele Celeri, Federico Luzzi, Marco Peracchi, Christian Uccheddu </a:t>
+              <a:rPr lang="en-US" dirty="0"/>
+              <a:t>YouTube ai tempi del Covid-19</a:t>
             </a:r>
-            <a:endParaRPr lang="en-US" dirty="0"/>
           </a:p>
         </p:txBody>
       </p:sp>
@@ -15769,7 +16143,7 @@
               <a:rPr lang="en-US" smtClean="0"/>
               <a:t>6</a:t>
             </a:fld>
-            <a:endParaRPr lang="en-US"/>
+            <a:endParaRPr lang="en-US" dirty="0"/>
           </a:p>
         </p:txBody>
       </p:sp>
@@ -16525,15 +16899,8 @@
               </a:spcAft>
             </a:pPr>
             <a:r>
-              <a:rPr lang="en-US" sz="900" kern="1200">
-                <a:solidFill>
-                  <a:schemeClr val="bg1"/>
-                </a:solidFill>
-                <a:latin typeface="+mn-lt"/>
-                <a:ea typeface="+mn-ea"/>
-                <a:cs typeface="+mn-cs"/>
-              </a:rPr>
-              <a:t>Gabriele Celeri, Federico Luzzi, Marco Peracchi, Christian Uccheddu </a:t>
+              <a:rPr lang="en-US" dirty="0"/>
+              <a:t>YouTube ai tempi del Covid-19</a:t>
             </a:r>
           </a:p>
         </p:txBody>
@@ -16572,11 +16939,7 @@
               </a:spcAft>
             </a:pPr>
             <a:fld id="{B2DC25EE-239B-4C5F-AAD1-255A7D5F1EE2}" type="slidenum">
-              <a:rPr lang="en-US">
-                <a:solidFill>
-                  <a:schemeClr val="bg1"/>
-                </a:solidFill>
-              </a:rPr>
+              <a:rPr lang="en-US" smtClean="0"/>
               <a:pPr>
                 <a:spcAft>
                   <a:spcPts val="600"/>
@@ -16584,11 +16947,7 @@
               </a:pPr>
               <a:t>7</a:t>
             </a:fld>
-            <a:endParaRPr lang="en-US">
-              <a:solidFill>
-                <a:schemeClr val="bg1"/>
-              </a:solidFill>
-            </a:endParaRPr>
+            <a:endParaRPr lang="en-US" dirty="0"/>
           </a:p>
         </p:txBody>
       </p:sp>
@@ -16675,12 +17034,8 @@
               </a:spcAft>
             </a:pPr>
             <a:r>
-              <a:rPr lang="it-IT" sz="2000" dirty="0" err="1"/>
-              <a:t>Timestamp</a:t>
-            </a:r>
-            <a:r>
               <a:rPr lang="it-IT" sz="2000" dirty="0"/>
-              <a:t> Video </a:t>
+              <a:t>Timestamp Video </a:t>
             </a:r>
           </a:p>
         </p:txBody>
@@ -16763,16 +17118,8 @@
           <a:lstStyle/>
           <a:p>
             <a:r>
-              <a:rPr lang="it-IT" sz="2000" dirty="0" err="1"/>
-              <a:t>Timestamp</a:t>
-            </a:r>
-            <a:r>
               <a:rPr lang="it-IT" sz="2000" dirty="0"/>
-              <a:t> </a:t>
-            </a:r>
-            <a:r>
-              <a:rPr lang="it-IT" sz="2000" dirty="0" err="1"/>
-              <a:t>Covid</a:t>
+              <a:t>Timestamp Covid-19</a:t>
             </a:r>
           </a:p>
         </p:txBody>
@@ -16876,7 +17223,7 @@
         <p:spPr>
           <a:xfrm>
             <a:off x="9006157" y="4980495"/>
-            <a:ext cx="1521125" cy="369332"/>
+            <a:ext cx="1869056" cy="369332"/>
           </a:xfrm>
           <a:prstGeom prst="rect">
             <a:avLst/>
@@ -16894,11 +17241,7 @@
           <a:p>
             <a:r>
               <a:rPr lang="it-IT" dirty="0"/>
-              <a:t>Paese </a:t>
-            </a:r>
-            <a:r>
-              <a:rPr lang="it-IT" dirty="0" err="1"/>
-              <a:t>Covid</a:t>
+              <a:t>Paese Covid-19</a:t>
             </a:r>
           </a:p>
         </p:txBody>
@@ -17273,7 +17616,7 @@
               </a:spcAft>
             </a:pPr>
             <a:r>
-              <a:rPr lang="en-US" sz="900">
+              <a:rPr lang="en-US" dirty="0">
                 <a:solidFill>
                   <a:schemeClr val="tx2">
                     <a:lumMod val="50000"/>
@@ -17281,7 +17624,7 @@
                   </a:schemeClr>
                 </a:solidFill>
               </a:rPr>
-              <a:t>Gabriele Celeri, Federico Luzzi, Marco Peracchi, Christian Uccheddu </a:t>
+              <a:t>YouTube ai tempi del Covid-19</a:t>
             </a:r>
           </a:p>
         </p:txBody>
@@ -17846,8 +18189,8 @@
               </a:spcAft>
             </a:pPr>
             <a:r>
-              <a:rPr lang="en-US" sz="900"/>
-              <a:t>Gabriele Celeri, Federico Luzzi, Marco Peracchi, Christian Uccheddu </a:t>
+              <a:rPr lang="en-US" dirty="0"/>
+              <a:t>YouTube ai tempi del Covid-19</a:t>
             </a:r>
           </a:p>
         </p:txBody>

</xml_diff>

<commit_message>
Now the presentation is correct
</commit_message>
<xml_diff>
--- a/presentazione/presentazione.pptx
+++ b/presentazione/presentazione.pptx
@@ -5,7 +5,7 @@
     <p:sldMasterId id="2147483739" r:id="rId1"/>
   </p:sldMasterIdLst>
   <p:notesMasterIdLst>
-    <p:notesMasterId r:id="rId16"/>
+    <p:notesMasterId r:id="rId17"/>
   </p:notesMasterIdLst>
   <p:sldIdLst>
     <p:sldId id="256" r:id="rId2"/>
@@ -21,7 +21,8 @@
     <p:sldId id="260" r:id="rId12"/>
     <p:sldId id="268" r:id="rId13"/>
     <p:sldId id="269" r:id="rId14"/>
-    <p:sldId id="267" r:id="rId15"/>
+    <p:sldId id="270" r:id="rId15"/>
+    <p:sldId id="267" r:id="rId16"/>
   </p:sldIdLst>
   <p:sldSz cx="12192000" cy="6858000"/>
   <p:notesSz cx="6858000" cy="9144000"/>
@@ -138,6 +139,7 @@
             <p14:sldId id="260"/>
             <p14:sldId id="268"/>
             <p14:sldId id="269"/>
+            <p14:sldId id="270"/>
             <p14:sldId id="267"/>
           </p14:sldIdLst>
         </p14:section>
@@ -13631,7 +13633,7 @@
       </p:grpSpPr>
       <p:sp>
         <p:nvSpPr>
-          <p:cNvPr id="12" name="Rectangle 11">
+          <p:cNvPr id="38" name="Rectangle 24">
             <a:extLst>
               <a:ext uri="{FF2B5EF4-FFF2-40B4-BE49-F238E27FC236}">
                 <a16:creationId xmlns:a16="http://schemas.microsoft.com/office/drawing/2014/main" id="{8D06CE56-3881-4ADA-8CEF-D18B02C242A3}"/>
@@ -13723,7 +13725,7 @@
       </p:sp>
       <p:sp>
         <p:nvSpPr>
-          <p:cNvPr id="14" name="Rectangle 13">
+          <p:cNvPr id="39" name="Rectangle 26">
             <a:extLst>
               <a:ext uri="{FF2B5EF4-FFF2-40B4-BE49-F238E27FC236}">
                 <a16:creationId xmlns:a16="http://schemas.microsoft.com/office/drawing/2014/main" id="{79F3C543-62EC-4433-9C93-A2CD8764E9B4}"/>
@@ -13819,10 +13821,10 @@
       </p:sp>
       <p:sp useBgFill="1">
         <p:nvSpPr>
-          <p:cNvPr id="16" name="Rectangle 15">
+          <p:cNvPr id="40" name="Rectangle 28">
             <a:extLst>
               <a:ext uri="{FF2B5EF4-FFF2-40B4-BE49-F238E27FC236}">
-                <a16:creationId xmlns:a16="http://schemas.microsoft.com/office/drawing/2014/main" id="{68AF5748-FED8-45BA-8631-26D1D10F3246}"/>
+                <a16:creationId xmlns:a16="http://schemas.microsoft.com/office/drawing/2014/main" id="{5DCB5928-DC7D-4612-9922-441966E15627}"/>
               </a:ext>
               <a:ext uri="{C183D7F6-B498-43B3-948B-1728B52AA6E4}">
                 <adec:decorative xmlns:adec="http://schemas.microsoft.com/office/drawing/2017/decorative" val="1"/>
@@ -13877,6 +13879,344 @@
           </a:p>
         </p:txBody>
       </p:sp>
+      <p:sp useBgFill="1">
+        <p:nvSpPr>
+          <p:cNvPr id="41" name="Freeform: Shape 30">
+            <a:extLst>
+              <a:ext uri="{FF2B5EF4-FFF2-40B4-BE49-F238E27FC236}">
+                <a16:creationId xmlns:a16="http://schemas.microsoft.com/office/drawing/2014/main" id="{682C1161-1736-45EC-99B7-33F3CAE9D517}"/>
+              </a:ext>
+              <a:ext uri="{C183D7F6-B498-43B3-948B-1728B52AA6E4}">
+                <adec:decorative xmlns:adec="http://schemas.microsoft.com/office/drawing/2017/decorative" val="1"/>
+              </a:ext>
+            </a:extLst>
+          </p:cNvPr>
+          <p:cNvSpPr>
+            <a:spLocks noGrp="1" noRot="1" noChangeAspect="1" noMove="1" noResize="1" noEditPoints="1" noAdjustHandles="1" noChangeArrowheads="1" noChangeShapeType="1" noTextEdit="1"/>
+          </p:cNvSpPr>
+          <p:nvPr>
+            <p:extLst>
+              <p:ext uri="{386F3935-93C4-4BCD-93E2-E3B085C9AB24}">
+                <p16:designElem xmlns:p16="http://schemas.microsoft.com/office/powerpoint/2015/main" val="1"/>
+              </p:ext>
+            </p:extLst>
+          </p:nvPr>
+        </p:nvSpPr>
+        <p:spPr>
+          <a:xfrm>
+            <a:off x="0" y="0"/>
+            <a:ext cx="4959047" cy="6858000"/>
+          </a:xfrm>
+          <a:custGeom>
+            <a:avLst/>
+            <a:gdLst>
+              <a:gd name="connsiteX0" fmla="*/ 0 w 4959047"/>
+              <a:gd name="connsiteY0" fmla="*/ 0 h 6858000"/>
+              <a:gd name="connsiteX1" fmla="*/ 4110127 w 4959047"/>
+              <a:gd name="connsiteY1" fmla="*/ 0 h 6858000"/>
+              <a:gd name="connsiteX2" fmla="*/ 4179024 w 4959047"/>
+              <a:gd name="connsiteY2" fmla="*/ 123368 h 6858000"/>
+              <a:gd name="connsiteX3" fmla="*/ 4959047 w 4959047"/>
+              <a:gd name="connsiteY3" fmla="*/ 3429000 h 6858000"/>
+              <a:gd name="connsiteX4" fmla="*/ 4179024 w 4959047"/>
+              <a:gd name="connsiteY4" fmla="*/ 6734633 h 6858000"/>
+              <a:gd name="connsiteX5" fmla="*/ 4110127 w 4959047"/>
+              <a:gd name="connsiteY5" fmla="*/ 6858000 h 6858000"/>
+              <a:gd name="connsiteX6" fmla="*/ 0 w 4959047"/>
+              <a:gd name="connsiteY6" fmla="*/ 6858000 h 6858000"/>
+            </a:gdLst>
+            <a:ahLst/>
+            <a:cxnLst>
+              <a:cxn ang="0">
+                <a:pos x="connsiteX0" y="connsiteY0"/>
+              </a:cxn>
+              <a:cxn ang="0">
+                <a:pos x="connsiteX1" y="connsiteY1"/>
+              </a:cxn>
+              <a:cxn ang="0">
+                <a:pos x="connsiteX2" y="connsiteY2"/>
+              </a:cxn>
+              <a:cxn ang="0">
+                <a:pos x="connsiteX3" y="connsiteY3"/>
+              </a:cxn>
+              <a:cxn ang="0">
+                <a:pos x="connsiteX4" y="connsiteY4"/>
+              </a:cxn>
+              <a:cxn ang="0">
+                <a:pos x="connsiteX5" y="connsiteY5"/>
+              </a:cxn>
+              <a:cxn ang="0">
+                <a:pos x="connsiteX6" y="connsiteY6"/>
+              </a:cxn>
+            </a:cxnLst>
+            <a:rect l="l" t="t" r="r" b="b"/>
+            <a:pathLst>
+              <a:path w="4959047" h="6858000">
+                <a:moveTo>
+                  <a:pt x="0" y="0"/>
+                </a:moveTo>
+                <a:lnTo>
+                  <a:pt x="4110127" y="0"/>
+                </a:lnTo>
+                <a:lnTo>
+                  <a:pt x="4179024" y="123368"/>
+                </a:lnTo>
+                <a:cubicBezTo>
+                  <a:pt x="4668929" y="1045156"/>
+                  <a:pt x="4959047" y="2189404"/>
+                  <a:pt x="4959047" y="3429000"/>
+                </a:cubicBezTo>
+                <a:cubicBezTo>
+                  <a:pt x="4959047" y="4668597"/>
+                  <a:pt x="4668929" y="5812845"/>
+                  <a:pt x="4179024" y="6734633"/>
+                </a:cubicBezTo>
+                <a:lnTo>
+                  <a:pt x="4110127" y="6858000"/>
+                </a:lnTo>
+                <a:lnTo>
+                  <a:pt x="0" y="6858000"/>
+                </a:lnTo>
+                <a:close/>
+              </a:path>
+            </a:pathLst>
+          </a:custGeom>
+          <a:ln w="9525">
+            <a:solidFill>
+              <a:schemeClr val="tx2">
+                <a:lumMod val="10000"/>
+                <a:lumOff val="90000"/>
+              </a:schemeClr>
+            </a:solidFill>
+          </a:ln>
+          <a:effectLst>
+            <a:outerShdw blurRad="50800" dist="38100" algn="l" rotWithShape="0">
+              <a:schemeClr val="bg1">
+                <a:lumMod val="85000"/>
+                <a:alpha val="30000"/>
+              </a:schemeClr>
+            </a:outerShdw>
+          </a:effectLst>
+        </p:spPr>
+        <p:style>
+          <a:lnRef idx="2">
+            <a:schemeClr val="accent1">
+              <a:shade val="50000"/>
+            </a:schemeClr>
+          </a:lnRef>
+          <a:fillRef idx="1">
+            <a:schemeClr val="accent1"/>
+          </a:fillRef>
+          <a:effectRef idx="0">
+            <a:schemeClr val="accent1"/>
+          </a:effectRef>
+          <a:fontRef idx="minor">
+            <a:schemeClr val="lt1"/>
+          </a:fontRef>
+        </p:style>
+        <p:txBody>
+          <a:bodyPr wrap="square" rtlCol="0" anchor="ctr">
+            <a:noAutofit/>
+          </a:bodyPr>
+          <a:lstStyle/>
+          <a:p>
+            <a:pPr marL="0" marR="0" lvl="0" indent="0" algn="ctr" defTabSz="914400" rtl="0" eaLnBrk="1" fontAlgn="auto" latinLnBrk="0" hangingPunct="1">
+              <a:lnSpc>
+                <a:spcPct val="100000"/>
+              </a:lnSpc>
+              <a:spcBef>
+                <a:spcPts val="0"/>
+              </a:spcBef>
+              <a:spcAft>
+                <a:spcPts val="0"/>
+              </a:spcAft>
+              <a:buClrTx/>
+              <a:buSzTx/>
+              <a:buFontTx/>
+              <a:buNone/>
+              <a:tabLst/>
+              <a:defRPr/>
+            </a:pPr>
+            <a:endParaRPr kumimoji="0" lang="en-US" sz="1800" b="0" i="0" u="none" strike="noStrike" kern="1200" cap="none" spc="0" normalizeH="0" baseline="0" noProof="0">
+              <a:ln>
+                <a:noFill/>
+              </a:ln>
+              <a:solidFill>
+                <a:prstClr val="white"/>
+              </a:solidFill>
+              <a:effectLst/>
+              <a:uLnTx/>
+              <a:uFillTx/>
+              <a:latin typeface="Calibri" panose="020F0502020204030204"/>
+              <a:ea typeface="+mn-ea"/>
+              <a:cs typeface="+mn-cs"/>
+            </a:endParaRPr>
+          </a:p>
+        </p:txBody>
+      </p:sp>
+      <p:sp useBgFill="1">
+        <p:nvSpPr>
+          <p:cNvPr id="42" name="Freeform: Shape 32">
+            <a:extLst>
+              <a:ext uri="{FF2B5EF4-FFF2-40B4-BE49-F238E27FC236}">
+                <a16:creationId xmlns:a16="http://schemas.microsoft.com/office/drawing/2014/main" id="{84D4DDB8-B68F-45B0-9F62-C4279996F672}"/>
+              </a:ext>
+              <a:ext uri="{C183D7F6-B498-43B3-948B-1728B52AA6E4}">
+                <adec:decorative xmlns:adec="http://schemas.microsoft.com/office/drawing/2017/decorative" val="1"/>
+              </a:ext>
+            </a:extLst>
+          </p:cNvPr>
+          <p:cNvSpPr>
+            <a:spLocks noGrp="1" noRot="1" noChangeAspect="1" noMove="1" noResize="1" noEditPoints="1" noAdjustHandles="1" noChangeArrowheads="1" noChangeShapeType="1" noTextEdit="1"/>
+          </p:cNvSpPr>
+          <p:nvPr>
+            <p:extLst>
+              <p:ext uri="{386F3935-93C4-4BCD-93E2-E3B085C9AB24}">
+                <p16:designElem xmlns:p16="http://schemas.microsoft.com/office/powerpoint/2015/main" val="1"/>
+              </p:ext>
+            </p:extLst>
+          </p:nvPr>
+        </p:nvSpPr>
+        <p:spPr>
+          <a:xfrm>
+            <a:off x="0" y="0"/>
+            <a:ext cx="4948887" cy="6858000"/>
+          </a:xfrm>
+          <a:custGeom>
+            <a:avLst/>
+            <a:gdLst>
+              <a:gd name="connsiteX0" fmla="*/ 0 w 4948887"/>
+              <a:gd name="connsiteY0" fmla="*/ 0 h 6858000"/>
+              <a:gd name="connsiteX1" fmla="*/ 4099967 w 4948887"/>
+              <a:gd name="connsiteY1" fmla="*/ 0 h 6858000"/>
+              <a:gd name="connsiteX2" fmla="*/ 4168864 w 4948887"/>
+              <a:gd name="connsiteY2" fmla="*/ 123368 h 6858000"/>
+              <a:gd name="connsiteX3" fmla="*/ 4948887 w 4948887"/>
+              <a:gd name="connsiteY3" fmla="*/ 3429000 h 6858000"/>
+              <a:gd name="connsiteX4" fmla="*/ 4168864 w 4948887"/>
+              <a:gd name="connsiteY4" fmla="*/ 6734633 h 6858000"/>
+              <a:gd name="connsiteX5" fmla="*/ 4099967 w 4948887"/>
+              <a:gd name="connsiteY5" fmla="*/ 6858000 h 6858000"/>
+              <a:gd name="connsiteX6" fmla="*/ 0 w 4948887"/>
+              <a:gd name="connsiteY6" fmla="*/ 6858000 h 6858000"/>
+            </a:gdLst>
+            <a:ahLst/>
+            <a:cxnLst>
+              <a:cxn ang="0">
+                <a:pos x="connsiteX0" y="connsiteY0"/>
+              </a:cxn>
+              <a:cxn ang="0">
+                <a:pos x="connsiteX1" y="connsiteY1"/>
+              </a:cxn>
+              <a:cxn ang="0">
+                <a:pos x="connsiteX2" y="connsiteY2"/>
+              </a:cxn>
+              <a:cxn ang="0">
+                <a:pos x="connsiteX3" y="connsiteY3"/>
+              </a:cxn>
+              <a:cxn ang="0">
+                <a:pos x="connsiteX4" y="connsiteY4"/>
+              </a:cxn>
+              <a:cxn ang="0">
+                <a:pos x="connsiteX5" y="connsiteY5"/>
+              </a:cxn>
+              <a:cxn ang="0">
+                <a:pos x="connsiteX6" y="connsiteY6"/>
+              </a:cxn>
+            </a:cxnLst>
+            <a:rect l="l" t="t" r="r" b="b"/>
+            <a:pathLst>
+              <a:path w="4948887" h="6858000">
+                <a:moveTo>
+                  <a:pt x="0" y="0"/>
+                </a:moveTo>
+                <a:lnTo>
+                  <a:pt x="4099967" y="0"/>
+                </a:lnTo>
+                <a:lnTo>
+                  <a:pt x="4168864" y="123368"/>
+                </a:lnTo>
+                <a:cubicBezTo>
+                  <a:pt x="4658769" y="1045156"/>
+                  <a:pt x="4948887" y="2189404"/>
+                  <a:pt x="4948887" y="3429000"/>
+                </a:cubicBezTo>
+                <a:cubicBezTo>
+                  <a:pt x="4948887" y="4668597"/>
+                  <a:pt x="4658769" y="5812845"/>
+                  <a:pt x="4168864" y="6734633"/>
+                </a:cubicBezTo>
+                <a:lnTo>
+                  <a:pt x="4099967" y="6858000"/>
+                </a:lnTo>
+                <a:lnTo>
+                  <a:pt x="0" y="6858000"/>
+                </a:lnTo>
+                <a:close/>
+              </a:path>
+            </a:pathLst>
+          </a:custGeom>
+          <a:ln w="9525">
+            <a:noFill/>
+          </a:ln>
+          <a:effectLst/>
+        </p:spPr>
+        <p:style>
+          <a:lnRef idx="2">
+            <a:schemeClr val="accent1">
+              <a:shade val="50000"/>
+            </a:schemeClr>
+          </a:lnRef>
+          <a:fillRef idx="1">
+            <a:schemeClr val="accent1"/>
+          </a:fillRef>
+          <a:effectRef idx="0">
+            <a:schemeClr val="accent1"/>
+          </a:effectRef>
+          <a:fontRef idx="minor">
+            <a:schemeClr val="lt1"/>
+          </a:fontRef>
+        </p:style>
+        <p:txBody>
+          <a:bodyPr wrap="square" rtlCol="0" anchor="ctr">
+            <a:noAutofit/>
+          </a:bodyPr>
+          <a:lstStyle/>
+          <a:p>
+            <a:pPr marL="0" marR="0" lvl="0" indent="0" algn="ctr" defTabSz="914400" rtl="0" eaLnBrk="1" fontAlgn="auto" latinLnBrk="0" hangingPunct="1">
+              <a:lnSpc>
+                <a:spcPct val="100000"/>
+              </a:lnSpc>
+              <a:spcBef>
+                <a:spcPts val="0"/>
+              </a:spcBef>
+              <a:spcAft>
+                <a:spcPts val="0"/>
+              </a:spcAft>
+              <a:buClrTx/>
+              <a:buSzTx/>
+              <a:buFontTx/>
+              <a:buNone/>
+              <a:tabLst/>
+              <a:defRPr/>
+            </a:pPr>
+            <a:endParaRPr kumimoji="0" lang="en-US" sz="1800" b="0" i="0" u="none" strike="noStrike" kern="1200" cap="none" spc="0" normalizeH="0" baseline="0" noProof="0">
+              <a:ln>
+                <a:noFill/>
+              </a:ln>
+              <a:solidFill>
+                <a:prstClr val="white"/>
+              </a:solidFill>
+              <a:effectLst/>
+              <a:uLnTx/>
+              <a:uFillTx/>
+              <a:latin typeface="Calibri" panose="020F0502020204030204"/>
+              <a:ea typeface="+mn-ea"/>
+              <a:cs typeface="+mn-cs"/>
+            </a:endParaRPr>
+          </a:p>
+        </p:txBody>
+      </p:sp>
       <p:sp>
         <p:nvSpPr>
           <p:cNvPr id="2" name="Titolo 1">
@@ -13914,7 +14254,7 @@
       </p:sp>
       <p:sp>
         <p:nvSpPr>
-          <p:cNvPr id="18" name="Rectangle 17">
+          <p:cNvPr id="43" name="Rectangle 34">
             <a:extLst>
               <a:ext uri="{FF2B5EF4-FFF2-40B4-BE49-F238E27FC236}">
                 <a16:creationId xmlns:a16="http://schemas.microsoft.com/office/drawing/2014/main" id="{AF2F604E-43BE-4DC3-B983-E071523364F8}"/>
@@ -14006,7 +14346,7 @@
       </p:sp>
       <p:sp>
         <p:nvSpPr>
-          <p:cNvPr id="20" name="Rectangle 19">
+          <p:cNvPr id="37" name="Rectangle 36">
             <a:extLst>
               <a:ext uri="{FF2B5EF4-FFF2-40B4-BE49-F238E27FC236}">
                 <a16:creationId xmlns:a16="http://schemas.microsoft.com/office/drawing/2014/main" id="{08C9B587-E65E-4B52-B37C-ABEBB6E87928}"/>
@@ -14124,8 +14464,8 @@
         </p:blipFill>
         <p:spPr>
           <a:xfrm>
-            <a:off x="4864608" y="1213882"/>
-            <a:ext cx="6846363" cy="4278981"/>
+            <a:off x="5414356" y="1350611"/>
+            <a:ext cx="6408836" cy="4005526"/>
           </a:xfrm>
           <a:prstGeom prst="rect">
             <a:avLst/>
@@ -14150,7 +14490,7 @@
         </p:nvSpPr>
         <p:spPr>
           <a:xfrm>
-            <a:off x="4864608" y="6356350"/>
+            <a:off x="5418374" y="6356350"/>
             <a:ext cx="4114800" cy="365125"/>
           </a:xfrm>
         </p:spPr>
@@ -14200,8 +14540,8 @@
         </p:nvSpPr>
         <p:spPr>
           <a:xfrm>
-            <a:off x="9926319" y="6356350"/>
-            <a:ext cx="1787699" cy="365125"/>
+            <a:off x="9847810" y="6356350"/>
+            <a:ext cx="1505989" cy="365125"/>
           </a:xfrm>
         </p:spPr>
         <p:txBody>
@@ -14216,7 +14556,7 @@
               </a:spcAft>
             </a:pPr>
             <a:fld id="{B2DC25EE-239B-4C5F-AAD1-255A7D5F1EE2}" type="slidenum">
-              <a:rPr lang="en-US">
+              <a:rPr lang="en-US" smtClean="0">
                 <a:solidFill>
                   <a:schemeClr val="tx2">
                     <a:lumMod val="50000"/>
@@ -14270,6 +14610,995 @@
 <file path=ppt/slides/slide14.xml><?xml version="1.0" encoding="utf-8"?>
 <p:sld xmlns:a="http://schemas.openxmlformats.org/drawingml/2006/main" xmlns:r="http://schemas.openxmlformats.org/officeDocument/2006/relationships" xmlns:p="http://schemas.openxmlformats.org/presentationml/2006/main">
   <p:cSld>
+    <p:bg>
+      <p:bgPr>
+        <a:solidFill>
+          <a:schemeClr val="bg1"/>
+        </a:solidFill>
+        <a:effectLst/>
+      </p:bgPr>
+    </p:bg>
+    <p:spTree>
+      <p:nvGrpSpPr>
+        <p:cNvPr id="1" name=""/>
+        <p:cNvGrpSpPr/>
+        <p:nvPr/>
+      </p:nvGrpSpPr>
+      <p:grpSpPr>
+        <a:xfrm>
+          <a:off x="0" y="0"/>
+          <a:ext cx="0" cy="0"/>
+          <a:chOff x="0" y="0"/>
+          <a:chExt cx="0" cy="0"/>
+        </a:xfrm>
+      </p:grpSpPr>
+      <p:sp>
+        <p:nvSpPr>
+          <p:cNvPr id="12" name="Rectangle 11">
+            <a:extLst>
+              <a:ext uri="{FF2B5EF4-FFF2-40B4-BE49-F238E27FC236}">
+                <a16:creationId xmlns:a16="http://schemas.microsoft.com/office/drawing/2014/main" id="{8D06CE56-3881-4ADA-8CEF-D18B02C242A3}"/>
+              </a:ext>
+              <a:ext uri="{C183D7F6-B498-43B3-948B-1728B52AA6E4}">
+                <adec:decorative xmlns:adec="http://schemas.microsoft.com/office/drawing/2017/decorative" val="1"/>
+              </a:ext>
+            </a:extLst>
+          </p:cNvPr>
+          <p:cNvSpPr>
+            <a:spLocks noGrp="1" noRot="1" noChangeAspect="1" noMove="1" noResize="1" noEditPoints="1" noAdjustHandles="1" noChangeArrowheads="1" noChangeShapeType="1" noTextEdit="1"/>
+          </p:cNvSpPr>
+          <p:nvPr>
+            <p:extLst>
+              <p:ext uri="{386F3935-93C4-4BCD-93E2-E3B085C9AB24}">
+                <p16:designElem xmlns:p16="http://schemas.microsoft.com/office/powerpoint/2015/main" val="1"/>
+              </p:ext>
+            </p:extLst>
+          </p:nvPr>
+        </p:nvSpPr>
+        <p:spPr>
+          <a:xfrm rot="5400000">
+            <a:off x="857544" y="346791"/>
+            <a:ext cx="146304" cy="704088"/>
+          </a:xfrm>
+          <a:prstGeom prst="rect">
+            <a:avLst/>
+          </a:prstGeom>
+          <a:solidFill>
+            <a:schemeClr val="accent1"/>
+          </a:solidFill>
+          <a:ln>
+            <a:noFill/>
+          </a:ln>
+        </p:spPr>
+        <p:style>
+          <a:lnRef idx="2">
+            <a:schemeClr val="accent1">
+              <a:shade val="50000"/>
+            </a:schemeClr>
+          </a:lnRef>
+          <a:fillRef idx="1">
+            <a:schemeClr val="accent1"/>
+          </a:fillRef>
+          <a:effectRef idx="0">
+            <a:schemeClr val="accent1"/>
+          </a:effectRef>
+          <a:fontRef idx="minor">
+            <a:schemeClr val="lt1"/>
+          </a:fontRef>
+        </p:style>
+        <p:txBody>
+          <a:bodyPr rtlCol="0" anchor="ctr"/>
+          <a:lstStyle/>
+          <a:p>
+            <a:pPr marL="0" marR="0" lvl="0" indent="0" algn="ctr" defTabSz="914400" rtl="0" eaLnBrk="1" fontAlgn="auto" latinLnBrk="0" hangingPunct="1">
+              <a:lnSpc>
+                <a:spcPct val="100000"/>
+              </a:lnSpc>
+              <a:spcBef>
+                <a:spcPts val="0"/>
+              </a:spcBef>
+              <a:spcAft>
+                <a:spcPts val="0"/>
+              </a:spcAft>
+              <a:buClrTx/>
+              <a:buSzTx/>
+              <a:buFontTx/>
+              <a:buNone/>
+              <a:tabLst/>
+              <a:defRPr/>
+            </a:pPr>
+            <a:endParaRPr kumimoji="0" lang="en-US" sz="1800" b="0" i="0" u="none" strike="noStrike" kern="1200" cap="none" spc="0" normalizeH="0" baseline="0" noProof="0">
+              <a:ln>
+                <a:noFill/>
+              </a:ln>
+              <a:solidFill>
+                <a:prstClr val="white"/>
+              </a:solidFill>
+              <a:effectLst/>
+              <a:uLnTx/>
+              <a:uFillTx/>
+              <a:latin typeface="Calibri" panose="020F0502020204030204"/>
+              <a:ea typeface="+mn-ea"/>
+              <a:cs typeface="+mn-cs"/>
+            </a:endParaRPr>
+          </a:p>
+        </p:txBody>
+      </p:sp>
+      <p:sp>
+        <p:nvSpPr>
+          <p:cNvPr id="14" name="Rectangle 13">
+            <a:extLst>
+              <a:ext uri="{FF2B5EF4-FFF2-40B4-BE49-F238E27FC236}">
+                <a16:creationId xmlns:a16="http://schemas.microsoft.com/office/drawing/2014/main" id="{79F3C543-62EC-4433-9C93-A2CD8764E9B4}"/>
+              </a:ext>
+              <a:ext uri="{C183D7F6-B498-43B3-948B-1728B52AA6E4}">
+                <adec:decorative xmlns:adec="http://schemas.microsoft.com/office/drawing/2017/decorative" val="1"/>
+              </a:ext>
+            </a:extLst>
+          </p:cNvPr>
+          <p:cNvSpPr>
+            <a:spLocks noGrp="1" noRot="1" noChangeAspect="1" noMove="1" noResize="1" noEditPoints="1" noAdjustHandles="1" noChangeArrowheads="1" noChangeShapeType="1" noTextEdit="1"/>
+          </p:cNvSpPr>
+          <p:nvPr>
+            <p:extLst>
+              <p:ext uri="{386F3935-93C4-4BCD-93E2-E3B085C9AB24}">
+                <p16:designElem xmlns:p16="http://schemas.microsoft.com/office/powerpoint/2015/main" val="1"/>
+              </p:ext>
+            </p:extLst>
+          </p:nvPr>
+        </p:nvSpPr>
+        <p:spPr>
+          <a:xfrm flipV="1">
+            <a:off x="578652" y="4501201"/>
+            <a:ext cx="11034696" cy="18288"/>
+          </a:xfrm>
+          <a:prstGeom prst="rect">
+            <a:avLst/>
+          </a:prstGeom>
+          <a:solidFill>
+            <a:schemeClr val="tx2">
+              <a:lumMod val="25000"/>
+              <a:lumOff val="75000"/>
+            </a:schemeClr>
+          </a:solidFill>
+          <a:ln w="3175">
+            <a:noFill/>
+          </a:ln>
+          <a:effectLst/>
+        </p:spPr>
+        <p:style>
+          <a:lnRef idx="2">
+            <a:schemeClr val="accent1">
+              <a:shade val="50000"/>
+            </a:schemeClr>
+          </a:lnRef>
+          <a:fillRef idx="1">
+            <a:schemeClr val="accent1"/>
+          </a:fillRef>
+          <a:effectRef idx="0">
+            <a:schemeClr val="accent1"/>
+          </a:effectRef>
+          <a:fontRef idx="minor">
+            <a:schemeClr val="lt1"/>
+          </a:fontRef>
+        </p:style>
+        <p:txBody>
+          <a:bodyPr rtlCol="0" anchor="ctr"/>
+          <a:lstStyle/>
+          <a:p>
+            <a:pPr marL="0" marR="0" lvl="0" indent="0" algn="ctr" defTabSz="914400" rtl="0" eaLnBrk="1" fontAlgn="auto" latinLnBrk="0" hangingPunct="1">
+              <a:lnSpc>
+                <a:spcPct val="100000"/>
+              </a:lnSpc>
+              <a:spcBef>
+                <a:spcPts val="0"/>
+              </a:spcBef>
+              <a:spcAft>
+                <a:spcPts val="0"/>
+              </a:spcAft>
+              <a:buClrTx/>
+              <a:buSzTx/>
+              <a:buFontTx/>
+              <a:buNone/>
+              <a:tabLst/>
+              <a:defRPr/>
+            </a:pPr>
+            <a:endParaRPr kumimoji="0" lang="en-US" sz="1800" b="0" i="0" u="none" strike="noStrike" kern="1200" cap="none" spc="0" normalizeH="0" baseline="0" noProof="0">
+              <a:ln>
+                <a:noFill/>
+              </a:ln>
+              <a:solidFill>
+                <a:prstClr val="white"/>
+              </a:solidFill>
+              <a:effectLst/>
+              <a:uLnTx/>
+              <a:uFillTx/>
+              <a:latin typeface="Calibri" panose="020F0502020204030204"/>
+              <a:ea typeface="+mn-ea"/>
+              <a:cs typeface="+mn-cs"/>
+            </a:endParaRPr>
+          </a:p>
+        </p:txBody>
+      </p:sp>
+      <p:sp useBgFill="1">
+        <p:nvSpPr>
+          <p:cNvPr id="16" name="Rectangle 15">
+            <a:extLst>
+              <a:ext uri="{FF2B5EF4-FFF2-40B4-BE49-F238E27FC236}">
+                <a16:creationId xmlns:a16="http://schemas.microsoft.com/office/drawing/2014/main" id="{5DCB5928-DC7D-4612-9922-441966E15627}"/>
+              </a:ext>
+              <a:ext uri="{C183D7F6-B498-43B3-948B-1728B52AA6E4}">
+                <adec:decorative xmlns:adec="http://schemas.microsoft.com/office/drawing/2017/decorative" val="1"/>
+              </a:ext>
+            </a:extLst>
+          </p:cNvPr>
+          <p:cNvSpPr>
+            <a:spLocks noGrp="1" noRot="1" noChangeAspect="1" noMove="1" noResize="1" noEditPoints="1" noAdjustHandles="1" noChangeArrowheads="1" noChangeShapeType="1" noTextEdit="1"/>
+          </p:cNvSpPr>
+          <p:nvPr>
+            <p:extLst>
+              <p:ext uri="{386F3935-93C4-4BCD-93E2-E3B085C9AB24}">
+                <p16:designElem xmlns:p16="http://schemas.microsoft.com/office/powerpoint/2015/main" val="1"/>
+              </p:ext>
+            </p:extLst>
+          </p:nvPr>
+        </p:nvSpPr>
+        <p:spPr>
+          <a:xfrm>
+            <a:off x="0" y="0"/>
+            <a:ext cx="12192000" cy="6858000"/>
+          </a:xfrm>
+          <a:prstGeom prst="rect">
+            <a:avLst/>
+          </a:prstGeom>
+          <a:ln>
+            <a:noFill/>
+          </a:ln>
+        </p:spPr>
+        <p:style>
+          <a:lnRef idx="2">
+            <a:schemeClr val="accent1">
+              <a:shade val="50000"/>
+            </a:schemeClr>
+          </a:lnRef>
+          <a:fillRef idx="1">
+            <a:schemeClr val="accent1"/>
+          </a:fillRef>
+          <a:effectRef idx="0">
+            <a:schemeClr val="accent1"/>
+          </a:effectRef>
+          <a:fontRef idx="minor">
+            <a:schemeClr val="lt1"/>
+          </a:fontRef>
+        </p:style>
+        <p:txBody>
+          <a:bodyPr rtlCol="0" anchor="ctr"/>
+          <a:lstStyle/>
+          <a:p>
+            <a:pPr algn="ctr"/>
+            <a:endParaRPr lang="en-US"/>
+          </a:p>
+        </p:txBody>
+      </p:sp>
+      <p:sp useBgFill="1">
+        <p:nvSpPr>
+          <p:cNvPr id="18" name="Freeform: Shape 17">
+            <a:extLst>
+              <a:ext uri="{FF2B5EF4-FFF2-40B4-BE49-F238E27FC236}">
+                <a16:creationId xmlns:a16="http://schemas.microsoft.com/office/drawing/2014/main" id="{682C1161-1736-45EC-99B7-33F3CAE9D517}"/>
+              </a:ext>
+              <a:ext uri="{C183D7F6-B498-43B3-948B-1728B52AA6E4}">
+                <adec:decorative xmlns:adec="http://schemas.microsoft.com/office/drawing/2017/decorative" val="1"/>
+              </a:ext>
+            </a:extLst>
+          </p:cNvPr>
+          <p:cNvSpPr>
+            <a:spLocks noGrp="1" noRot="1" noChangeAspect="1" noMove="1" noResize="1" noEditPoints="1" noAdjustHandles="1" noChangeArrowheads="1" noChangeShapeType="1" noTextEdit="1"/>
+          </p:cNvSpPr>
+          <p:nvPr>
+            <p:extLst>
+              <p:ext uri="{386F3935-93C4-4BCD-93E2-E3B085C9AB24}">
+                <p16:designElem xmlns:p16="http://schemas.microsoft.com/office/powerpoint/2015/main" val="1"/>
+              </p:ext>
+            </p:extLst>
+          </p:nvPr>
+        </p:nvSpPr>
+        <p:spPr>
+          <a:xfrm>
+            <a:off x="0" y="0"/>
+            <a:ext cx="4959047" cy="6858000"/>
+          </a:xfrm>
+          <a:custGeom>
+            <a:avLst/>
+            <a:gdLst>
+              <a:gd name="connsiteX0" fmla="*/ 0 w 4959047"/>
+              <a:gd name="connsiteY0" fmla="*/ 0 h 6858000"/>
+              <a:gd name="connsiteX1" fmla="*/ 4110127 w 4959047"/>
+              <a:gd name="connsiteY1" fmla="*/ 0 h 6858000"/>
+              <a:gd name="connsiteX2" fmla="*/ 4179024 w 4959047"/>
+              <a:gd name="connsiteY2" fmla="*/ 123368 h 6858000"/>
+              <a:gd name="connsiteX3" fmla="*/ 4959047 w 4959047"/>
+              <a:gd name="connsiteY3" fmla="*/ 3429000 h 6858000"/>
+              <a:gd name="connsiteX4" fmla="*/ 4179024 w 4959047"/>
+              <a:gd name="connsiteY4" fmla="*/ 6734633 h 6858000"/>
+              <a:gd name="connsiteX5" fmla="*/ 4110127 w 4959047"/>
+              <a:gd name="connsiteY5" fmla="*/ 6858000 h 6858000"/>
+              <a:gd name="connsiteX6" fmla="*/ 0 w 4959047"/>
+              <a:gd name="connsiteY6" fmla="*/ 6858000 h 6858000"/>
+            </a:gdLst>
+            <a:ahLst/>
+            <a:cxnLst>
+              <a:cxn ang="0">
+                <a:pos x="connsiteX0" y="connsiteY0"/>
+              </a:cxn>
+              <a:cxn ang="0">
+                <a:pos x="connsiteX1" y="connsiteY1"/>
+              </a:cxn>
+              <a:cxn ang="0">
+                <a:pos x="connsiteX2" y="connsiteY2"/>
+              </a:cxn>
+              <a:cxn ang="0">
+                <a:pos x="connsiteX3" y="connsiteY3"/>
+              </a:cxn>
+              <a:cxn ang="0">
+                <a:pos x="connsiteX4" y="connsiteY4"/>
+              </a:cxn>
+              <a:cxn ang="0">
+                <a:pos x="connsiteX5" y="connsiteY5"/>
+              </a:cxn>
+              <a:cxn ang="0">
+                <a:pos x="connsiteX6" y="connsiteY6"/>
+              </a:cxn>
+            </a:cxnLst>
+            <a:rect l="l" t="t" r="r" b="b"/>
+            <a:pathLst>
+              <a:path w="4959047" h="6858000">
+                <a:moveTo>
+                  <a:pt x="0" y="0"/>
+                </a:moveTo>
+                <a:lnTo>
+                  <a:pt x="4110127" y="0"/>
+                </a:lnTo>
+                <a:lnTo>
+                  <a:pt x="4179024" y="123368"/>
+                </a:lnTo>
+                <a:cubicBezTo>
+                  <a:pt x="4668929" y="1045156"/>
+                  <a:pt x="4959047" y="2189404"/>
+                  <a:pt x="4959047" y="3429000"/>
+                </a:cubicBezTo>
+                <a:cubicBezTo>
+                  <a:pt x="4959047" y="4668597"/>
+                  <a:pt x="4668929" y="5812845"/>
+                  <a:pt x="4179024" y="6734633"/>
+                </a:cubicBezTo>
+                <a:lnTo>
+                  <a:pt x="4110127" y="6858000"/>
+                </a:lnTo>
+                <a:lnTo>
+                  <a:pt x="0" y="6858000"/>
+                </a:lnTo>
+                <a:close/>
+              </a:path>
+            </a:pathLst>
+          </a:custGeom>
+          <a:ln w="9525">
+            <a:solidFill>
+              <a:schemeClr val="tx2">
+                <a:lumMod val="10000"/>
+                <a:lumOff val="90000"/>
+              </a:schemeClr>
+            </a:solidFill>
+          </a:ln>
+          <a:effectLst>
+            <a:outerShdw blurRad="50800" dist="38100" algn="l" rotWithShape="0">
+              <a:schemeClr val="bg1">
+                <a:lumMod val="85000"/>
+                <a:alpha val="30000"/>
+              </a:schemeClr>
+            </a:outerShdw>
+          </a:effectLst>
+        </p:spPr>
+        <p:style>
+          <a:lnRef idx="2">
+            <a:schemeClr val="accent1">
+              <a:shade val="50000"/>
+            </a:schemeClr>
+          </a:lnRef>
+          <a:fillRef idx="1">
+            <a:schemeClr val="accent1"/>
+          </a:fillRef>
+          <a:effectRef idx="0">
+            <a:schemeClr val="accent1"/>
+          </a:effectRef>
+          <a:fontRef idx="minor">
+            <a:schemeClr val="lt1"/>
+          </a:fontRef>
+        </p:style>
+        <p:txBody>
+          <a:bodyPr wrap="square" rtlCol="0" anchor="ctr">
+            <a:noAutofit/>
+          </a:bodyPr>
+          <a:lstStyle/>
+          <a:p>
+            <a:pPr marL="0" marR="0" lvl="0" indent="0" algn="ctr" defTabSz="914400" rtl="0" eaLnBrk="1" fontAlgn="auto" latinLnBrk="0" hangingPunct="1">
+              <a:lnSpc>
+                <a:spcPct val="100000"/>
+              </a:lnSpc>
+              <a:spcBef>
+                <a:spcPts val="0"/>
+              </a:spcBef>
+              <a:spcAft>
+                <a:spcPts val="0"/>
+              </a:spcAft>
+              <a:buClrTx/>
+              <a:buSzTx/>
+              <a:buFontTx/>
+              <a:buNone/>
+              <a:tabLst/>
+              <a:defRPr/>
+            </a:pPr>
+            <a:endParaRPr kumimoji="0" lang="en-US" sz="1800" b="0" i="0" u="none" strike="noStrike" kern="1200" cap="none" spc="0" normalizeH="0" baseline="0" noProof="0">
+              <a:ln>
+                <a:noFill/>
+              </a:ln>
+              <a:solidFill>
+                <a:prstClr val="white"/>
+              </a:solidFill>
+              <a:effectLst/>
+              <a:uLnTx/>
+              <a:uFillTx/>
+              <a:latin typeface="Calibri" panose="020F0502020204030204"/>
+              <a:ea typeface="+mn-ea"/>
+              <a:cs typeface="+mn-cs"/>
+            </a:endParaRPr>
+          </a:p>
+        </p:txBody>
+      </p:sp>
+      <p:sp useBgFill="1">
+        <p:nvSpPr>
+          <p:cNvPr id="20" name="Freeform: Shape 19">
+            <a:extLst>
+              <a:ext uri="{FF2B5EF4-FFF2-40B4-BE49-F238E27FC236}">
+                <a16:creationId xmlns:a16="http://schemas.microsoft.com/office/drawing/2014/main" id="{84D4DDB8-B68F-45B0-9F62-C4279996F672}"/>
+              </a:ext>
+              <a:ext uri="{C183D7F6-B498-43B3-948B-1728B52AA6E4}">
+                <adec:decorative xmlns:adec="http://schemas.microsoft.com/office/drawing/2017/decorative" val="1"/>
+              </a:ext>
+            </a:extLst>
+          </p:cNvPr>
+          <p:cNvSpPr>
+            <a:spLocks noGrp="1" noRot="1" noChangeAspect="1" noMove="1" noResize="1" noEditPoints="1" noAdjustHandles="1" noChangeArrowheads="1" noChangeShapeType="1" noTextEdit="1"/>
+          </p:cNvSpPr>
+          <p:nvPr>
+            <p:extLst>
+              <p:ext uri="{386F3935-93C4-4BCD-93E2-E3B085C9AB24}">
+                <p16:designElem xmlns:p16="http://schemas.microsoft.com/office/powerpoint/2015/main" val="1"/>
+              </p:ext>
+            </p:extLst>
+          </p:nvPr>
+        </p:nvSpPr>
+        <p:spPr>
+          <a:xfrm>
+            <a:off x="0" y="0"/>
+            <a:ext cx="4948887" cy="6858000"/>
+          </a:xfrm>
+          <a:custGeom>
+            <a:avLst/>
+            <a:gdLst>
+              <a:gd name="connsiteX0" fmla="*/ 0 w 4948887"/>
+              <a:gd name="connsiteY0" fmla="*/ 0 h 6858000"/>
+              <a:gd name="connsiteX1" fmla="*/ 4099967 w 4948887"/>
+              <a:gd name="connsiteY1" fmla="*/ 0 h 6858000"/>
+              <a:gd name="connsiteX2" fmla="*/ 4168864 w 4948887"/>
+              <a:gd name="connsiteY2" fmla="*/ 123368 h 6858000"/>
+              <a:gd name="connsiteX3" fmla="*/ 4948887 w 4948887"/>
+              <a:gd name="connsiteY3" fmla="*/ 3429000 h 6858000"/>
+              <a:gd name="connsiteX4" fmla="*/ 4168864 w 4948887"/>
+              <a:gd name="connsiteY4" fmla="*/ 6734633 h 6858000"/>
+              <a:gd name="connsiteX5" fmla="*/ 4099967 w 4948887"/>
+              <a:gd name="connsiteY5" fmla="*/ 6858000 h 6858000"/>
+              <a:gd name="connsiteX6" fmla="*/ 0 w 4948887"/>
+              <a:gd name="connsiteY6" fmla="*/ 6858000 h 6858000"/>
+            </a:gdLst>
+            <a:ahLst/>
+            <a:cxnLst>
+              <a:cxn ang="0">
+                <a:pos x="connsiteX0" y="connsiteY0"/>
+              </a:cxn>
+              <a:cxn ang="0">
+                <a:pos x="connsiteX1" y="connsiteY1"/>
+              </a:cxn>
+              <a:cxn ang="0">
+                <a:pos x="connsiteX2" y="connsiteY2"/>
+              </a:cxn>
+              <a:cxn ang="0">
+                <a:pos x="connsiteX3" y="connsiteY3"/>
+              </a:cxn>
+              <a:cxn ang="0">
+                <a:pos x="connsiteX4" y="connsiteY4"/>
+              </a:cxn>
+              <a:cxn ang="0">
+                <a:pos x="connsiteX5" y="connsiteY5"/>
+              </a:cxn>
+              <a:cxn ang="0">
+                <a:pos x="connsiteX6" y="connsiteY6"/>
+              </a:cxn>
+            </a:cxnLst>
+            <a:rect l="l" t="t" r="r" b="b"/>
+            <a:pathLst>
+              <a:path w="4948887" h="6858000">
+                <a:moveTo>
+                  <a:pt x="0" y="0"/>
+                </a:moveTo>
+                <a:lnTo>
+                  <a:pt x="4099967" y="0"/>
+                </a:lnTo>
+                <a:lnTo>
+                  <a:pt x="4168864" y="123368"/>
+                </a:lnTo>
+                <a:cubicBezTo>
+                  <a:pt x="4658769" y="1045156"/>
+                  <a:pt x="4948887" y="2189404"/>
+                  <a:pt x="4948887" y="3429000"/>
+                </a:cubicBezTo>
+                <a:cubicBezTo>
+                  <a:pt x="4948887" y="4668597"/>
+                  <a:pt x="4658769" y="5812845"/>
+                  <a:pt x="4168864" y="6734633"/>
+                </a:cubicBezTo>
+                <a:lnTo>
+                  <a:pt x="4099967" y="6858000"/>
+                </a:lnTo>
+                <a:lnTo>
+                  <a:pt x="0" y="6858000"/>
+                </a:lnTo>
+                <a:close/>
+              </a:path>
+            </a:pathLst>
+          </a:custGeom>
+          <a:ln w="9525">
+            <a:noFill/>
+          </a:ln>
+          <a:effectLst/>
+        </p:spPr>
+        <p:style>
+          <a:lnRef idx="2">
+            <a:schemeClr val="accent1">
+              <a:shade val="50000"/>
+            </a:schemeClr>
+          </a:lnRef>
+          <a:fillRef idx="1">
+            <a:schemeClr val="accent1"/>
+          </a:fillRef>
+          <a:effectRef idx="0">
+            <a:schemeClr val="accent1"/>
+          </a:effectRef>
+          <a:fontRef idx="minor">
+            <a:schemeClr val="lt1"/>
+          </a:fontRef>
+        </p:style>
+        <p:txBody>
+          <a:bodyPr wrap="square" rtlCol="0" anchor="ctr">
+            <a:noAutofit/>
+          </a:bodyPr>
+          <a:lstStyle/>
+          <a:p>
+            <a:pPr marL="0" marR="0" lvl="0" indent="0" algn="ctr" defTabSz="914400" rtl="0" eaLnBrk="1" fontAlgn="auto" latinLnBrk="0" hangingPunct="1">
+              <a:lnSpc>
+                <a:spcPct val="100000"/>
+              </a:lnSpc>
+              <a:spcBef>
+                <a:spcPts val="0"/>
+              </a:spcBef>
+              <a:spcAft>
+                <a:spcPts val="0"/>
+              </a:spcAft>
+              <a:buClrTx/>
+              <a:buSzTx/>
+              <a:buFontTx/>
+              <a:buNone/>
+              <a:tabLst/>
+              <a:defRPr/>
+            </a:pPr>
+            <a:endParaRPr kumimoji="0" lang="en-US" sz="1800" b="0" i="0" u="none" strike="noStrike" kern="1200" cap="none" spc="0" normalizeH="0" baseline="0" noProof="0">
+              <a:ln>
+                <a:noFill/>
+              </a:ln>
+              <a:solidFill>
+                <a:prstClr val="white"/>
+              </a:solidFill>
+              <a:effectLst/>
+              <a:uLnTx/>
+              <a:uFillTx/>
+              <a:latin typeface="Calibri" panose="020F0502020204030204"/>
+              <a:ea typeface="+mn-ea"/>
+              <a:cs typeface="+mn-cs"/>
+            </a:endParaRPr>
+          </a:p>
+        </p:txBody>
+      </p:sp>
+      <p:sp>
+        <p:nvSpPr>
+          <p:cNvPr id="2" name="Titolo 1">
+            <a:extLst>
+              <a:ext uri="{FF2B5EF4-FFF2-40B4-BE49-F238E27FC236}">
+                <a16:creationId xmlns:a16="http://schemas.microsoft.com/office/drawing/2014/main" id="{D1426425-3B11-5442-8EFA-C3B8716E30C6}"/>
+              </a:ext>
+            </a:extLst>
+          </p:cNvPr>
+          <p:cNvSpPr>
+            <a:spLocks noGrp="1"/>
+          </p:cNvSpPr>
+          <p:nvPr>
+            <p:ph type="title"/>
+          </p:nvPr>
+        </p:nvSpPr>
+        <p:spPr>
+          <a:xfrm>
+            <a:off x="477981" y="1122363"/>
+            <a:ext cx="4023360" cy="3204134"/>
+          </a:xfrm>
+        </p:spPr>
+        <p:txBody>
+          <a:bodyPr vert="horz" lIns="91440" tIns="45720" rIns="91440" bIns="45720" rtlCol="0" anchor="b">
+            <a:normAutofit/>
+          </a:bodyPr>
+          <a:lstStyle/>
+          <a:p>
+            <a:r>
+              <a:rPr lang="en-US" sz="4800"/>
+              <a:t>Correlazioni tra le variabili</a:t>
+            </a:r>
+          </a:p>
+        </p:txBody>
+      </p:sp>
+      <p:sp>
+        <p:nvSpPr>
+          <p:cNvPr id="22" name="Rectangle 21">
+            <a:extLst>
+              <a:ext uri="{FF2B5EF4-FFF2-40B4-BE49-F238E27FC236}">
+                <a16:creationId xmlns:a16="http://schemas.microsoft.com/office/drawing/2014/main" id="{AF2F604E-43BE-4DC3-B983-E071523364F8}"/>
+              </a:ext>
+              <a:ext uri="{C183D7F6-B498-43B3-948B-1728B52AA6E4}">
+                <adec:decorative xmlns:adec="http://schemas.microsoft.com/office/drawing/2017/decorative" val="1"/>
+              </a:ext>
+            </a:extLst>
+          </p:cNvPr>
+          <p:cNvSpPr>
+            <a:spLocks noGrp="1" noRot="1" noChangeAspect="1" noMove="1" noResize="1" noEditPoints="1" noAdjustHandles="1" noChangeArrowheads="1" noChangeShapeType="1" noTextEdit="1"/>
+          </p:cNvSpPr>
+          <p:nvPr>
+            <p:extLst>
+              <p:ext uri="{386F3935-93C4-4BCD-93E2-E3B085C9AB24}">
+                <p16:designElem xmlns:p16="http://schemas.microsoft.com/office/powerpoint/2015/main" val="1"/>
+              </p:ext>
+            </p:extLst>
+          </p:nvPr>
+        </p:nvSpPr>
+        <p:spPr>
+          <a:xfrm rot="5400000">
+            <a:off x="759921" y="346791"/>
+            <a:ext cx="146304" cy="704088"/>
+          </a:xfrm>
+          <a:prstGeom prst="rect">
+            <a:avLst/>
+          </a:prstGeom>
+          <a:solidFill>
+            <a:schemeClr val="accent1"/>
+          </a:solidFill>
+          <a:ln>
+            <a:noFill/>
+          </a:ln>
+        </p:spPr>
+        <p:style>
+          <a:lnRef idx="2">
+            <a:schemeClr val="accent1">
+              <a:shade val="50000"/>
+            </a:schemeClr>
+          </a:lnRef>
+          <a:fillRef idx="1">
+            <a:schemeClr val="accent1"/>
+          </a:fillRef>
+          <a:effectRef idx="0">
+            <a:schemeClr val="accent1"/>
+          </a:effectRef>
+          <a:fontRef idx="minor">
+            <a:schemeClr val="lt1"/>
+          </a:fontRef>
+        </p:style>
+        <p:txBody>
+          <a:bodyPr rtlCol="0" anchor="ctr"/>
+          <a:lstStyle/>
+          <a:p>
+            <a:pPr marL="0" marR="0" lvl="0" indent="0" algn="ctr" defTabSz="914400" rtl="0" eaLnBrk="1" fontAlgn="auto" latinLnBrk="0" hangingPunct="1">
+              <a:lnSpc>
+                <a:spcPct val="100000"/>
+              </a:lnSpc>
+              <a:spcBef>
+                <a:spcPts val="0"/>
+              </a:spcBef>
+              <a:spcAft>
+                <a:spcPts val="0"/>
+              </a:spcAft>
+              <a:buClrTx/>
+              <a:buSzTx/>
+              <a:buFontTx/>
+              <a:buNone/>
+              <a:tabLst/>
+              <a:defRPr/>
+            </a:pPr>
+            <a:endParaRPr kumimoji="0" lang="en-US" sz="1800" b="0" i="0" u="none" strike="noStrike" kern="1200" cap="none" spc="0" normalizeH="0" baseline="0" noProof="0">
+              <a:ln>
+                <a:noFill/>
+              </a:ln>
+              <a:solidFill>
+                <a:prstClr val="white"/>
+              </a:solidFill>
+              <a:effectLst/>
+              <a:uLnTx/>
+              <a:uFillTx/>
+              <a:latin typeface="Calibri" panose="020F0502020204030204"/>
+              <a:ea typeface="+mn-ea"/>
+              <a:cs typeface="+mn-cs"/>
+            </a:endParaRPr>
+          </a:p>
+        </p:txBody>
+      </p:sp>
+      <p:sp>
+        <p:nvSpPr>
+          <p:cNvPr id="24" name="Rectangle 23">
+            <a:extLst>
+              <a:ext uri="{FF2B5EF4-FFF2-40B4-BE49-F238E27FC236}">
+                <a16:creationId xmlns:a16="http://schemas.microsoft.com/office/drawing/2014/main" id="{08C9B587-E65E-4B52-B37C-ABEBB6E87928}"/>
+              </a:ext>
+              <a:ext uri="{C183D7F6-B498-43B3-948B-1728B52AA6E4}">
+                <adec:decorative xmlns:adec="http://schemas.microsoft.com/office/drawing/2017/decorative" val="1"/>
+              </a:ext>
+            </a:extLst>
+          </p:cNvPr>
+          <p:cNvSpPr>
+            <a:spLocks noGrp="1" noRot="1" noChangeAspect="1" noMove="1" noResize="1" noEditPoints="1" noAdjustHandles="1" noChangeArrowheads="1" noChangeShapeType="1" noTextEdit="1"/>
+          </p:cNvSpPr>
+          <p:nvPr>
+            <p:extLst>
+              <p:ext uri="{386F3935-93C4-4BCD-93E2-E3B085C9AB24}">
+                <p16:designElem xmlns:p16="http://schemas.microsoft.com/office/powerpoint/2015/main" val="1"/>
+              </p:ext>
+            </p:extLst>
+          </p:nvPr>
+        </p:nvSpPr>
+        <p:spPr>
+          <a:xfrm>
+            <a:off x="481029" y="4546920"/>
+            <a:ext cx="4023360" cy="18288"/>
+          </a:xfrm>
+          <a:prstGeom prst="rect">
+            <a:avLst/>
+          </a:prstGeom>
+          <a:solidFill>
+            <a:schemeClr val="tx2">
+              <a:lumMod val="25000"/>
+              <a:lumOff val="75000"/>
+            </a:schemeClr>
+          </a:solidFill>
+          <a:ln w="3175">
+            <a:noFill/>
+          </a:ln>
+          <a:effectLst/>
+        </p:spPr>
+        <p:style>
+          <a:lnRef idx="2">
+            <a:schemeClr val="accent1">
+              <a:shade val="50000"/>
+            </a:schemeClr>
+          </a:lnRef>
+          <a:fillRef idx="1">
+            <a:schemeClr val="accent1"/>
+          </a:fillRef>
+          <a:effectRef idx="0">
+            <a:schemeClr val="accent1"/>
+          </a:effectRef>
+          <a:fontRef idx="minor">
+            <a:schemeClr val="lt1"/>
+          </a:fontRef>
+        </p:style>
+        <p:txBody>
+          <a:bodyPr rtlCol="0" anchor="ctr"/>
+          <a:lstStyle/>
+          <a:p>
+            <a:pPr marL="0" marR="0" lvl="0" indent="0" algn="ctr" defTabSz="914400" rtl="0" eaLnBrk="1" fontAlgn="auto" latinLnBrk="0" hangingPunct="1">
+              <a:lnSpc>
+                <a:spcPct val="100000"/>
+              </a:lnSpc>
+              <a:spcBef>
+                <a:spcPts val="0"/>
+              </a:spcBef>
+              <a:spcAft>
+                <a:spcPts val="0"/>
+              </a:spcAft>
+              <a:buClrTx/>
+              <a:buSzTx/>
+              <a:buFontTx/>
+              <a:buNone/>
+              <a:tabLst/>
+              <a:defRPr/>
+            </a:pPr>
+            <a:endParaRPr kumimoji="0" lang="en-US" sz="1800" b="0" i="0" u="none" strike="noStrike" kern="1200" cap="none" spc="0" normalizeH="0" baseline="0" noProof="0">
+              <a:ln>
+                <a:noFill/>
+              </a:ln>
+              <a:solidFill>
+                <a:prstClr val="white"/>
+              </a:solidFill>
+              <a:effectLst/>
+              <a:uLnTx/>
+              <a:uFillTx/>
+              <a:latin typeface="Calibri" panose="020F0502020204030204"/>
+              <a:ea typeface="+mn-ea"/>
+              <a:cs typeface="+mn-cs"/>
+            </a:endParaRPr>
+          </a:p>
+        </p:txBody>
+      </p:sp>
+      <p:pic>
+        <p:nvPicPr>
+          <p:cNvPr id="7" name="Segnaposto contenuto 6" descr="Immagine che contiene sedendo, fotografia, diverso, libro&#10;&#10;Descrizione generata automaticamente">
+            <a:extLst>
+              <a:ext uri="{FF2B5EF4-FFF2-40B4-BE49-F238E27FC236}">
+                <a16:creationId xmlns:a16="http://schemas.microsoft.com/office/drawing/2014/main" id="{B4748CEA-C40F-844B-A572-743484FA4CD5}"/>
+              </a:ext>
+            </a:extLst>
+          </p:cNvPr>
+          <p:cNvPicPr>
+            <a:picLocks noGrp="1" noChangeAspect="1"/>
+          </p:cNvPicPr>
+          <p:nvPr>
+            <p:ph idx="1"/>
+          </p:nvPr>
+        </p:nvPicPr>
+        <p:blipFill>
+          <a:blip r:embed="rId2"/>
+          <a:stretch>
+            <a:fillRect/>
+          </a:stretch>
+        </p:blipFill>
+        <p:spPr>
+          <a:xfrm>
+            <a:off x="5501415" y="625684"/>
+            <a:ext cx="6234718" cy="5455380"/>
+          </a:xfrm>
+          <a:prstGeom prst="rect">
+            <a:avLst/>
+          </a:prstGeom>
+        </p:spPr>
+      </p:pic>
+      <p:sp>
+        <p:nvSpPr>
+          <p:cNvPr id="4" name="Segnaposto piè di pagina 3">
+            <a:extLst>
+              <a:ext uri="{FF2B5EF4-FFF2-40B4-BE49-F238E27FC236}">
+                <a16:creationId xmlns:a16="http://schemas.microsoft.com/office/drawing/2014/main" id="{046162A5-27DA-C04E-999C-3F46791A66EB}"/>
+              </a:ext>
+            </a:extLst>
+          </p:cNvPr>
+          <p:cNvSpPr>
+            <a:spLocks noGrp="1"/>
+          </p:cNvSpPr>
+          <p:nvPr>
+            <p:ph type="ftr" sz="quarter" idx="11"/>
+          </p:nvPr>
+        </p:nvSpPr>
+        <p:spPr>
+          <a:xfrm>
+            <a:off x="5418374" y="6356350"/>
+            <a:ext cx="4114800" cy="365125"/>
+          </a:xfrm>
+        </p:spPr>
+        <p:txBody>
+          <a:bodyPr vert="horz" lIns="91440" tIns="45720" rIns="91440" bIns="45720" rtlCol="0" anchor="ctr">
+            <a:normAutofit/>
+          </a:bodyPr>
+          <a:lstStyle/>
+          <a:p>
+            <a:pPr algn="l">
+              <a:spcAft>
+                <a:spcPts val="600"/>
+              </a:spcAft>
+            </a:pPr>
+            <a:r>
+              <a:rPr lang="en-US" kern="1200">
+                <a:solidFill>
+                  <a:schemeClr val="tx2">
+                    <a:lumMod val="50000"/>
+                    <a:lumOff val="50000"/>
+                  </a:schemeClr>
+                </a:solidFill>
+                <a:latin typeface="+mn-lt"/>
+                <a:ea typeface="+mn-ea"/>
+                <a:cs typeface="+mn-cs"/>
+              </a:rPr>
+              <a:t>YouTube ai tempi del Covid-19</a:t>
+            </a:r>
+          </a:p>
+        </p:txBody>
+      </p:sp>
+      <p:sp>
+        <p:nvSpPr>
+          <p:cNvPr id="5" name="Segnaposto numero diapositiva 4">
+            <a:extLst>
+              <a:ext uri="{FF2B5EF4-FFF2-40B4-BE49-F238E27FC236}">
+                <a16:creationId xmlns:a16="http://schemas.microsoft.com/office/drawing/2014/main" id="{D6300F6A-133A-0B42-95C5-A7E9519729AE}"/>
+              </a:ext>
+            </a:extLst>
+          </p:cNvPr>
+          <p:cNvSpPr>
+            <a:spLocks noGrp="1"/>
+          </p:cNvSpPr>
+          <p:nvPr>
+            <p:ph type="sldNum" sz="quarter" idx="12"/>
+          </p:nvPr>
+        </p:nvSpPr>
+        <p:spPr>
+          <a:xfrm>
+            <a:off x="9847810" y="6356350"/>
+            <a:ext cx="1505989" cy="365125"/>
+          </a:xfrm>
+        </p:spPr>
+        <p:txBody>
+          <a:bodyPr vert="horz" lIns="91440" tIns="45720" rIns="91440" bIns="45720" rtlCol="0" anchor="ctr">
+            <a:normAutofit/>
+          </a:bodyPr>
+          <a:lstStyle/>
+          <a:p>
+            <a:pPr>
+              <a:spcAft>
+                <a:spcPts val="600"/>
+              </a:spcAft>
+            </a:pPr>
+            <a:fld id="{B2DC25EE-239B-4C5F-AAD1-255A7D5F1EE2}" type="slidenum">
+              <a:rPr lang="en-US">
+                <a:solidFill>
+                  <a:schemeClr val="tx2">
+                    <a:lumMod val="50000"/>
+                    <a:lumOff val="50000"/>
+                  </a:schemeClr>
+                </a:solidFill>
+              </a:rPr>
+              <a:pPr>
+                <a:spcAft>
+                  <a:spcPts val="600"/>
+                </a:spcAft>
+              </a:pPr>
+              <a:t>14</a:t>
+            </a:fld>
+            <a:endParaRPr lang="en-US">
+              <a:solidFill>
+                <a:schemeClr val="tx2">
+                  <a:lumMod val="50000"/>
+                  <a:lumOff val="50000"/>
+                </a:schemeClr>
+              </a:solidFill>
+            </a:endParaRPr>
+          </a:p>
+        </p:txBody>
+      </p:sp>
+    </p:spTree>
+    <p:extLst>
+      <p:ext uri="{BB962C8B-B14F-4D97-AF65-F5344CB8AC3E}">
+        <p14:creationId xmlns:p14="http://schemas.microsoft.com/office/powerpoint/2010/main" val="4272364450"/>
+      </p:ext>
+    </p:extLst>
+  </p:cSld>
+  <p:clrMapOvr>
+    <a:masterClrMapping/>
+  </p:clrMapOvr>
+</p:sld>
+</file>
+
+<file path=ppt/slides/slide15.xml><?xml version="1.0" encoding="utf-8"?>
+<p:sld xmlns:a="http://schemas.openxmlformats.org/drawingml/2006/main" xmlns:r="http://schemas.openxmlformats.org/officeDocument/2006/relationships" xmlns:p="http://schemas.openxmlformats.org/presentationml/2006/main">
+  <p:cSld>
     <p:spTree>
       <p:nvGrpSpPr>
         <p:cNvPr id="1" name=""/>
@@ -14493,7 +15822,7 @@
           <a:p>
             <a:fld id="{B2DC25EE-239B-4C5F-AAD1-255A7D5F1EE2}" type="slidenum">
               <a:rPr lang="en-US" dirty="0" smtClean="0"/>
-              <a:t>14</a:t>
+              <a:t>15</a:t>
             </a:fld>
             <a:endParaRPr lang="en-US" dirty="0"/>
           </a:p>

</xml_diff>

<commit_message>
Changes two slides in the ppt
</commit_message>
<xml_diff>
--- a/presentazione/presentazione.pptx
+++ b/presentazione/presentazione.pptx
@@ -6967,7 +6967,7 @@
           <a:p>
             <a:fld id="{5030D8C6-8935-5E47-AB3F-62EA49D23738}" type="datetimeFigureOut">
               <a:rPr lang="it-IT" smtClean="0"/>
-              <a:t>14/06/20</a:t>
+              <a:t>15/06/20</a:t>
             </a:fld>
             <a:endParaRPr lang="it-IT"/>
           </a:p>
@@ -7390,7 +7390,7 @@
           <a:p>
             <a:fld id="{5927EEF2-1028-B14B-8880-BF80AABFFD88}" type="datetime1">
               <a:rPr lang="it-IT" smtClean="0"/>
-              <a:t>14/06/20</a:t>
+              <a:t>15/06/20</a:t>
             </a:fld>
             <a:endParaRPr lang="en-US" dirty="0"/>
           </a:p>
@@ -7764,7 +7764,7 @@
           <a:p>
             <a:fld id="{ADD2F0E7-99DD-7248-B3AF-B22FE1EEB9A3}" type="datetime1">
               <a:rPr lang="it-IT" smtClean="0"/>
-              <a:t>14/06/20</a:t>
+              <a:t>15/06/20</a:t>
             </a:fld>
             <a:endParaRPr lang="en-US"/>
           </a:p>
@@ -7977,7 +7977,7 @@
           <a:p>
             <a:fld id="{3A6E445A-5A43-BE4E-8F7D-463728FB0AE3}" type="datetime1">
               <a:rPr lang="it-IT" smtClean="0"/>
-              <a:t>14/06/20</a:t>
+              <a:t>15/06/20</a:t>
             </a:fld>
             <a:endParaRPr lang="en-US"/>
           </a:p>
@@ -8451,7 +8451,7 @@
           <a:p>
             <a:fld id="{CF66A625-8208-F44C-B62F-756814EDEBC2}" type="datetime1">
               <a:rPr lang="it-IT" smtClean="0"/>
-              <a:t>14/06/20</a:t>
+              <a:t>15/06/20</a:t>
             </a:fld>
             <a:endParaRPr lang="en-US"/>
           </a:p>
@@ -8909,7 +8909,7 @@
           <a:p>
             <a:fld id="{23D1705C-4E0B-4F4E-BF63-BA798587F4D7}" type="datetime1">
               <a:rPr lang="it-IT" smtClean="0"/>
-              <a:t>14/06/20</a:t>
+              <a:t>15/06/20</a:t>
             </a:fld>
             <a:endParaRPr lang="en-US"/>
           </a:p>
@@ -9445,7 +9445,7 @@
           <a:p>
             <a:fld id="{B4541556-65D6-E34D-AE1E-5A50024DA286}" type="datetime1">
               <a:rPr lang="it-IT" smtClean="0"/>
-              <a:t>14/06/20</a:t>
+              <a:t>15/06/20</a:t>
             </a:fld>
             <a:endParaRPr lang="en-US"/>
           </a:p>
@@ -10148,7 +10148,7 @@
           <a:p>
             <a:fld id="{10E37808-EBF4-024B-8551-FAEF55DCED40}" type="datetime1">
               <a:rPr lang="it-IT" smtClean="0"/>
-              <a:t>14/06/20</a:t>
+              <a:t>15/06/20</a:t>
             </a:fld>
             <a:endParaRPr lang="en-US"/>
           </a:p>
@@ -10481,7 +10481,7 @@
           <a:p>
             <a:fld id="{7518B78B-0BD1-2647-B2B6-B165EA2248D3}" type="datetime1">
               <a:rPr lang="it-IT" smtClean="0"/>
-              <a:t>14/06/20</a:t>
+              <a:t>15/06/20</a:t>
             </a:fld>
             <a:endParaRPr lang="en-US"/>
           </a:p>
@@ -10598,7 +10598,7 @@
           <a:p>
             <a:fld id="{E390B5C8-FF7F-A946-973B-6F279F61853F}" type="datetime1">
               <a:rPr lang="it-IT" smtClean="0"/>
-              <a:t>14/06/20</a:t>
+              <a:t>15/06/20</a:t>
             </a:fld>
             <a:endParaRPr lang="en-US"/>
           </a:p>
@@ -11097,7 +11097,7 @@
           <a:p>
             <a:fld id="{694A84A1-2BCC-134B-A487-D400AFE4DC7A}" type="datetime1">
               <a:rPr lang="it-IT" smtClean="0"/>
-              <a:t>14/06/20</a:t>
+              <a:t>15/06/20</a:t>
             </a:fld>
             <a:endParaRPr lang="en-US" dirty="0"/>
           </a:p>
@@ -11578,7 +11578,7 @@
           <a:p>
             <a:fld id="{4771BB6F-DA11-6548-A837-D909066AA708}" type="datetime1">
               <a:rPr lang="it-IT" smtClean="0"/>
-              <a:t>14/06/20</a:t>
+              <a:t>15/06/20</a:t>
             </a:fld>
             <a:endParaRPr lang="en-US"/>
           </a:p>
@@ -11825,7 +11825,7 @@
           <a:p>
             <a:fld id="{F37B283B-76FB-0647-A01F-CF48E4565E8B}" type="datetime1">
               <a:rPr lang="it-IT" smtClean="0"/>
-              <a:t>14/06/20</a:t>
+              <a:t>15/06/20</a:t>
             </a:fld>
             <a:endParaRPr lang="en-US"/>
           </a:p>
@@ -13591,13 +13591,13 @@
   <p:clrMapOvr>
     <a:masterClrMapping/>
   </p:clrMapOvr>
-  <mc:AlternateContent xmlns:mc="http://schemas.openxmlformats.org/markup-compatibility/2006">
-    <mc:Choice xmlns:p14="http://schemas.microsoft.com/office/powerpoint/2010/main" Requires="p14">
+  <mc:AlternateContent xmlns:mc="http://schemas.openxmlformats.org/markup-compatibility/2006" xmlns:p14="http://schemas.microsoft.com/office/powerpoint/2010/main">
+    <mc:Choice Requires="p14">
       <p:transition spd="med" p14:dur="700">
         <p:fade/>
       </p:transition>
     </mc:Choice>
-    <mc:Fallback>
+    <mc:Fallback xmlns="">
       <p:transition spd="med">
         <p:fade/>
       </p:transition>
@@ -14442,7 +14442,7 @@
       </p:sp>
       <p:pic>
         <p:nvPicPr>
-          <p:cNvPr id="7" name="Segnaposto contenuto 6" descr="Immagine che contiene testo, largo, uomo&#10;&#10;Descrizione generata automaticamente">
+          <p:cNvPr id="7" name="Segnaposto contenuto 6">
             <a:extLst>
               <a:ext uri="{FF2B5EF4-FFF2-40B4-BE49-F238E27FC236}">
                 <a16:creationId xmlns:a16="http://schemas.microsoft.com/office/drawing/2014/main" id="{5098040B-1018-0841-BB4F-C7FD4BD659DF}"/>
@@ -14458,14 +14458,13 @@
         </p:nvPicPr>
         <p:blipFill>
           <a:blip r:embed="rId2"/>
-          <a:stretch>
-            <a:fillRect/>
-          </a:stretch>
+          <a:srcRect/>
+          <a:stretch/>
         </p:blipFill>
         <p:spPr>
           <a:xfrm>
-            <a:off x="5414356" y="1350611"/>
-            <a:ext cx="6408836" cy="4005526"/>
+            <a:off x="5414356" y="1353908"/>
+            <a:ext cx="6408836" cy="3998932"/>
           </a:xfrm>
           <a:prstGeom prst="rect">
             <a:avLst/>
@@ -14592,13 +14591,13 @@
   <p:clrMapOvr>
     <a:masterClrMapping/>
   </p:clrMapOvr>
-  <mc:AlternateContent xmlns:mc="http://schemas.openxmlformats.org/markup-compatibility/2006">
-    <mc:Choice xmlns:p14="http://schemas.microsoft.com/office/powerpoint/2010/main" Requires="p14">
+  <mc:AlternateContent xmlns:mc="http://schemas.openxmlformats.org/markup-compatibility/2006" xmlns:p14="http://schemas.microsoft.com/office/powerpoint/2010/main">
+    <mc:Choice Requires="p14">
       <p:transition spd="med" p14:dur="700">
         <p:fade/>
       </p:transition>
     </mc:Choice>
-    <mc:Fallback>
+    <mc:Fallback xmlns="">
       <p:transition spd="med">
         <p:fade/>
       </p:transition>
@@ -14632,200 +14631,12 @@
           <a:chExt cx="0" cy="0"/>
         </a:xfrm>
       </p:grpSpPr>
-      <p:sp>
-        <p:nvSpPr>
-          <p:cNvPr id="12" name="Rectangle 11">
-            <a:extLst>
-              <a:ext uri="{FF2B5EF4-FFF2-40B4-BE49-F238E27FC236}">
-                <a16:creationId xmlns:a16="http://schemas.microsoft.com/office/drawing/2014/main" id="{8D06CE56-3881-4ADA-8CEF-D18B02C242A3}"/>
-              </a:ext>
-              <a:ext uri="{C183D7F6-B498-43B3-948B-1728B52AA6E4}">
-                <adec:decorative xmlns:adec="http://schemas.microsoft.com/office/drawing/2017/decorative" val="1"/>
-              </a:ext>
-            </a:extLst>
-          </p:cNvPr>
-          <p:cNvSpPr>
-            <a:spLocks noGrp="1" noRot="1" noChangeAspect="1" noMove="1" noResize="1" noEditPoints="1" noAdjustHandles="1" noChangeArrowheads="1" noChangeShapeType="1" noTextEdit="1"/>
-          </p:cNvSpPr>
-          <p:nvPr>
-            <p:extLst>
-              <p:ext uri="{386F3935-93C4-4BCD-93E2-E3B085C9AB24}">
-                <p16:designElem xmlns:p16="http://schemas.microsoft.com/office/powerpoint/2015/main" val="1"/>
-              </p:ext>
-            </p:extLst>
-          </p:nvPr>
-        </p:nvSpPr>
-        <p:spPr>
-          <a:xfrm rot="5400000">
-            <a:off x="857544" y="346791"/>
-            <a:ext cx="146304" cy="704088"/>
-          </a:xfrm>
-          <a:prstGeom prst="rect">
-            <a:avLst/>
-          </a:prstGeom>
-          <a:solidFill>
-            <a:schemeClr val="accent1"/>
-          </a:solidFill>
-          <a:ln>
-            <a:noFill/>
-          </a:ln>
-        </p:spPr>
-        <p:style>
-          <a:lnRef idx="2">
-            <a:schemeClr val="accent1">
-              <a:shade val="50000"/>
-            </a:schemeClr>
-          </a:lnRef>
-          <a:fillRef idx="1">
-            <a:schemeClr val="accent1"/>
-          </a:fillRef>
-          <a:effectRef idx="0">
-            <a:schemeClr val="accent1"/>
-          </a:effectRef>
-          <a:fontRef idx="minor">
-            <a:schemeClr val="lt1"/>
-          </a:fontRef>
-        </p:style>
-        <p:txBody>
-          <a:bodyPr rtlCol="0" anchor="ctr"/>
-          <a:lstStyle/>
-          <a:p>
-            <a:pPr marL="0" marR="0" lvl="0" indent="0" algn="ctr" defTabSz="914400" rtl="0" eaLnBrk="1" fontAlgn="auto" latinLnBrk="0" hangingPunct="1">
-              <a:lnSpc>
-                <a:spcPct val="100000"/>
-              </a:lnSpc>
-              <a:spcBef>
-                <a:spcPts val="0"/>
-              </a:spcBef>
-              <a:spcAft>
-                <a:spcPts val="0"/>
-              </a:spcAft>
-              <a:buClrTx/>
-              <a:buSzTx/>
-              <a:buFontTx/>
-              <a:buNone/>
-              <a:tabLst/>
-              <a:defRPr/>
-            </a:pPr>
-            <a:endParaRPr kumimoji="0" lang="en-US" sz="1800" b="0" i="0" u="none" strike="noStrike" kern="1200" cap="none" spc="0" normalizeH="0" baseline="0" noProof="0">
-              <a:ln>
-                <a:noFill/>
-              </a:ln>
-              <a:solidFill>
-                <a:prstClr val="white"/>
-              </a:solidFill>
-              <a:effectLst/>
-              <a:uLnTx/>
-              <a:uFillTx/>
-              <a:latin typeface="Calibri" panose="020F0502020204030204"/>
-              <a:ea typeface="+mn-ea"/>
-              <a:cs typeface="+mn-cs"/>
-            </a:endParaRPr>
-          </a:p>
-        </p:txBody>
-      </p:sp>
-      <p:sp>
-        <p:nvSpPr>
-          <p:cNvPr id="14" name="Rectangle 13">
-            <a:extLst>
-              <a:ext uri="{FF2B5EF4-FFF2-40B4-BE49-F238E27FC236}">
-                <a16:creationId xmlns:a16="http://schemas.microsoft.com/office/drawing/2014/main" id="{79F3C543-62EC-4433-9C93-A2CD8764E9B4}"/>
-              </a:ext>
-              <a:ext uri="{C183D7F6-B498-43B3-948B-1728B52AA6E4}">
-                <adec:decorative xmlns:adec="http://schemas.microsoft.com/office/drawing/2017/decorative" val="1"/>
-              </a:ext>
-            </a:extLst>
-          </p:cNvPr>
-          <p:cNvSpPr>
-            <a:spLocks noGrp="1" noRot="1" noChangeAspect="1" noMove="1" noResize="1" noEditPoints="1" noAdjustHandles="1" noChangeArrowheads="1" noChangeShapeType="1" noTextEdit="1"/>
-          </p:cNvSpPr>
-          <p:nvPr>
-            <p:extLst>
-              <p:ext uri="{386F3935-93C4-4BCD-93E2-E3B085C9AB24}">
-                <p16:designElem xmlns:p16="http://schemas.microsoft.com/office/powerpoint/2015/main" val="1"/>
-              </p:ext>
-            </p:extLst>
-          </p:nvPr>
-        </p:nvSpPr>
-        <p:spPr>
-          <a:xfrm flipV="1">
-            <a:off x="578652" y="4501201"/>
-            <a:ext cx="11034696" cy="18288"/>
-          </a:xfrm>
-          <a:prstGeom prst="rect">
-            <a:avLst/>
-          </a:prstGeom>
-          <a:solidFill>
-            <a:schemeClr val="tx2">
-              <a:lumMod val="25000"/>
-              <a:lumOff val="75000"/>
-            </a:schemeClr>
-          </a:solidFill>
-          <a:ln w="3175">
-            <a:noFill/>
-          </a:ln>
-          <a:effectLst/>
-        </p:spPr>
-        <p:style>
-          <a:lnRef idx="2">
-            <a:schemeClr val="accent1">
-              <a:shade val="50000"/>
-            </a:schemeClr>
-          </a:lnRef>
-          <a:fillRef idx="1">
-            <a:schemeClr val="accent1"/>
-          </a:fillRef>
-          <a:effectRef idx="0">
-            <a:schemeClr val="accent1"/>
-          </a:effectRef>
-          <a:fontRef idx="minor">
-            <a:schemeClr val="lt1"/>
-          </a:fontRef>
-        </p:style>
-        <p:txBody>
-          <a:bodyPr rtlCol="0" anchor="ctr"/>
-          <a:lstStyle/>
-          <a:p>
-            <a:pPr marL="0" marR="0" lvl="0" indent="0" algn="ctr" defTabSz="914400" rtl="0" eaLnBrk="1" fontAlgn="auto" latinLnBrk="0" hangingPunct="1">
-              <a:lnSpc>
-                <a:spcPct val="100000"/>
-              </a:lnSpc>
-              <a:spcBef>
-                <a:spcPts val="0"/>
-              </a:spcBef>
-              <a:spcAft>
-                <a:spcPts val="0"/>
-              </a:spcAft>
-              <a:buClrTx/>
-              <a:buSzTx/>
-              <a:buFontTx/>
-              <a:buNone/>
-              <a:tabLst/>
-              <a:defRPr/>
-            </a:pPr>
-            <a:endParaRPr kumimoji="0" lang="en-US" sz="1800" b="0" i="0" u="none" strike="noStrike" kern="1200" cap="none" spc="0" normalizeH="0" baseline="0" noProof="0">
-              <a:ln>
-                <a:noFill/>
-              </a:ln>
-              <a:solidFill>
-                <a:prstClr val="white"/>
-              </a:solidFill>
-              <a:effectLst/>
-              <a:uLnTx/>
-              <a:uFillTx/>
-              <a:latin typeface="Calibri" panose="020F0502020204030204"/>
-              <a:ea typeface="+mn-ea"/>
-              <a:cs typeface="+mn-cs"/>
-            </a:endParaRPr>
-          </a:p>
-        </p:txBody>
-      </p:sp>
       <p:sp useBgFill="1">
         <p:nvSpPr>
-          <p:cNvPr id="16" name="Rectangle 15">
+          <p:cNvPr id="42" name="Rectangle 41">
             <a:extLst>
               <a:ext uri="{FF2B5EF4-FFF2-40B4-BE49-F238E27FC236}">
-                <a16:creationId xmlns:a16="http://schemas.microsoft.com/office/drawing/2014/main" id="{5DCB5928-DC7D-4612-9922-441966E15627}"/>
+                <a16:creationId xmlns:a16="http://schemas.microsoft.com/office/drawing/2014/main" id="{49B9E8A9-352D-4DCB-9485-C777000D4979}"/>
               </a:ext>
               <a:ext uri="{C183D7F6-B498-43B3-948B-1728B52AA6E4}">
                 <adec:decorative xmlns:adec="http://schemas.microsoft.com/office/drawing/2017/decorative" val="1"/>
@@ -14880,12 +14691,47 @@
           </a:p>
         </p:txBody>
       </p:sp>
-      <p:sp useBgFill="1">
+      <p:sp>
         <p:nvSpPr>
-          <p:cNvPr id="18" name="Freeform: Shape 17">
+          <p:cNvPr id="2" name="Titolo 1">
             <a:extLst>
               <a:ext uri="{FF2B5EF4-FFF2-40B4-BE49-F238E27FC236}">
-                <a16:creationId xmlns:a16="http://schemas.microsoft.com/office/drawing/2014/main" id="{682C1161-1736-45EC-99B7-33F3CAE9D517}"/>
+                <a16:creationId xmlns:a16="http://schemas.microsoft.com/office/drawing/2014/main" id="{D1426425-3B11-5442-8EFA-C3B8716E30C6}"/>
+              </a:ext>
+            </a:extLst>
+          </p:cNvPr>
+          <p:cNvSpPr>
+            <a:spLocks noGrp="1"/>
+          </p:cNvSpPr>
+          <p:nvPr>
+            <p:ph type="title"/>
+          </p:nvPr>
+        </p:nvSpPr>
+        <p:spPr>
+          <a:xfrm>
+            <a:off x="612648" y="1078992"/>
+            <a:ext cx="6272784" cy="1536192"/>
+          </a:xfrm>
+        </p:spPr>
+        <p:txBody>
+          <a:bodyPr vert="horz" lIns="91440" tIns="45720" rIns="91440" bIns="45720" rtlCol="0" anchor="b">
+            <a:normAutofit/>
+          </a:bodyPr>
+          <a:lstStyle/>
+          <a:p>
+            <a:r>
+              <a:rPr lang="en-US" sz="5200"/>
+              <a:t>Correlazioni tra le variabili</a:t>
+            </a:r>
+          </a:p>
+        </p:txBody>
+      </p:sp>
+      <p:sp>
+        <p:nvSpPr>
+          <p:cNvPr id="44" name="Rectangle 43">
+            <a:extLst>
+              <a:ext uri="{FF2B5EF4-FFF2-40B4-BE49-F238E27FC236}">
+                <a16:creationId xmlns:a16="http://schemas.microsoft.com/office/drawing/2014/main" id="{C2A9B0E5-C2C1-4B85-99A9-117A659D5FE0}"/>
               </a:ext>
               <a:ext uri="{C183D7F6-B498-43B3-948B-1728B52AA6E4}">
                 <adec:decorative xmlns:adec="http://schemas.microsoft.com/office/drawing/2017/decorative" val="1"/>
@@ -14904,100 +14750,19 @@
           </p:nvPr>
         </p:nvSpPr>
         <p:spPr>
-          <a:xfrm>
-            <a:off x="0" y="0"/>
-            <a:ext cx="4959047" cy="6858000"/>
+          <a:xfrm rot="5400000">
+            <a:off x="853202" y="363389"/>
+            <a:ext cx="73152" cy="548640"/>
           </a:xfrm>
-          <a:custGeom>
+          <a:prstGeom prst="rect">
             <a:avLst/>
-            <a:gdLst>
-              <a:gd name="connsiteX0" fmla="*/ 0 w 4959047"/>
-              <a:gd name="connsiteY0" fmla="*/ 0 h 6858000"/>
-              <a:gd name="connsiteX1" fmla="*/ 4110127 w 4959047"/>
-              <a:gd name="connsiteY1" fmla="*/ 0 h 6858000"/>
-              <a:gd name="connsiteX2" fmla="*/ 4179024 w 4959047"/>
-              <a:gd name="connsiteY2" fmla="*/ 123368 h 6858000"/>
-              <a:gd name="connsiteX3" fmla="*/ 4959047 w 4959047"/>
-              <a:gd name="connsiteY3" fmla="*/ 3429000 h 6858000"/>
-              <a:gd name="connsiteX4" fmla="*/ 4179024 w 4959047"/>
-              <a:gd name="connsiteY4" fmla="*/ 6734633 h 6858000"/>
-              <a:gd name="connsiteX5" fmla="*/ 4110127 w 4959047"/>
-              <a:gd name="connsiteY5" fmla="*/ 6858000 h 6858000"/>
-              <a:gd name="connsiteX6" fmla="*/ 0 w 4959047"/>
-              <a:gd name="connsiteY6" fmla="*/ 6858000 h 6858000"/>
-            </a:gdLst>
-            <a:ahLst/>
-            <a:cxnLst>
-              <a:cxn ang="0">
-                <a:pos x="connsiteX0" y="connsiteY0"/>
-              </a:cxn>
-              <a:cxn ang="0">
-                <a:pos x="connsiteX1" y="connsiteY1"/>
-              </a:cxn>
-              <a:cxn ang="0">
-                <a:pos x="connsiteX2" y="connsiteY2"/>
-              </a:cxn>
-              <a:cxn ang="0">
-                <a:pos x="connsiteX3" y="connsiteY3"/>
-              </a:cxn>
-              <a:cxn ang="0">
-                <a:pos x="connsiteX4" y="connsiteY4"/>
-              </a:cxn>
-              <a:cxn ang="0">
-                <a:pos x="connsiteX5" y="connsiteY5"/>
-              </a:cxn>
-              <a:cxn ang="0">
-                <a:pos x="connsiteX6" y="connsiteY6"/>
-              </a:cxn>
-            </a:cxnLst>
-            <a:rect l="l" t="t" r="r" b="b"/>
-            <a:pathLst>
-              <a:path w="4959047" h="6858000">
-                <a:moveTo>
-                  <a:pt x="0" y="0"/>
-                </a:moveTo>
-                <a:lnTo>
-                  <a:pt x="4110127" y="0"/>
-                </a:lnTo>
-                <a:lnTo>
-                  <a:pt x="4179024" y="123368"/>
-                </a:lnTo>
-                <a:cubicBezTo>
-                  <a:pt x="4668929" y="1045156"/>
-                  <a:pt x="4959047" y="2189404"/>
-                  <a:pt x="4959047" y="3429000"/>
-                </a:cubicBezTo>
-                <a:cubicBezTo>
-                  <a:pt x="4959047" y="4668597"/>
-                  <a:pt x="4668929" y="5812845"/>
-                  <a:pt x="4179024" y="6734633"/>
-                </a:cubicBezTo>
-                <a:lnTo>
-                  <a:pt x="4110127" y="6858000"/>
-                </a:lnTo>
-                <a:lnTo>
-                  <a:pt x="0" y="6858000"/>
-                </a:lnTo>
-                <a:close/>
-              </a:path>
-            </a:pathLst>
-          </a:custGeom>
-          <a:ln w="9525">
-            <a:solidFill>
-              <a:schemeClr val="tx2">
-                <a:lumMod val="10000"/>
-                <a:lumOff val="90000"/>
-              </a:schemeClr>
-            </a:solidFill>
+          </a:prstGeom>
+          <a:solidFill>
+            <a:schemeClr val="accent1"/>
+          </a:solidFill>
+          <a:ln>
+            <a:noFill/>
           </a:ln>
-          <a:effectLst>
-            <a:outerShdw blurRad="50800" dist="38100" algn="l" rotWithShape="0">
-              <a:schemeClr val="bg1">
-                <a:lumMod val="85000"/>
-                <a:alpha val="30000"/>
-              </a:schemeClr>
-            </a:outerShdw>
-          </a:effectLst>
         </p:spPr>
         <p:style>
           <a:lnRef idx="2">
@@ -15016,9 +14781,7 @@
           </a:fontRef>
         </p:style>
         <p:txBody>
-          <a:bodyPr wrap="square" rtlCol="0" anchor="ctr">
-            <a:noAutofit/>
-          </a:bodyPr>
+          <a:bodyPr rtlCol="0" anchor="ctr"/>
           <a:lstStyle/>
           <a:p>
             <a:pPr marL="0" marR="0" lvl="0" indent="0" algn="ctr" defTabSz="914400" rtl="0" eaLnBrk="1" fontAlgn="auto" latinLnBrk="0" hangingPunct="1">
@@ -15055,12 +14818,12 @@
           </a:p>
         </p:txBody>
       </p:sp>
-      <p:sp useBgFill="1">
+      <p:sp>
         <p:nvSpPr>
-          <p:cNvPr id="20" name="Freeform: Shape 19">
+          <p:cNvPr id="46" name="Rectangle 45">
             <a:extLst>
               <a:ext uri="{FF2B5EF4-FFF2-40B4-BE49-F238E27FC236}">
-                <a16:creationId xmlns:a16="http://schemas.microsoft.com/office/drawing/2014/main" id="{84D4DDB8-B68F-45B0-9F62-C4279996F672}"/>
+                <a16:creationId xmlns:a16="http://schemas.microsoft.com/office/drawing/2014/main" id="{3A8AEACA-9535-4BE8-A91B-8BE82BA54751}"/>
               </a:ext>
               <a:ext uri="{C183D7F6-B498-43B3-948B-1728B52AA6E4}">
                 <adec:decorative xmlns:adec="http://schemas.microsoft.com/office/drawing/2017/decorative" val="1"/>
@@ -15080,298 +14843,8 @@
         </p:nvSpPr>
         <p:spPr>
           <a:xfrm>
-            <a:off x="0" y="0"/>
-            <a:ext cx="4948887" cy="6858000"/>
-          </a:xfrm>
-          <a:custGeom>
-            <a:avLst/>
-            <a:gdLst>
-              <a:gd name="connsiteX0" fmla="*/ 0 w 4948887"/>
-              <a:gd name="connsiteY0" fmla="*/ 0 h 6858000"/>
-              <a:gd name="connsiteX1" fmla="*/ 4099967 w 4948887"/>
-              <a:gd name="connsiteY1" fmla="*/ 0 h 6858000"/>
-              <a:gd name="connsiteX2" fmla="*/ 4168864 w 4948887"/>
-              <a:gd name="connsiteY2" fmla="*/ 123368 h 6858000"/>
-              <a:gd name="connsiteX3" fmla="*/ 4948887 w 4948887"/>
-              <a:gd name="connsiteY3" fmla="*/ 3429000 h 6858000"/>
-              <a:gd name="connsiteX4" fmla="*/ 4168864 w 4948887"/>
-              <a:gd name="connsiteY4" fmla="*/ 6734633 h 6858000"/>
-              <a:gd name="connsiteX5" fmla="*/ 4099967 w 4948887"/>
-              <a:gd name="connsiteY5" fmla="*/ 6858000 h 6858000"/>
-              <a:gd name="connsiteX6" fmla="*/ 0 w 4948887"/>
-              <a:gd name="connsiteY6" fmla="*/ 6858000 h 6858000"/>
-            </a:gdLst>
-            <a:ahLst/>
-            <a:cxnLst>
-              <a:cxn ang="0">
-                <a:pos x="connsiteX0" y="connsiteY0"/>
-              </a:cxn>
-              <a:cxn ang="0">
-                <a:pos x="connsiteX1" y="connsiteY1"/>
-              </a:cxn>
-              <a:cxn ang="0">
-                <a:pos x="connsiteX2" y="connsiteY2"/>
-              </a:cxn>
-              <a:cxn ang="0">
-                <a:pos x="connsiteX3" y="connsiteY3"/>
-              </a:cxn>
-              <a:cxn ang="0">
-                <a:pos x="connsiteX4" y="connsiteY4"/>
-              </a:cxn>
-              <a:cxn ang="0">
-                <a:pos x="connsiteX5" y="connsiteY5"/>
-              </a:cxn>
-              <a:cxn ang="0">
-                <a:pos x="connsiteX6" y="connsiteY6"/>
-              </a:cxn>
-            </a:cxnLst>
-            <a:rect l="l" t="t" r="r" b="b"/>
-            <a:pathLst>
-              <a:path w="4948887" h="6858000">
-                <a:moveTo>
-                  <a:pt x="0" y="0"/>
-                </a:moveTo>
-                <a:lnTo>
-                  <a:pt x="4099967" y="0"/>
-                </a:lnTo>
-                <a:lnTo>
-                  <a:pt x="4168864" y="123368"/>
-                </a:lnTo>
-                <a:cubicBezTo>
-                  <a:pt x="4658769" y="1045156"/>
-                  <a:pt x="4948887" y="2189404"/>
-                  <a:pt x="4948887" y="3429000"/>
-                </a:cubicBezTo>
-                <a:cubicBezTo>
-                  <a:pt x="4948887" y="4668597"/>
-                  <a:pt x="4658769" y="5812845"/>
-                  <a:pt x="4168864" y="6734633"/>
-                </a:cubicBezTo>
-                <a:lnTo>
-                  <a:pt x="4099967" y="6858000"/>
-                </a:lnTo>
-                <a:lnTo>
-                  <a:pt x="0" y="6858000"/>
-                </a:lnTo>
-                <a:close/>
-              </a:path>
-            </a:pathLst>
-          </a:custGeom>
-          <a:ln w="9525">
-            <a:noFill/>
-          </a:ln>
-          <a:effectLst/>
-        </p:spPr>
-        <p:style>
-          <a:lnRef idx="2">
-            <a:schemeClr val="accent1">
-              <a:shade val="50000"/>
-            </a:schemeClr>
-          </a:lnRef>
-          <a:fillRef idx="1">
-            <a:schemeClr val="accent1"/>
-          </a:fillRef>
-          <a:effectRef idx="0">
-            <a:schemeClr val="accent1"/>
-          </a:effectRef>
-          <a:fontRef idx="minor">
-            <a:schemeClr val="lt1"/>
-          </a:fontRef>
-        </p:style>
-        <p:txBody>
-          <a:bodyPr wrap="square" rtlCol="0" anchor="ctr">
-            <a:noAutofit/>
-          </a:bodyPr>
-          <a:lstStyle/>
-          <a:p>
-            <a:pPr marL="0" marR="0" lvl="0" indent="0" algn="ctr" defTabSz="914400" rtl="0" eaLnBrk="1" fontAlgn="auto" latinLnBrk="0" hangingPunct="1">
-              <a:lnSpc>
-                <a:spcPct val="100000"/>
-              </a:lnSpc>
-              <a:spcBef>
-                <a:spcPts val="0"/>
-              </a:spcBef>
-              <a:spcAft>
-                <a:spcPts val="0"/>
-              </a:spcAft>
-              <a:buClrTx/>
-              <a:buSzTx/>
-              <a:buFontTx/>
-              <a:buNone/>
-              <a:tabLst/>
-              <a:defRPr/>
-            </a:pPr>
-            <a:endParaRPr kumimoji="0" lang="en-US" sz="1800" b="0" i="0" u="none" strike="noStrike" kern="1200" cap="none" spc="0" normalizeH="0" baseline="0" noProof="0">
-              <a:ln>
-                <a:noFill/>
-              </a:ln>
-              <a:solidFill>
-                <a:prstClr val="white"/>
-              </a:solidFill>
-              <a:effectLst/>
-              <a:uLnTx/>
-              <a:uFillTx/>
-              <a:latin typeface="Calibri" panose="020F0502020204030204"/>
-              <a:ea typeface="+mn-ea"/>
-              <a:cs typeface="+mn-cs"/>
-            </a:endParaRPr>
-          </a:p>
-        </p:txBody>
-      </p:sp>
-      <p:sp>
-        <p:nvSpPr>
-          <p:cNvPr id="2" name="Titolo 1">
-            <a:extLst>
-              <a:ext uri="{FF2B5EF4-FFF2-40B4-BE49-F238E27FC236}">
-                <a16:creationId xmlns:a16="http://schemas.microsoft.com/office/drawing/2014/main" id="{D1426425-3B11-5442-8EFA-C3B8716E30C6}"/>
-              </a:ext>
-            </a:extLst>
-          </p:cNvPr>
-          <p:cNvSpPr>
-            <a:spLocks noGrp="1"/>
-          </p:cNvSpPr>
-          <p:nvPr>
-            <p:ph type="title"/>
-          </p:nvPr>
-        </p:nvSpPr>
-        <p:spPr>
-          <a:xfrm>
-            <a:off x="477981" y="1122363"/>
-            <a:ext cx="4023360" cy="3204134"/>
-          </a:xfrm>
-        </p:spPr>
-        <p:txBody>
-          <a:bodyPr vert="horz" lIns="91440" tIns="45720" rIns="91440" bIns="45720" rtlCol="0" anchor="b">
-            <a:normAutofit/>
-          </a:bodyPr>
-          <a:lstStyle/>
-          <a:p>
-            <a:r>
-              <a:rPr lang="en-US" sz="4800"/>
-              <a:t>Correlazioni tra le variabili</a:t>
-            </a:r>
-          </a:p>
-        </p:txBody>
-      </p:sp>
-      <p:sp>
-        <p:nvSpPr>
-          <p:cNvPr id="22" name="Rectangle 21">
-            <a:extLst>
-              <a:ext uri="{FF2B5EF4-FFF2-40B4-BE49-F238E27FC236}">
-                <a16:creationId xmlns:a16="http://schemas.microsoft.com/office/drawing/2014/main" id="{AF2F604E-43BE-4DC3-B983-E071523364F8}"/>
-              </a:ext>
-              <a:ext uri="{C183D7F6-B498-43B3-948B-1728B52AA6E4}">
-                <adec:decorative xmlns:adec="http://schemas.microsoft.com/office/drawing/2017/decorative" val="1"/>
-              </a:ext>
-            </a:extLst>
-          </p:cNvPr>
-          <p:cNvSpPr>
-            <a:spLocks noGrp="1" noRot="1" noChangeAspect="1" noMove="1" noResize="1" noEditPoints="1" noAdjustHandles="1" noChangeArrowheads="1" noChangeShapeType="1" noTextEdit="1"/>
-          </p:cNvSpPr>
-          <p:nvPr>
-            <p:extLst>
-              <p:ext uri="{386F3935-93C4-4BCD-93E2-E3B085C9AB24}">
-                <p16:designElem xmlns:p16="http://schemas.microsoft.com/office/powerpoint/2015/main" val="1"/>
-              </p:ext>
-            </p:extLst>
-          </p:nvPr>
-        </p:nvSpPr>
-        <p:spPr>
-          <a:xfrm rot="5400000">
-            <a:off x="759921" y="346791"/>
-            <a:ext cx="146304" cy="704088"/>
-          </a:xfrm>
-          <a:prstGeom prst="rect">
-            <a:avLst/>
-          </a:prstGeom>
-          <a:solidFill>
-            <a:schemeClr val="accent1"/>
-          </a:solidFill>
-          <a:ln>
-            <a:noFill/>
-          </a:ln>
-        </p:spPr>
-        <p:style>
-          <a:lnRef idx="2">
-            <a:schemeClr val="accent1">
-              <a:shade val="50000"/>
-            </a:schemeClr>
-          </a:lnRef>
-          <a:fillRef idx="1">
-            <a:schemeClr val="accent1"/>
-          </a:fillRef>
-          <a:effectRef idx="0">
-            <a:schemeClr val="accent1"/>
-          </a:effectRef>
-          <a:fontRef idx="minor">
-            <a:schemeClr val="lt1"/>
-          </a:fontRef>
-        </p:style>
-        <p:txBody>
-          <a:bodyPr rtlCol="0" anchor="ctr"/>
-          <a:lstStyle/>
-          <a:p>
-            <a:pPr marL="0" marR="0" lvl="0" indent="0" algn="ctr" defTabSz="914400" rtl="0" eaLnBrk="1" fontAlgn="auto" latinLnBrk="0" hangingPunct="1">
-              <a:lnSpc>
-                <a:spcPct val="100000"/>
-              </a:lnSpc>
-              <a:spcBef>
-                <a:spcPts val="0"/>
-              </a:spcBef>
-              <a:spcAft>
-                <a:spcPts val="0"/>
-              </a:spcAft>
-              <a:buClrTx/>
-              <a:buSzTx/>
-              <a:buFontTx/>
-              <a:buNone/>
-              <a:tabLst/>
-              <a:defRPr/>
-            </a:pPr>
-            <a:endParaRPr kumimoji="0" lang="en-US" sz="1800" b="0" i="0" u="none" strike="noStrike" kern="1200" cap="none" spc="0" normalizeH="0" baseline="0" noProof="0">
-              <a:ln>
-                <a:noFill/>
-              </a:ln>
-              <a:solidFill>
-                <a:prstClr val="white"/>
-              </a:solidFill>
-              <a:effectLst/>
-              <a:uLnTx/>
-              <a:uFillTx/>
-              <a:latin typeface="Calibri" panose="020F0502020204030204"/>
-              <a:ea typeface="+mn-ea"/>
-              <a:cs typeface="+mn-cs"/>
-            </a:endParaRPr>
-          </a:p>
-        </p:txBody>
-      </p:sp>
-      <p:sp>
-        <p:nvSpPr>
-          <p:cNvPr id="24" name="Rectangle 23">
-            <a:extLst>
-              <a:ext uri="{FF2B5EF4-FFF2-40B4-BE49-F238E27FC236}">
-                <a16:creationId xmlns:a16="http://schemas.microsoft.com/office/drawing/2014/main" id="{08C9B587-E65E-4B52-B37C-ABEBB6E87928}"/>
-              </a:ext>
-              <a:ext uri="{C183D7F6-B498-43B3-948B-1728B52AA6E4}">
-                <adec:decorative xmlns:adec="http://schemas.microsoft.com/office/drawing/2017/decorative" val="1"/>
-              </a:ext>
-            </a:extLst>
-          </p:cNvPr>
-          <p:cNvSpPr>
-            <a:spLocks noGrp="1" noRot="1" noChangeAspect="1" noMove="1" noResize="1" noEditPoints="1" noAdjustHandles="1" noChangeArrowheads="1" noChangeShapeType="1" noTextEdit="1"/>
-          </p:cNvSpPr>
-          <p:nvPr>
-            <p:extLst>
-              <p:ext uri="{386F3935-93C4-4BCD-93E2-E3B085C9AB24}">
-                <p16:designElem xmlns:p16="http://schemas.microsoft.com/office/powerpoint/2015/main" val="1"/>
-              </p:ext>
-            </p:extLst>
-          </p:nvPr>
-        </p:nvSpPr>
-        <p:spPr>
-          <a:xfrm>
-            <a:off x="481029" y="4546920"/>
-            <a:ext cx="4023360" cy="18288"/>
+            <a:off x="618506" y="2935541"/>
+            <a:ext cx="6217920" cy="18288"/>
           </a:xfrm>
           <a:prstGeom prst="rect">
             <a:avLst/>
@@ -15443,30 +14916,97 @@
       </p:sp>
       <p:pic>
         <p:nvPicPr>
-          <p:cNvPr id="7" name="Segnaposto contenuto 6" descr="Immagine che contiene sedendo, fotografia, diverso, libro&#10;&#10;Descrizione generata automaticamente">
+          <p:cNvPr id="6" name="Segnaposto contenuto 5">
             <a:extLst>
               <a:ext uri="{FF2B5EF4-FFF2-40B4-BE49-F238E27FC236}">
-                <a16:creationId xmlns:a16="http://schemas.microsoft.com/office/drawing/2014/main" id="{B4748CEA-C40F-844B-A572-743484FA4CD5}"/>
+                <a16:creationId xmlns:a16="http://schemas.microsoft.com/office/drawing/2014/main" id="{CB279390-043A-4048-A982-CBC81BDA1CD0}"/>
               </a:ext>
             </a:extLst>
           </p:cNvPr>
           <p:cNvPicPr>
-            <a:picLocks noGrp="1" noChangeAspect="1"/>
+            <a:picLocks noChangeAspect="1"/>
           </p:cNvPicPr>
+          <p:nvPr/>
+        </p:nvPicPr>
+        <p:blipFill>
+          <a:blip r:embed="rId2"/>
+          <a:srcRect/>
+          <a:stretch/>
+        </p:blipFill>
+        <p:spPr>
+          <a:xfrm>
+            <a:off x="7683335" y="334094"/>
+            <a:ext cx="3735353" cy="2829074"/>
+          </a:xfrm>
+          <a:prstGeom prst="rect">
+            <a:avLst/>
+          </a:prstGeom>
+        </p:spPr>
+      </p:pic>
+      <p:sp>
+        <p:nvSpPr>
+          <p:cNvPr id="39" name="Content Placeholder 38">
+            <a:extLst>
+              <a:ext uri="{FF2B5EF4-FFF2-40B4-BE49-F238E27FC236}">
+                <a16:creationId xmlns:a16="http://schemas.microsoft.com/office/drawing/2014/main" id="{9EFC8B14-E05D-4FB3-AB43-0B91D126197B}"/>
+              </a:ext>
+            </a:extLst>
+          </p:cNvPr>
+          <p:cNvSpPr>
+            <a:spLocks noGrp="1"/>
+          </p:cNvSpPr>
           <p:nvPr>
             <p:ph idx="1"/>
           </p:nvPr>
+        </p:nvSpPr>
+        <p:spPr>
+          <a:xfrm>
+            <a:off x="612648" y="3355848"/>
+            <a:ext cx="6272784" cy="2825496"/>
+          </a:xfrm>
+        </p:spPr>
+        <p:txBody>
+          <a:bodyPr>
+            <a:normAutofit/>
+          </a:bodyPr>
+          <a:lstStyle/>
+          <a:p>
+            <a:r>
+              <a:rPr lang="it-IT" sz="1800"/>
+              <a:t>Nella prima intuitività ha un peso minore sulla valutazione totale.</a:t>
+            </a:r>
+          </a:p>
+          <a:p>
+            <a:r>
+              <a:rPr lang="it-IT" sz="1800"/>
+              <a:t>Nella seconda ciò che ha peso minore sul totale è la utilità.</a:t>
+            </a:r>
+          </a:p>
+        </p:txBody>
+      </p:sp>
+      <p:pic>
+        <p:nvPicPr>
+          <p:cNvPr id="7" name="Segnaposto contenuto 6">
+            <a:extLst>
+              <a:ext uri="{FF2B5EF4-FFF2-40B4-BE49-F238E27FC236}">
+                <a16:creationId xmlns:a16="http://schemas.microsoft.com/office/drawing/2014/main" id="{B4748CEA-C40F-844B-A572-743484FA4CD5}"/>
+              </a:ext>
+            </a:extLst>
+          </p:cNvPr>
+          <p:cNvPicPr>
+            <a:picLocks noChangeAspect="1"/>
+          </p:cNvPicPr>
+          <p:nvPr/>
         </p:nvPicPr>
         <p:blipFill>
-          <a:blip r:embed="rId2"/>
-          <a:stretch>
-            <a:fillRect/>
-          </a:stretch>
+          <a:blip r:embed="rId3"/>
+          <a:srcRect/>
+          <a:stretch/>
         </p:blipFill>
         <p:spPr>
           <a:xfrm>
-            <a:off x="5501415" y="625684"/>
-            <a:ext cx="6234718" cy="5455380"/>
+            <a:off x="7683335" y="3346613"/>
+            <a:ext cx="3735353" cy="2829074"/>
           </a:xfrm>
           <a:prstGeom prst="rect">
             <a:avLst/>
@@ -15491,17 +15031,17 @@
         </p:nvSpPr>
         <p:spPr>
           <a:xfrm>
-            <a:off x="5418374" y="6356350"/>
-            <a:ext cx="4114800" cy="365125"/>
+            <a:off x="2404871" y="6356350"/>
+            <a:ext cx="4480561" cy="365125"/>
           </a:xfrm>
         </p:spPr>
         <p:txBody>
-          <a:bodyPr vert="horz" lIns="91440" tIns="45720" rIns="91440" bIns="45720" rtlCol="0" anchor="ctr">
+          <a:bodyPr vert="horz" lIns="91440" tIns="45720" rIns="91440" bIns="45720" rtlCol="0">
             <a:normAutofit/>
           </a:bodyPr>
           <a:lstStyle/>
           <a:p>
-            <a:pPr algn="l">
+            <a:pPr algn="r">
               <a:spcAft>
                 <a:spcPts val="600"/>
               </a:spcAft>
@@ -15541,12 +15081,12 @@
         </p:nvSpPr>
         <p:spPr>
           <a:xfrm>
-            <a:off x="9847810" y="6356350"/>
-            <a:ext cx="1505989" cy="365125"/>
+            <a:off x="8811769" y="6356350"/>
+            <a:ext cx="2743200" cy="365125"/>
           </a:xfrm>
         </p:spPr>
         <p:txBody>
-          <a:bodyPr vert="horz" lIns="91440" tIns="45720" rIns="91440" bIns="45720" rtlCol="0" anchor="ctr">
+          <a:bodyPr vert="horz" lIns="91440" tIns="45720" rIns="91440" bIns="45720" rtlCol="0">
             <a:normAutofit/>
           </a:bodyPr>
           <a:lstStyle/>
@@ -18025,7 +17565,38 @@
           <a:bodyPr/>
           <a:lstStyle/>
           <a:p>
-            <a:endParaRPr lang="it-IT" dirty="0"/>
+            <a:r>
+              <a:rPr lang="it-IT" dirty="0"/>
+              <a:t>Dati estratti da OurWorldInData</a:t>
+            </a:r>
+          </a:p>
+          <a:p>
+            <a:r>
+              <a:rPr lang="it-IT" dirty="0"/>
+              <a:t>Estratte solo le </a:t>
+            </a:r>
+            <a:r>
+              <a:rPr lang="it-IT" dirty="0" err="1"/>
+              <a:t>feature</a:t>
+            </a:r>
+            <a:r>
+              <a:rPr lang="it-IT" dirty="0"/>
+              <a:t> di interesse.</a:t>
+            </a:r>
+          </a:p>
+          <a:p>
+            <a:r>
+              <a:rPr lang="it-IT" dirty="0"/>
+              <a:t>Pulizia dei </a:t>
+            </a:r>
+            <a:r>
+              <a:rPr lang="it-IT" dirty="0" err="1"/>
+              <a:t>NaN</a:t>
+            </a:r>
+            <a:r>
+              <a:rPr lang="it-IT" dirty="0"/>
+              <a:t>.</a:t>
+            </a:r>
           </a:p>
         </p:txBody>
       </p:sp>

</xml_diff>

<commit_message>
Presentation still missing quality plot
</commit_message>
<xml_diff>
--- a/presentazione/presentazione.pptx
+++ b/presentazione/presentazione.pptx
@@ -155,785 +155,25 @@
 <file path=ppt/revisionInfo.xml><?xml version="1.0" encoding="utf-8"?>
 <p1510:revInfo xmlns:a="http://schemas.openxmlformats.org/drawingml/2006/main" xmlns:r="http://schemas.openxmlformats.org/officeDocument/2006/relationships" xmlns:p1510="http://schemas.microsoft.com/office/powerpoint/2015/10/main">
   <p1510:revLst>
+    <p1510:client id="{170B663B-9C9C-7D3A-5B0D-D3E165EA36EE}" v="449" dt="2020-06-16T13:06:53.371"/>
     <p1510:client id="{B4F6B79A-B345-4920-B6B6-1EDAE3CCB1E2}" v="80" dt="2020-06-13T14:21:05.077"/>
     <p1510:client id="{CD7FD6AF-7702-F390-A6CA-78493A1498FC}" v="665" dt="2020-06-13T15:15:00.332"/>
   </p1510:revLst>
 </p1510:revInfo>
 </file>
 
-<file path=ppt/changesInfos/changesInfo1.xml><?xml version="1.0" encoding="utf-8"?>
-<pc:chgInfo xmlns:a="http://schemas.openxmlformats.org/drawingml/2006/main" xmlns:r="http://schemas.openxmlformats.org/officeDocument/2006/relationships" xmlns:ac="http://schemas.microsoft.com/office/drawing/2013/main/command" xmlns:pc="http://schemas.microsoft.com/office/powerpoint/2013/main/command">
-  <pc:docChgLst>
-    <pc:chgData name="m.peracchi1@campus.unimib.it" userId="S::m.peracchi1@campus.unimib.it::17a51f64-c708-42b6-b317-b6230ee102c3" providerId="AD" clId="Web-{CD7FD6AF-7702-F390-A6CA-78493A1498FC}"/>
-    <pc:docChg chg="modSld">
-      <pc:chgData name="m.peracchi1@campus.unimib.it" userId="S::m.peracchi1@campus.unimib.it::17a51f64-c708-42b6-b317-b6230ee102c3" providerId="AD" clId="Web-{CD7FD6AF-7702-F390-A6CA-78493A1498FC}" dt="2020-06-13T15:16:49.621" v="652"/>
-      <pc:docMkLst>
-        <pc:docMk/>
-      </pc:docMkLst>
-      <pc:sldChg chg="addSp delSp modSp mod modClrScheme delDesignElem chgLayout">
-        <pc:chgData name="m.peracchi1@campus.unimib.it" userId="S::m.peracchi1@campus.unimib.it::17a51f64-c708-42b6-b317-b6230ee102c3" providerId="AD" clId="Web-{CD7FD6AF-7702-F390-A6CA-78493A1498FC}" dt="2020-06-13T14:35:04.199" v="139" actId="1076"/>
-        <pc:sldMkLst>
-          <pc:docMk/>
-          <pc:sldMk cId="970307074" sldId="257"/>
-        </pc:sldMkLst>
-        <pc:spChg chg="mod ord">
-          <ac:chgData name="m.peracchi1@campus.unimib.it" userId="S::m.peracchi1@campus.unimib.it::17a51f64-c708-42b6-b317-b6230ee102c3" providerId="AD" clId="Web-{CD7FD6AF-7702-F390-A6CA-78493A1498FC}" dt="2020-06-13T14:35:04.199" v="139" actId="1076"/>
-          <ac:spMkLst>
-            <pc:docMk/>
-            <pc:sldMk cId="970307074" sldId="257"/>
-            <ac:spMk id="2" creationId="{6FE05FC1-FB38-AF4E-80BC-A57908209CF0}"/>
-          </ac:spMkLst>
-        </pc:spChg>
-        <pc:spChg chg="del">
-          <ac:chgData name="m.peracchi1@campus.unimib.it" userId="S::m.peracchi1@campus.unimib.it::17a51f64-c708-42b6-b317-b6230ee102c3" providerId="AD" clId="Web-{CD7FD6AF-7702-F390-A6CA-78493A1498FC}" dt="2020-06-13T14:24:19.124" v="27"/>
-          <ac:spMkLst>
-            <pc:docMk/>
-            <pc:sldMk cId="970307074" sldId="257"/>
-            <ac:spMk id="3" creationId="{973D395C-7E87-3B45-80CC-F7C4DF406E0C}"/>
-          </ac:spMkLst>
-        </pc:spChg>
-        <pc:spChg chg="mod ord">
-          <ac:chgData name="m.peracchi1@campus.unimib.it" userId="S::m.peracchi1@campus.unimib.it::17a51f64-c708-42b6-b317-b6230ee102c3" providerId="AD" clId="Web-{CD7FD6AF-7702-F390-A6CA-78493A1498FC}" dt="2020-06-13T14:28:40.423" v="79"/>
-          <ac:spMkLst>
-            <pc:docMk/>
-            <pc:sldMk cId="970307074" sldId="257"/>
-            <ac:spMk id="4" creationId="{D994DCFE-5FB1-674A-B4C5-D070FD18D273}"/>
-          </ac:spMkLst>
-        </pc:spChg>
-        <pc:spChg chg="mod">
-          <ac:chgData name="m.peracchi1@campus.unimib.it" userId="S::m.peracchi1@campus.unimib.it::17a51f64-c708-42b6-b317-b6230ee102c3" providerId="AD" clId="Web-{CD7FD6AF-7702-F390-A6CA-78493A1498FC}" dt="2020-06-13T14:34:34.135" v="136" actId="1076"/>
-          <ac:spMkLst>
-            <pc:docMk/>
-            <pc:sldMk cId="970307074" sldId="257"/>
-            <ac:spMk id="5" creationId="{EE310572-4DEF-44E7-9AE7-C09B0C9237D8}"/>
-          </ac:spMkLst>
-        </pc:spChg>
-        <pc:spChg chg="mod ord">
-          <ac:chgData name="m.peracchi1@campus.unimib.it" userId="S::m.peracchi1@campus.unimib.it::17a51f64-c708-42b6-b317-b6230ee102c3" providerId="AD" clId="Web-{CD7FD6AF-7702-F390-A6CA-78493A1498FC}" dt="2020-06-13T14:28:40.423" v="79"/>
-          <ac:spMkLst>
-            <pc:docMk/>
-            <pc:sldMk cId="970307074" sldId="257"/>
-            <ac:spMk id="6" creationId="{864441BA-5D87-4F4E-91C8-08298B574B81}"/>
-          </ac:spMkLst>
-        </pc:spChg>
-        <pc:spChg chg="add del mod">
-          <ac:chgData name="m.peracchi1@campus.unimib.it" userId="S::m.peracchi1@campus.unimib.it::17a51f64-c708-42b6-b317-b6230ee102c3" providerId="AD" clId="Web-{CD7FD6AF-7702-F390-A6CA-78493A1498FC}" dt="2020-06-13T14:34:07.101" v="133"/>
-          <ac:spMkLst>
-            <pc:docMk/>
-            <pc:sldMk cId="970307074" sldId="257"/>
-            <ac:spMk id="8" creationId="{66A6E082-D385-4E8B-A17A-8AE3B2F26878}"/>
-          </ac:spMkLst>
-        </pc:spChg>
-        <pc:spChg chg="add mod">
-          <ac:chgData name="m.peracchi1@campus.unimib.it" userId="S::m.peracchi1@campus.unimib.it::17a51f64-c708-42b6-b317-b6230ee102c3" providerId="AD" clId="Web-{CD7FD6AF-7702-F390-A6CA-78493A1498FC}" dt="2020-06-13T14:34:46.604" v="137" actId="1076"/>
-          <ac:spMkLst>
-            <pc:docMk/>
-            <pc:sldMk cId="970307074" sldId="257"/>
-            <ac:spMk id="9" creationId="{8235DDC0-C38E-4F29-8456-6014CDC56B13}"/>
-          </ac:spMkLst>
-        </pc:spChg>
-        <pc:spChg chg="add mod">
-          <ac:chgData name="m.peracchi1@campus.unimib.it" userId="S::m.peracchi1@campus.unimib.it::17a51f64-c708-42b6-b317-b6230ee102c3" providerId="AD" clId="Web-{CD7FD6AF-7702-F390-A6CA-78493A1498FC}" dt="2020-06-13T14:34:20.399" v="135" actId="1076"/>
-          <ac:spMkLst>
-            <pc:docMk/>
-            <pc:sldMk cId="970307074" sldId="257"/>
-            <ac:spMk id="10" creationId="{1F983428-BAB0-4F55-9ADC-978BDBCAA263}"/>
-          </ac:spMkLst>
-        </pc:spChg>
-        <pc:spChg chg="add mod">
-          <ac:chgData name="m.peracchi1@campus.unimib.it" userId="S::m.peracchi1@campus.unimib.it::17a51f64-c708-42b6-b317-b6230ee102c3" providerId="AD" clId="Web-{CD7FD6AF-7702-F390-A6CA-78493A1498FC}" dt="2020-06-13T14:34:14.321" v="134" actId="1076"/>
-          <ac:spMkLst>
-            <pc:docMk/>
-            <pc:sldMk cId="970307074" sldId="257"/>
-            <ac:spMk id="11" creationId="{0180ABEB-B87E-478A-A7B1-5B48C46CD42D}"/>
-          </ac:spMkLst>
-        </pc:spChg>
-        <pc:spChg chg="add del">
-          <ac:chgData name="m.peracchi1@campus.unimib.it" userId="S::m.peracchi1@campus.unimib.it::17a51f64-c708-42b6-b317-b6230ee102c3" providerId="AD" clId="Web-{CD7FD6AF-7702-F390-A6CA-78493A1498FC}" dt="2020-06-13T14:28:40.423" v="79"/>
-          <ac:spMkLst>
-            <pc:docMk/>
-            <pc:sldMk cId="970307074" sldId="257"/>
-            <ac:spMk id="15" creationId="{3F736409-6C07-4CE8-86F8-1174E2235C2E}"/>
-          </ac:spMkLst>
-        </pc:spChg>
-        <pc:spChg chg="add del">
-          <ac:chgData name="m.peracchi1@campus.unimib.it" userId="S::m.peracchi1@campus.unimib.it::17a51f64-c708-42b6-b317-b6230ee102c3" providerId="AD" clId="Web-{CD7FD6AF-7702-F390-A6CA-78493A1498FC}" dt="2020-06-13T14:28:40.423" v="79"/>
-          <ac:spMkLst>
-            <pc:docMk/>
-            <pc:sldMk cId="970307074" sldId="257"/>
-            <ac:spMk id="16" creationId="{72C7A71F-A746-4AB2-8FF5-03D4135FAFAD}"/>
-          </ac:spMkLst>
-        </pc:spChg>
-        <pc:spChg chg="add del">
-          <ac:chgData name="m.peracchi1@campus.unimib.it" userId="S::m.peracchi1@campus.unimib.it::17a51f64-c708-42b6-b317-b6230ee102c3" providerId="AD" clId="Web-{CD7FD6AF-7702-F390-A6CA-78493A1498FC}" dt="2020-06-13T14:28:40.423" v="79"/>
-          <ac:spMkLst>
-            <pc:docMk/>
-            <pc:sldMk cId="970307074" sldId="257"/>
-            <ac:spMk id="17" creationId="{17FF8914-DDE9-46F8-AF0A-54FD0AC09BEE}"/>
-          </ac:spMkLst>
-        </pc:spChg>
-        <pc:spChg chg="add del">
-          <ac:chgData name="m.peracchi1@campus.unimib.it" userId="S::m.peracchi1@campus.unimib.it::17a51f64-c708-42b6-b317-b6230ee102c3" providerId="AD" clId="Web-{CD7FD6AF-7702-F390-A6CA-78493A1498FC}" dt="2020-06-13T14:28:40.423" v="79"/>
-          <ac:spMkLst>
-            <pc:docMk/>
-            <pc:sldMk cId="970307074" sldId="257"/>
-            <ac:spMk id="18" creationId="{094C1DE0-31FE-4AD0-95EA-B65CA6B89D58}"/>
-          </ac:spMkLst>
-        </pc:spChg>
-      </pc:sldChg>
-      <pc:sldChg chg="modSp">
-        <pc:chgData name="m.peracchi1@campus.unimib.it" userId="S::m.peracchi1@campus.unimib.it::17a51f64-c708-42b6-b317-b6230ee102c3" providerId="AD" clId="Web-{CD7FD6AF-7702-F390-A6CA-78493A1498FC}" dt="2020-06-13T14:45:50.431" v="274"/>
-        <pc:sldMkLst>
-          <pc:docMk/>
-          <pc:sldMk cId="2151732933" sldId="258"/>
-        </pc:sldMkLst>
-        <pc:spChg chg="mod">
-          <ac:chgData name="m.peracchi1@campus.unimib.it" userId="S::m.peracchi1@campus.unimib.it::17a51f64-c708-42b6-b317-b6230ee102c3" providerId="AD" clId="Web-{CD7FD6AF-7702-F390-A6CA-78493A1498FC}" dt="2020-06-13T14:45:50.431" v="274"/>
-          <ac:spMkLst>
-            <pc:docMk/>
-            <pc:sldMk cId="2151732933" sldId="258"/>
-            <ac:spMk id="2" creationId="{FAC89828-CB60-7341-8D05-8A980854106D}"/>
-          </ac:spMkLst>
-        </pc:spChg>
-        <pc:spChg chg="mod">
-          <ac:chgData name="m.peracchi1@campus.unimib.it" userId="S::m.peracchi1@campus.unimib.it::17a51f64-c708-42b6-b317-b6230ee102c3" providerId="AD" clId="Web-{CD7FD6AF-7702-F390-A6CA-78493A1498FC}" dt="2020-06-13T14:30:58.807" v="112" actId="20577"/>
-          <ac:spMkLst>
-            <pc:docMk/>
-            <pc:sldMk cId="2151732933" sldId="258"/>
-            <ac:spMk id="4" creationId="{8941C827-C36D-E34E-9D1F-FEE17FAB62BF}"/>
-          </ac:spMkLst>
-        </pc:spChg>
-        <pc:spChg chg="mod">
-          <ac:chgData name="m.peracchi1@campus.unimib.it" userId="S::m.peracchi1@campus.unimib.it::17a51f64-c708-42b6-b317-b6230ee102c3" providerId="AD" clId="Web-{CD7FD6AF-7702-F390-A6CA-78493A1498FC}" dt="2020-06-13T14:32:27.423" v="125"/>
-          <ac:spMkLst>
-            <pc:docMk/>
-            <pc:sldMk cId="2151732933" sldId="258"/>
-            <ac:spMk id="5" creationId="{7EAAC7F2-FC4E-EF48-B1FD-53BC9BCFBDA2}"/>
-          </ac:spMkLst>
-        </pc:spChg>
-        <pc:spChg chg="mod">
-          <ac:chgData name="m.peracchi1@campus.unimib.it" userId="S::m.peracchi1@campus.unimib.it::17a51f64-c708-42b6-b317-b6230ee102c3" providerId="AD" clId="Web-{CD7FD6AF-7702-F390-A6CA-78493A1498FC}" dt="2020-06-13T14:32:45.408" v="126" actId="20577"/>
-          <ac:spMkLst>
-            <pc:docMk/>
-            <pc:sldMk cId="2151732933" sldId="258"/>
-            <ac:spMk id="6" creationId="{F3FEC3C0-6ADA-584C-9B03-9AFD48D01A5E}"/>
-          </ac:spMkLst>
-        </pc:spChg>
-      </pc:sldChg>
-      <pc:sldChg chg="modSp">
-        <pc:chgData name="m.peracchi1@campus.unimib.it" userId="S::m.peracchi1@campus.unimib.it::17a51f64-c708-42b6-b317-b6230ee102c3" providerId="AD" clId="Web-{CD7FD6AF-7702-F390-A6CA-78493A1498FC}" dt="2020-06-13T14:45:57.931" v="275"/>
-        <pc:sldMkLst>
-          <pc:docMk/>
-          <pc:sldMk cId="949629374" sldId="259"/>
-        </pc:sldMkLst>
-        <pc:spChg chg="mod">
-          <ac:chgData name="m.peracchi1@campus.unimib.it" userId="S::m.peracchi1@campus.unimib.it::17a51f64-c708-42b6-b317-b6230ee102c3" providerId="AD" clId="Web-{CD7FD6AF-7702-F390-A6CA-78493A1498FC}" dt="2020-06-13T14:45:57.931" v="275"/>
-          <ac:spMkLst>
-            <pc:docMk/>
-            <pc:sldMk cId="949629374" sldId="259"/>
-            <ac:spMk id="2" creationId="{4FF3D5D2-86B7-3A4D-8483-D22F70E7A4EF}"/>
-          </ac:spMkLst>
-        </pc:spChg>
-        <pc:spChg chg="mod">
-          <ac:chgData name="m.peracchi1@campus.unimib.it" userId="S::m.peracchi1@campus.unimib.it::17a51f64-c708-42b6-b317-b6230ee102c3" providerId="AD" clId="Web-{CD7FD6AF-7702-F390-A6CA-78493A1498FC}" dt="2020-06-13T14:37:16.583" v="144" actId="20577"/>
-          <ac:spMkLst>
-            <pc:docMk/>
-            <pc:sldMk cId="949629374" sldId="259"/>
-            <ac:spMk id="10" creationId="{90262F94-FA75-4E1D-8C8D-ED618E307D8F}"/>
-          </ac:spMkLst>
-        </pc:spChg>
-      </pc:sldChg>
-      <pc:sldChg chg="modSp">
-        <pc:chgData name="m.peracchi1@campus.unimib.it" userId="S::m.peracchi1@campus.unimib.it::17a51f64-c708-42b6-b317-b6230ee102c3" providerId="AD" clId="Web-{CD7FD6AF-7702-F390-A6CA-78493A1498FC}" dt="2020-06-13T15:08:16.711" v="480"/>
-        <pc:sldMkLst>
-          <pc:docMk/>
-          <pc:sldMk cId="2149897601" sldId="260"/>
-        </pc:sldMkLst>
-        <pc:spChg chg="mod">
-          <ac:chgData name="m.peracchi1@campus.unimib.it" userId="S::m.peracchi1@campus.unimib.it::17a51f64-c708-42b6-b317-b6230ee102c3" providerId="AD" clId="Web-{CD7FD6AF-7702-F390-A6CA-78493A1498FC}" dt="2020-06-13T15:08:16.711" v="480"/>
-          <ac:spMkLst>
-            <pc:docMk/>
-            <pc:sldMk cId="2149897601" sldId="260"/>
-            <ac:spMk id="2" creationId="{28E761E0-40EF-5340-A122-3C24CF3EC5B8}"/>
-          </ac:spMkLst>
-        </pc:spChg>
-      </pc:sldChg>
-      <pc:sldChg chg="addSp modSp">
-        <pc:chgData name="m.peracchi1@campus.unimib.it" userId="S::m.peracchi1@campus.unimib.it::17a51f64-c708-42b6-b317-b6230ee102c3" providerId="AD" clId="Web-{CD7FD6AF-7702-F390-A6CA-78493A1498FC}" dt="2020-06-13T14:48:35.676" v="302" actId="1076"/>
-        <pc:sldMkLst>
-          <pc:docMk/>
-          <pc:sldMk cId="149751173" sldId="261"/>
-        </pc:sldMkLst>
-        <pc:spChg chg="mod">
-          <ac:chgData name="m.peracchi1@campus.unimib.it" userId="S::m.peracchi1@campus.unimib.it::17a51f64-c708-42b6-b317-b6230ee102c3" providerId="AD" clId="Web-{CD7FD6AF-7702-F390-A6CA-78493A1498FC}" dt="2020-06-13T14:48:13.503" v="298" actId="1076"/>
-          <ac:spMkLst>
-            <pc:docMk/>
-            <pc:sldMk cId="149751173" sldId="261"/>
-            <ac:spMk id="2" creationId="{14EB0388-1EBA-2940-AAAA-D1505BE8CE15}"/>
-          </ac:spMkLst>
-        </pc:spChg>
-        <pc:spChg chg="add mod">
-          <ac:chgData name="m.peracchi1@campus.unimib.it" userId="S::m.peracchi1@campus.unimib.it::17a51f64-c708-42b6-b317-b6230ee102c3" providerId="AD" clId="Web-{CD7FD6AF-7702-F390-A6CA-78493A1498FC}" dt="2020-06-13T14:48:35.676" v="302" actId="1076"/>
-          <ac:spMkLst>
-            <pc:docMk/>
-            <pc:sldMk cId="149751173" sldId="261"/>
-            <ac:spMk id="3" creationId="{88318349-9801-4835-8416-FCF2AD7CE57C}"/>
-          </ac:spMkLst>
-        </pc:spChg>
-        <pc:spChg chg="mod">
-          <ac:chgData name="m.peracchi1@campus.unimib.it" userId="S::m.peracchi1@campus.unimib.it::17a51f64-c708-42b6-b317-b6230ee102c3" providerId="AD" clId="Web-{CD7FD6AF-7702-F390-A6CA-78493A1498FC}" dt="2020-06-13T14:45:29.117" v="273"/>
-          <ac:spMkLst>
-            <pc:docMk/>
-            <pc:sldMk cId="149751173" sldId="261"/>
-            <ac:spMk id="10" creationId="{4813104C-51AE-4743-A8CA-CD727C96A7DC}"/>
-          </ac:spMkLst>
-        </pc:spChg>
-      </pc:sldChg>
-      <pc:sldChg chg="addSp delSp modSp mod setBg">
-        <pc:chgData name="m.peracchi1@campus.unimib.it" userId="S::m.peracchi1@campus.unimib.it::17a51f64-c708-42b6-b317-b6230ee102c3" providerId="AD" clId="Web-{CD7FD6AF-7702-F390-A6CA-78493A1498FC}" dt="2020-06-13T15:05:33.434" v="457" actId="1076"/>
-        <pc:sldMkLst>
-          <pc:docMk/>
-          <pc:sldMk cId="3610044695" sldId="262"/>
-        </pc:sldMkLst>
-        <pc:spChg chg="mod">
-          <ac:chgData name="m.peracchi1@campus.unimib.it" userId="S::m.peracchi1@campus.unimib.it::17a51f64-c708-42b6-b317-b6230ee102c3" providerId="AD" clId="Web-{CD7FD6AF-7702-F390-A6CA-78493A1498FC}" dt="2020-06-13T14:56:26.599" v="366" actId="14100"/>
-          <ac:spMkLst>
-            <pc:docMk/>
-            <pc:sldMk cId="3610044695" sldId="262"/>
-            <ac:spMk id="2" creationId="{7CCFD3DA-D7C9-5E45-A37E-3369BDF740EE}"/>
-          </ac:spMkLst>
-        </pc:spChg>
-        <pc:spChg chg="del">
-          <ac:chgData name="m.peracchi1@campus.unimib.it" userId="S::m.peracchi1@campus.unimib.it::17a51f64-c708-42b6-b317-b6230ee102c3" providerId="AD" clId="Web-{CD7FD6AF-7702-F390-A6CA-78493A1498FC}" dt="2020-06-13T14:42:58.950" v="267"/>
-          <ac:spMkLst>
-            <pc:docMk/>
-            <pc:sldMk cId="3610044695" sldId="262"/>
-            <ac:spMk id="3" creationId="{A0B6B1AE-CA03-334D-9B46-AAC2300B92C7}"/>
-          </ac:spMkLst>
-        </pc:spChg>
-        <pc:spChg chg="mod">
-          <ac:chgData name="m.peracchi1@campus.unimib.it" userId="S::m.peracchi1@campus.unimib.it::17a51f64-c708-42b6-b317-b6230ee102c3" providerId="AD" clId="Web-{CD7FD6AF-7702-F390-A6CA-78493A1498FC}" dt="2020-06-13T14:56:10.817" v="364"/>
-          <ac:spMkLst>
-            <pc:docMk/>
-            <pc:sldMk cId="3610044695" sldId="262"/>
-            <ac:spMk id="4" creationId="{304E178B-EDAA-ED40-9A9D-C55739D9DB86}"/>
-          </ac:spMkLst>
-        </pc:spChg>
-        <pc:spChg chg="mod">
-          <ac:chgData name="m.peracchi1@campus.unimib.it" userId="S::m.peracchi1@campus.unimib.it::17a51f64-c708-42b6-b317-b6230ee102c3" providerId="AD" clId="Web-{CD7FD6AF-7702-F390-A6CA-78493A1498FC}" dt="2020-06-13T14:56:10.817" v="364"/>
-          <ac:spMkLst>
-            <pc:docMk/>
-            <pc:sldMk cId="3610044695" sldId="262"/>
-            <ac:spMk id="5" creationId="{4B025BED-AF01-9D40-8542-22AD47E5534B}"/>
-          </ac:spMkLst>
-        </pc:spChg>
-        <pc:spChg chg="add mod ord">
-          <ac:chgData name="m.peracchi1@campus.unimib.it" userId="S::m.peracchi1@campus.unimib.it::17a51f64-c708-42b6-b317-b6230ee102c3" providerId="AD" clId="Web-{CD7FD6AF-7702-F390-A6CA-78493A1498FC}" dt="2020-06-13T15:05:20.621" v="456" actId="1076"/>
-          <ac:spMkLst>
-            <pc:docMk/>
-            <pc:sldMk cId="3610044695" sldId="262"/>
-            <ac:spMk id="6" creationId="{7A949D2B-766C-4210-AA11-645BFBBE0609}"/>
-          </ac:spMkLst>
-        </pc:spChg>
-        <pc:spChg chg="add mod">
-          <ac:chgData name="m.peracchi1@campus.unimib.it" userId="S::m.peracchi1@campus.unimib.it::17a51f64-c708-42b6-b317-b6230ee102c3" providerId="AD" clId="Web-{CD7FD6AF-7702-F390-A6CA-78493A1498FC}" dt="2020-06-13T15:05:33.434" v="457" actId="1076"/>
-          <ac:spMkLst>
-            <pc:docMk/>
-            <pc:sldMk cId="3610044695" sldId="262"/>
-            <ac:spMk id="7" creationId="{203CC5E2-F2FC-4C1B-B412-C90CFD0BE320}"/>
-          </ac:spMkLst>
-        </pc:spChg>
-        <pc:spChg chg="add mod">
-          <ac:chgData name="m.peracchi1@campus.unimib.it" userId="S::m.peracchi1@campus.unimib.it::17a51f64-c708-42b6-b317-b6230ee102c3" providerId="AD" clId="Web-{CD7FD6AF-7702-F390-A6CA-78493A1498FC}" dt="2020-06-13T15:02:19.748" v="420"/>
-          <ac:spMkLst>
-            <pc:docMk/>
-            <pc:sldMk cId="3610044695" sldId="262"/>
-            <ac:spMk id="8" creationId="{E0B14E78-EFB1-42CC-8247-B64C4E5AD359}"/>
-          </ac:spMkLst>
-        </pc:spChg>
-        <pc:spChg chg="add del">
-          <ac:chgData name="m.peracchi1@campus.unimib.it" userId="S::m.peracchi1@campus.unimib.it::17a51f64-c708-42b6-b317-b6230ee102c3" providerId="AD" clId="Web-{CD7FD6AF-7702-F390-A6CA-78493A1498FC}" dt="2020-06-13T14:49:22.195" v="305"/>
-          <ac:spMkLst>
-            <pc:docMk/>
-            <pc:sldMk cId="3610044695" sldId="262"/>
-            <ac:spMk id="10" creationId="{8D06CE56-3881-4ADA-8CEF-D18B02C242A3}"/>
-          </ac:spMkLst>
-        </pc:spChg>
-        <pc:spChg chg="add del">
-          <ac:chgData name="m.peracchi1@campus.unimib.it" userId="S::m.peracchi1@campus.unimib.it::17a51f64-c708-42b6-b317-b6230ee102c3" providerId="AD" clId="Web-{CD7FD6AF-7702-F390-A6CA-78493A1498FC}" dt="2020-06-13T14:49:22.195" v="305"/>
-          <ac:spMkLst>
-            <pc:docMk/>
-            <pc:sldMk cId="3610044695" sldId="262"/>
-            <ac:spMk id="12" creationId="{79F3C543-62EC-4433-9C93-A2CD8764E9B4}"/>
-          </ac:spMkLst>
-        </pc:spChg>
-        <pc:spChg chg="add mod">
-          <ac:chgData name="m.peracchi1@campus.unimib.it" userId="S::m.peracchi1@campus.unimib.it::17a51f64-c708-42b6-b317-b6230ee102c3" providerId="AD" clId="Web-{CD7FD6AF-7702-F390-A6CA-78493A1498FC}" dt="2020-06-13T15:04:25.851" v="447" actId="20577"/>
-          <ac:spMkLst>
-            <pc:docMk/>
-            <pc:sldMk cId="3610044695" sldId="262"/>
-            <ac:spMk id="13" creationId="{AA08BBF1-6844-4509-962E-EAE09301D804}"/>
-          </ac:spMkLst>
-        </pc:spChg>
-        <pc:spChg chg="add del">
-          <ac:chgData name="m.peracchi1@campus.unimib.it" userId="S::m.peracchi1@campus.unimib.it::17a51f64-c708-42b6-b317-b6230ee102c3" providerId="AD" clId="Web-{CD7FD6AF-7702-F390-A6CA-78493A1498FC}" dt="2020-06-13T14:49:22.195" v="305"/>
-          <ac:spMkLst>
-            <pc:docMk/>
-            <pc:sldMk cId="3610044695" sldId="262"/>
-            <ac:spMk id="14" creationId="{F1C4E306-BC28-4A7B-871B-1926F6FA6EF3}"/>
-          </ac:spMkLst>
-        </pc:spChg>
-        <pc:spChg chg="add mod">
-          <ac:chgData name="m.peracchi1@campus.unimib.it" userId="S::m.peracchi1@campus.unimib.it::17a51f64-c708-42b6-b317-b6230ee102c3" providerId="AD" clId="Web-{CD7FD6AF-7702-F390-A6CA-78493A1498FC}" dt="2020-06-13T15:02:56.407" v="433" actId="1076"/>
-          <ac:spMkLst>
-            <pc:docMk/>
-            <pc:sldMk cId="3610044695" sldId="262"/>
-            <ac:spMk id="15" creationId="{1322895B-A799-4F4B-9FB1-582801FA40E9}"/>
-          </ac:spMkLst>
-        </pc:spChg>
-        <pc:spChg chg="add del">
-          <ac:chgData name="m.peracchi1@campus.unimib.it" userId="S::m.peracchi1@campus.unimib.it::17a51f64-c708-42b6-b317-b6230ee102c3" providerId="AD" clId="Web-{CD7FD6AF-7702-F390-A6CA-78493A1498FC}" dt="2020-06-13T14:49:22.195" v="305"/>
-          <ac:spMkLst>
-            <pc:docMk/>
-            <pc:sldMk cId="3610044695" sldId="262"/>
-            <ac:spMk id="16" creationId="{C3ECC9B4-989C-4F71-A6BC-DEBC1D9FD0BD}"/>
-          </ac:spMkLst>
-        </pc:spChg>
-        <pc:spChg chg="add mod">
-          <ac:chgData name="m.peracchi1@campus.unimib.it" userId="S::m.peracchi1@campus.unimib.it::17a51f64-c708-42b6-b317-b6230ee102c3" providerId="AD" clId="Web-{CD7FD6AF-7702-F390-A6CA-78493A1498FC}" dt="2020-06-13T15:04:04.631" v="442" actId="1076"/>
-          <ac:spMkLst>
-            <pc:docMk/>
-            <pc:sldMk cId="3610044695" sldId="262"/>
-            <ac:spMk id="17" creationId="{7B335E6F-0C9C-4940-9297-5BFF202EA436}"/>
-          </ac:spMkLst>
-        </pc:spChg>
-        <pc:spChg chg="add del">
-          <ac:chgData name="m.peracchi1@campus.unimib.it" userId="S::m.peracchi1@campus.unimib.it::17a51f64-c708-42b6-b317-b6230ee102c3" providerId="AD" clId="Web-{CD7FD6AF-7702-F390-A6CA-78493A1498FC}" dt="2020-06-13T14:49:22.195" v="305"/>
-          <ac:spMkLst>
-            <pc:docMk/>
-            <pc:sldMk cId="3610044695" sldId="262"/>
-            <ac:spMk id="18" creationId="{7948E8DE-A931-4EF0-BE1D-F1027474099B}"/>
-          </ac:spMkLst>
-        </pc:spChg>
-        <pc:spChg chg="add del">
-          <ac:chgData name="m.peracchi1@campus.unimib.it" userId="S::m.peracchi1@campus.unimib.it::17a51f64-c708-42b6-b317-b6230ee102c3" providerId="AD" clId="Web-{CD7FD6AF-7702-F390-A6CA-78493A1498FC}" dt="2020-06-13T14:49:22.195" v="305"/>
-          <ac:spMkLst>
-            <pc:docMk/>
-            <pc:sldMk cId="3610044695" sldId="262"/>
-            <ac:spMk id="20" creationId="{B0E4BB4F-99AB-4C4E-A763-C5AC5273DF5D}"/>
-          </ac:spMkLst>
-        </pc:spChg>
-        <pc:spChg chg="add del">
-          <ac:chgData name="m.peracchi1@campus.unimib.it" userId="S::m.peracchi1@campus.unimib.it::17a51f64-c708-42b6-b317-b6230ee102c3" providerId="AD" clId="Web-{CD7FD6AF-7702-F390-A6CA-78493A1498FC}" dt="2020-06-13T14:56:10.817" v="364"/>
-          <ac:spMkLst>
-            <pc:docMk/>
-            <pc:sldMk cId="3610044695" sldId="262"/>
-            <ac:spMk id="25" creationId="{8D06CE56-3881-4ADA-8CEF-D18B02C242A3}"/>
-          </ac:spMkLst>
-        </pc:spChg>
-        <pc:spChg chg="add del">
-          <ac:chgData name="m.peracchi1@campus.unimib.it" userId="S::m.peracchi1@campus.unimib.it::17a51f64-c708-42b6-b317-b6230ee102c3" providerId="AD" clId="Web-{CD7FD6AF-7702-F390-A6CA-78493A1498FC}" dt="2020-06-13T14:56:10.817" v="364"/>
-          <ac:spMkLst>
-            <pc:docMk/>
-            <pc:sldMk cId="3610044695" sldId="262"/>
-            <ac:spMk id="27" creationId="{79F3C543-62EC-4433-9C93-A2CD8764E9B4}"/>
-          </ac:spMkLst>
-        </pc:spChg>
-        <pc:spChg chg="add del">
-          <ac:chgData name="m.peracchi1@campus.unimib.it" userId="S::m.peracchi1@campus.unimib.it::17a51f64-c708-42b6-b317-b6230ee102c3" providerId="AD" clId="Web-{CD7FD6AF-7702-F390-A6CA-78493A1498FC}" dt="2020-06-13T14:56:10.817" v="364"/>
-          <ac:spMkLst>
-            <pc:docMk/>
-            <pc:sldMk cId="3610044695" sldId="262"/>
-            <ac:spMk id="29" creationId="{5463EB0A-3D7C-4AA5-BFA5-8EE5B4BA5624}"/>
-          </ac:spMkLst>
-        </pc:spChg>
-        <pc:spChg chg="add mod">
-          <ac:chgData name="m.peracchi1@campus.unimib.it" userId="S::m.peracchi1@campus.unimib.it::17a51f64-c708-42b6-b317-b6230ee102c3" providerId="AD" clId="Web-{CD7FD6AF-7702-F390-A6CA-78493A1498FC}" dt="2020-06-13T15:04:42.040" v="450" actId="1076"/>
-          <ac:spMkLst>
-            <pc:docMk/>
-            <pc:sldMk cId="3610044695" sldId="262"/>
-            <ac:spMk id="30" creationId="{996E4AB7-49FC-4586-B813-FF7EAAE80101}"/>
-          </ac:spMkLst>
-        </pc:spChg>
-        <pc:spChg chg="add del">
-          <ac:chgData name="m.peracchi1@campus.unimib.it" userId="S::m.peracchi1@campus.unimib.it::17a51f64-c708-42b6-b317-b6230ee102c3" providerId="AD" clId="Web-{CD7FD6AF-7702-F390-A6CA-78493A1498FC}" dt="2020-06-13T14:56:10.817" v="364"/>
-          <ac:spMkLst>
-            <pc:docMk/>
-            <pc:sldMk cId="3610044695" sldId="262"/>
-            <ac:spMk id="31" creationId="{7945AD00-F967-454D-A4B2-39ABA5C88C20}"/>
-          </ac:spMkLst>
-        </pc:spChg>
-        <pc:spChg chg="add mod">
-          <ac:chgData name="m.peracchi1@campus.unimib.it" userId="S::m.peracchi1@campus.unimib.it::17a51f64-c708-42b6-b317-b6230ee102c3" providerId="AD" clId="Web-{CD7FD6AF-7702-F390-A6CA-78493A1498FC}" dt="2020-06-13T15:05:05.182" v="453" actId="20577"/>
-          <ac:spMkLst>
-            <pc:docMk/>
-            <pc:sldMk cId="3610044695" sldId="262"/>
-            <ac:spMk id="32" creationId="{4E550D80-9D17-4E15-842F-9C95D4895644}"/>
-          </ac:spMkLst>
-        </pc:spChg>
-        <pc:spChg chg="add del">
-          <ac:chgData name="m.peracchi1@campus.unimib.it" userId="S::m.peracchi1@campus.unimib.it::17a51f64-c708-42b6-b317-b6230ee102c3" providerId="AD" clId="Web-{CD7FD6AF-7702-F390-A6CA-78493A1498FC}" dt="2020-06-13T14:56:10.817" v="364"/>
-          <ac:spMkLst>
-            <pc:docMk/>
-            <pc:sldMk cId="3610044695" sldId="262"/>
-            <ac:spMk id="33" creationId="{E9BC5B79-B912-427C-8219-E3E50943FCDE}"/>
-          </ac:spMkLst>
-        </pc:spChg>
-        <pc:spChg chg="add">
-          <ac:chgData name="m.peracchi1@campus.unimib.it" userId="S::m.peracchi1@campus.unimib.it::17a51f64-c708-42b6-b317-b6230ee102c3" providerId="AD" clId="Web-{CD7FD6AF-7702-F390-A6CA-78493A1498FC}" dt="2020-06-13T14:56:10.817" v="364"/>
-          <ac:spMkLst>
-            <pc:docMk/>
-            <pc:sldMk cId="3610044695" sldId="262"/>
-            <ac:spMk id="38" creationId="{A3C210E6-A35A-4F68-8D60-801A019C75B8}"/>
-          </ac:spMkLst>
-        </pc:spChg>
-        <pc:spChg chg="add">
-          <ac:chgData name="m.peracchi1@campus.unimib.it" userId="S::m.peracchi1@campus.unimib.it::17a51f64-c708-42b6-b317-b6230ee102c3" providerId="AD" clId="Web-{CD7FD6AF-7702-F390-A6CA-78493A1498FC}" dt="2020-06-13T14:56:10.817" v="364"/>
-          <ac:spMkLst>
-            <pc:docMk/>
-            <pc:sldMk cId="3610044695" sldId="262"/>
-            <ac:spMk id="40" creationId="{AC0D06B0-F19C-459E-B221-A34B506FB5E3}"/>
-          </ac:spMkLst>
-        </pc:spChg>
-        <pc:spChg chg="add">
-          <ac:chgData name="m.peracchi1@campus.unimib.it" userId="S::m.peracchi1@campus.unimib.it::17a51f64-c708-42b6-b317-b6230ee102c3" providerId="AD" clId="Web-{CD7FD6AF-7702-F390-A6CA-78493A1498FC}" dt="2020-06-13T14:56:10.817" v="364"/>
-          <ac:spMkLst>
-            <pc:docMk/>
-            <pc:sldMk cId="3610044695" sldId="262"/>
-            <ac:spMk id="42" creationId="{345B26DA-1C6B-4C66-81C9-9C1877FC2DB1}"/>
-          </ac:spMkLst>
-        </pc:spChg>
-        <pc:spChg chg="add">
-          <ac:chgData name="m.peracchi1@campus.unimib.it" userId="S::m.peracchi1@campus.unimib.it::17a51f64-c708-42b6-b317-b6230ee102c3" providerId="AD" clId="Web-{CD7FD6AF-7702-F390-A6CA-78493A1498FC}" dt="2020-06-13T14:56:10.817" v="364"/>
-          <ac:spMkLst>
-            <pc:docMk/>
-            <pc:sldMk cId="3610044695" sldId="262"/>
-            <ac:spMk id="44" creationId="{98DE6C44-43F8-4DE4-AB81-66853FFEA09A}"/>
-          </ac:spMkLst>
-        </pc:spChg>
-        <pc:spChg chg="add">
-          <ac:chgData name="m.peracchi1@campus.unimib.it" userId="S::m.peracchi1@campus.unimib.it::17a51f64-c708-42b6-b317-b6230ee102c3" providerId="AD" clId="Web-{CD7FD6AF-7702-F390-A6CA-78493A1498FC}" dt="2020-06-13T14:56:10.817" v="364"/>
-          <ac:spMkLst>
-            <pc:docMk/>
-            <pc:sldMk cId="3610044695" sldId="262"/>
-            <ac:spMk id="46" creationId="{2409529B-9B56-4F10-BE4D-F934DB89E57E}"/>
-          </ac:spMkLst>
-        </pc:spChg>
-        <pc:cxnChg chg="add del">
-          <ac:chgData name="m.peracchi1@campus.unimib.it" userId="S::m.peracchi1@campus.unimib.it::17a51f64-c708-42b6-b317-b6230ee102c3" providerId="AD" clId="Web-{CD7FD6AF-7702-F390-A6CA-78493A1498FC}" dt="2020-06-13T14:57:50.355" v="394"/>
-          <ac:cxnSpMkLst>
-            <pc:docMk/>
-            <pc:sldMk cId="3610044695" sldId="262"/>
-            <ac:cxnSpMk id="9" creationId="{33D13B5E-2F2C-4AB0-BF10-731A8B6CA0D1}"/>
-          </ac:cxnSpMkLst>
-        </pc:cxnChg>
-        <pc:cxnChg chg="add del mod">
-          <ac:chgData name="m.peracchi1@campus.unimib.it" userId="S::m.peracchi1@campus.unimib.it::17a51f64-c708-42b6-b317-b6230ee102c3" providerId="AD" clId="Web-{CD7FD6AF-7702-F390-A6CA-78493A1498FC}" dt="2020-06-13T15:00:50.383" v="408"/>
-          <ac:cxnSpMkLst>
-            <pc:docMk/>
-            <pc:sldMk cId="3610044695" sldId="262"/>
-            <ac:cxnSpMk id="11" creationId="{416A4FC3-EFEE-4721-BD51-9C4A2B6595F3}"/>
-          </ac:cxnSpMkLst>
-        </pc:cxnChg>
-      </pc:sldChg>
-      <pc:sldChg chg="addSp delSp modSp">
-        <pc:chgData name="m.peracchi1@campus.unimib.it" userId="S::m.peracchi1@campus.unimib.it::17a51f64-c708-42b6-b317-b6230ee102c3" providerId="AD" clId="Web-{CD7FD6AF-7702-F390-A6CA-78493A1498FC}" dt="2020-06-13T15:16:49.621" v="652"/>
-        <pc:sldMkLst>
-          <pc:docMk/>
-          <pc:sldMk cId="1216034685" sldId="263"/>
-        </pc:sldMkLst>
-        <pc:spChg chg="mod">
-          <ac:chgData name="m.peracchi1@campus.unimib.it" userId="S::m.peracchi1@campus.unimib.it::17a51f64-c708-42b6-b317-b6230ee102c3" providerId="AD" clId="Web-{CD7FD6AF-7702-F390-A6CA-78493A1498FC}" dt="2020-06-13T15:16:49.621" v="652"/>
-          <ac:spMkLst>
-            <pc:docMk/>
-            <pc:sldMk cId="1216034685" sldId="263"/>
-            <ac:spMk id="2" creationId="{0627003B-2088-8145-83AE-100C225A14A7}"/>
-          </ac:spMkLst>
-        </pc:spChg>
-        <pc:spChg chg="del">
-          <ac:chgData name="m.peracchi1@campus.unimib.it" userId="S::m.peracchi1@campus.unimib.it::17a51f64-c708-42b6-b317-b6230ee102c3" providerId="AD" clId="Web-{CD7FD6AF-7702-F390-A6CA-78493A1498FC}" dt="2020-06-13T15:12:11.368" v="566"/>
-          <ac:spMkLst>
-            <pc:docMk/>
-            <pc:sldMk cId="1216034685" sldId="263"/>
-            <ac:spMk id="3" creationId="{76C45360-2945-7E4A-ACAB-CEF25462ED05}"/>
-          </ac:spMkLst>
-        </pc:spChg>
-        <pc:spChg chg="mod">
-          <ac:chgData name="m.peracchi1@campus.unimib.it" userId="S::m.peracchi1@campus.unimib.it::17a51f64-c708-42b6-b317-b6230ee102c3" providerId="AD" clId="Web-{CD7FD6AF-7702-F390-A6CA-78493A1498FC}" dt="2020-06-13T15:12:11.368" v="566"/>
-          <ac:spMkLst>
-            <pc:docMk/>
-            <pc:sldMk cId="1216034685" sldId="263"/>
-            <ac:spMk id="4" creationId="{0253CD55-45D1-4745-987F-1D1124B6FDE7}"/>
-          </ac:spMkLst>
-        </pc:spChg>
-        <pc:spChg chg="mod">
-          <ac:chgData name="m.peracchi1@campus.unimib.it" userId="S::m.peracchi1@campus.unimib.it::17a51f64-c708-42b6-b317-b6230ee102c3" providerId="AD" clId="Web-{CD7FD6AF-7702-F390-A6CA-78493A1498FC}" dt="2020-06-13T15:16:49.621" v="652"/>
-          <ac:spMkLst>
-            <pc:docMk/>
-            <pc:sldMk cId="1216034685" sldId="263"/>
-            <ac:spMk id="6" creationId="{70BD1C31-9837-1B40-99A2-0B90E0B396A9}"/>
-          </ac:spMkLst>
-        </pc:spChg>
-        <pc:spChg chg="del">
-          <ac:chgData name="m.peracchi1@campus.unimib.it" userId="S::m.peracchi1@campus.unimib.it::17a51f64-c708-42b6-b317-b6230ee102c3" providerId="AD" clId="Web-{CD7FD6AF-7702-F390-A6CA-78493A1498FC}" dt="2020-06-13T15:12:11.368" v="566"/>
-          <ac:spMkLst>
-            <pc:docMk/>
-            <pc:sldMk cId="1216034685" sldId="263"/>
-            <ac:spMk id="9" creationId="{1C799903-48D5-4A31-A1A2-541072D9771E}"/>
-          </ac:spMkLst>
-        </pc:spChg>
-        <pc:spChg chg="del">
-          <ac:chgData name="m.peracchi1@campus.unimib.it" userId="S::m.peracchi1@campus.unimib.it::17a51f64-c708-42b6-b317-b6230ee102c3" providerId="AD" clId="Web-{CD7FD6AF-7702-F390-A6CA-78493A1498FC}" dt="2020-06-13T15:12:11.368" v="566"/>
-          <ac:spMkLst>
-            <pc:docMk/>
-            <pc:sldMk cId="1216034685" sldId="263"/>
-            <ac:spMk id="11" creationId="{8EFFF109-FC58-4FD3-BE05-9775A1310F55}"/>
-          </ac:spMkLst>
-        </pc:spChg>
-        <pc:spChg chg="del">
-          <ac:chgData name="m.peracchi1@campus.unimib.it" userId="S::m.peracchi1@campus.unimib.it::17a51f64-c708-42b6-b317-b6230ee102c3" providerId="AD" clId="Web-{CD7FD6AF-7702-F390-A6CA-78493A1498FC}" dt="2020-06-13T15:12:11.368" v="566"/>
-          <ac:spMkLst>
-            <pc:docMk/>
-            <pc:sldMk cId="1216034685" sldId="263"/>
-            <ac:spMk id="13" creationId="{E1B96AD6-92A9-4273-A62B-96A1C3E0BA95}"/>
-          </ac:spMkLst>
-        </pc:spChg>
-        <pc:spChg chg="del">
-          <ac:chgData name="m.peracchi1@campus.unimib.it" userId="S::m.peracchi1@campus.unimib.it::17a51f64-c708-42b6-b317-b6230ee102c3" providerId="AD" clId="Web-{CD7FD6AF-7702-F390-A6CA-78493A1498FC}" dt="2020-06-13T15:12:11.368" v="566"/>
-          <ac:spMkLst>
-            <pc:docMk/>
-            <pc:sldMk cId="1216034685" sldId="263"/>
-            <ac:spMk id="15" creationId="{463EEC44-1BA3-44ED-81FC-A644B04B2A44}"/>
-          </ac:spMkLst>
-        </pc:spChg>
-        <pc:spChg chg="add del">
-          <ac:chgData name="m.peracchi1@campus.unimib.it" userId="S::m.peracchi1@campus.unimib.it::17a51f64-c708-42b6-b317-b6230ee102c3" providerId="AD" clId="Web-{CD7FD6AF-7702-F390-A6CA-78493A1498FC}" dt="2020-06-13T15:16:49.621" v="652"/>
-          <ac:spMkLst>
-            <pc:docMk/>
-            <pc:sldMk cId="1216034685" sldId="263"/>
-            <ac:spMk id="21" creationId="{81E1224E-6618-482E-BE87-321A7FC1CDE8}"/>
-          </ac:spMkLst>
-        </pc:spChg>
-        <pc:spChg chg="add del">
-          <ac:chgData name="m.peracchi1@campus.unimib.it" userId="S::m.peracchi1@campus.unimib.it::17a51f64-c708-42b6-b317-b6230ee102c3" providerId="AD" clId="Web-{CD7FD6AF-7702-F390-A6CA-78493A1498FC}" dt="2020-06-13T15:16:49.621" v="652"/>
-          <ac:spMkLst>
-            <pc:docMk/>
-            <pc:sldMk cId="1216034685" sldId="263"/>
-            <ac:spMk id="23" creationId="{066346BE-FDB4-4772-A696-0719490ABD64}"/>
-          </ac:spMkLst>
-        </pc:spChg>
-        <pc:spChg chg="add del">
-          <ac:chgData name="m.peracchi1@campus.unimib.it" userId="S::m.peracchi1@campus.unimib.it::17a51f64-c708-42b6-b317-b6230ee102c3" providerId="AD" clId="Web-{CD7FD6AF-7702-F390-A6CA-78493A1498FC}" dt="2020-06-13T15:16:49.621" v="652"/>
-          <ac:spMkLst>
-            <pc:docMk/>
-            <pc:sldMk cId="1216034685" sldId="263"/>
-            <ac:spMk id="25" creationId="{FB92FFCE-0C90-454E-AA25-D4EE9A6C39C5}"/>
-          </ac:spMkLst>
-        </pc:spChg>
-        <pc:spChg chg="add">
-          <ac:chgData name="m.peracchi1@campus.unimib.it" userId="S::m.peracchi1@campus.unimib.it::17a51f64-c708-42b6-b317-b6230ee102c3" providerId="AD" clId="Web-{CD7FD6AF-7702-F390-A6CA-78493A1498FC}" dt="2020-06-13T15:16:49.621" v="652"/>
-          <ac:spMkLst>
-            <pc:docMk/>
-            <pc:sldMk cId="1216034685" sldId="263"/>
-            <ac:spMk id="27" creationId="{B5416EBC-B41E-4F8A-BE9F-07301B682CBD}"/>
-          </ac:spMkLst>
-        </pc:spChg>
-        <pc:spChg chg="add">
-          <ac:chgData name="m.peracchi1@campus.unimib.it" userId="S::m.peracchi1@campus.unimib.it::17a51f64-c708-42b6-b317-b6230ee102c3" providerId="AD" clId="Web-{CD7FD6AF-7702-F390-A6CA-78493A1498FC}" dt="2020-06-13T15:16:49.621" v="652"/>
-          <ac:spMkLst>
-            <pc:docMk/>
-            <pc:sldMk cId="1216034685" sldId="263"/>
-            <ac:spMk id="28" creationId="{AFF79527-C7F1-4E06-8126-A8E8C5FEBFCA}"/>
-          </ac:spMkLst>
-        </pc:spChg>
-        <pc:spChg chg="add">
-          <ac:chgData name="m.peracchi1@campus.unimib.it" userId="S::m.peracchi1@campus.unimib.it::17a51f64-c708-42b6-b317-b6230ee102c3" providerId="AD" clId="Web-{CD7FD6AF-7702-F390-A6CA-78493A1498FC}" dt="2020-06-13T15:16:49.621" v="652"/>
-          <ac:spMkLst>
-            <pc:docMk/>
-            <pc:sldMk cId="1216034685" sldId="263"/>
-            <ac:spMk id="29" creationId="{55986208-8A53-4E92-9197-6B57BCCB2F37}"/>
-          </ac:spMkLst>
-        </pc:spChg>
-        <pc:spChg chg="add del">
-          <ac:chgData name="m.peracchi1@campus.unimib.it" userId="S::m.peracchi1@campus.unimib.it::17a51f64-c708-42b6-b317-b6230ee102c3" providerId="AD" clId="Web-{CD7FD6AF-7702-F390-A6CA-78493A1498FC}" dt="2020-06-13T15:16:49.559" v="651"/>
-          <ac:spMkLst>
-            <pc:docMk/>
-            <pc:sldMk cId="1216034685" sldId="263"/>
-            <ac:spMk id="30" creationId="{44AD29B6-BF3B-4407-9E75-52DF8E3B29F1}"/>
-          </ac:spMkLst>
-        </pc:spChg>
-        <pc:spChg chg="add del">
-          <ac:chgData name="m.peracchi1@campus.unimib.it" userId="S::m.peracchi1@campus.unimib.it::17a51f64-c708-42b6-b317-b6230ee102c3" providerId="AD" clId="Web-{CD7FD6AF-7702-F390-A6CA-78493A1498FC}" dt="2020-06-13T15:16:49.559" v="651"/>
-          <ac:spMkLst>
-            <pc:docMk/>
-            <pc:sldMk cId="1216034685" sldId="263"/>
-            <ac:spMk id="32" creationId="{55F8BA08-3E38-4B70-B93A-74F08E092206}"/>
-          </ac:spMkLst>
-        </pc:spChg>
-        <pc:spChg chg="add del">
-          <ac:chgData name="m.peracchi1@campus.unimib.it" userId="S::m.peracchi1@campus.unimib.it::17a51f64-c708-42b6-b317-b6230ee102c3" providerId="AD" clId="Web-{CD7FD6AF-7702-F390-A6CA-78493A1498FC}" dt="2020-06-13T15:16:49.559" v="651"/>
-          <ac:spMkLst>
-            <pc:docMk/>
-            <pc:sldMk cId="1216034685" sldId="263"/>
-            <ac:spMk id="34" creationId="{357F1B33-79AB-4A71-8CEC-4546D709B8C8}"/>
-          </ac:spMkLst>
-        </pc:spChg>
-        <pc:graphicFrameChg chg="add mod modGraphic">
-          <ac:chgData name="m.peracchi1@campus.unimib.it" userId="S::m.peracchi1@campus.unimib.it::17a51f64-c708-42b6-b317-b6230ee102c3" providerId="AD" clId="Web-{CD7FD6AF-7702-F390-A6CA-78493A1498FC}" dt="2020-06-13T15:16:49.621" v="652"/>
-          <ac:graphicFrameMkLst>
-            <pc:docMk/>
-            <pc:sldMk cId="1216034685" sldId="263"/>
-            <ac:graphicFrameMk id="17" creationId="{E0467B58-C8B4-4568-A41D-C041828BF9D1}"/>
-          </ac:graphicFrameMkLst>
-        </pc:graphicFrameChg>
-      </pc:sldChg>
-      <pc:sldChg chg="modSp">
-        <pc:chgData name="m.peracchi1@campus.unimib.it" userId="S::m.peracchi1@campus.unimib.it::17a51f64-c708-42b6-b317-b6230ee102c3" providerId="AD" clId="Web-{CD7FD6AF-7702-F390-A6CA-78493A1498FC}" dt="2020-06-13T15:08:10.257" v="479"/>
-        <pc:sldMkLst>
-          <pc:docMk/>
-          <pc:sldMk cId="1362571019" sldId="264"/>
-        </pc:sldMkLst>
-        <pc:spChg chg="mod">
-          <ac:chgData name="m.peracchi1@campus.unimib.it" userId="S::m.peracchi1@campus.unimib.it::17a51f64-c708-42b6-b317-b6230ee102c3" providerId="AD" clId="Web-{CD7FD6AF-7702-F390-A6CA-78493A1498FC}" dt="2020-06-13T15:08:10.257" v="479"/>
-          <ac:spMkLst>
-            <pc:docMk/>
-            <pc:sldMk cId="1362571019" sldId="264"/>
-            <ac:spMk id="2" creationId="{FE74CC8A-7F7D-3A49-B20E-E8028F76C3FC}"/>
-          </ac:spMkLst>
-        </pc:spChg>
-      </pc:sldChg>
-      <pc:sldChg chg="modSp">
-        <pc:chgData name="m.peracchi1@campus.unimib.it" userId="S::m.peracchi1@campus.unimib.it::17a51f64-c708-42b6-b317-b6230ee102c3" providerId="AD" clId="Web-{CD7FD6AF-7702-F390-A6CA-78493A1498FC}" dt="2020-06-13T14:48:50.162" v="303"/>
-        <pc:sldMkLst>
-          <pc:docMk/>
-          <pc:sldMk cId="2244038483" sldId="265"/>
-        </pc:sldMkLst>
-        <pc:spChg chg="mod">
-          <ac:chgData name="m.peracchi1@campus.unimib.it" userId="S::m.peracchi1@campus.unimib.it::17a51f64-c708-42b6-b317-b6230ee102c3" providerId="AD" clId="Web-{CD7FD6AF-7702-F390-A6CA-78493A1498FC}" dt="2020-06-13T14:48:50.162" v="303"/>
-          <ac:spMkLst>
-            <pc:docMk/>
-            <pc:sldMk cId="2244038483" sldId="265"/>
-            <ac:spMk id="2" creationId="{07B6DBBE-8F94-6D48-A97D-1D3E4E61D523}"/>
-          </ac:spMkLst>
-        </pc:spChg>
-      </pc:sldChg>
-      <pc:sldChg chg="modSp">
-        <pc:chgData name="m.peracchi1@campus.unimib.it" userId="S::m.peracchi1@campus.unimib.it::17a51f64-c708-42b6-b317-b6230ee102c3" providerId="AD" clId="Web-{CD7FD6AF-7702-F390-A6CA-78493A1498FC}" dt="2020-06-13T15:11:15.473" v="563" actId="20577"/>
-        <pc:sldMkLst>
-          <pc:docMk/>
-          <pc:sldMk cId="551053828" sldId="266"/>
-        </pc:sldMkLst>
-        <pc:spChg chg="mod">
-          <ac:chgData name="m.peracchi1@campus.unimib.it" userId="S::m.peracchi1@campus.unimib.it::17a51f64-c708-42b6-b317-b6230ee102c3" providerId="AD" clId="Web-{CD7FD6AF-7702-F390-A6CA-78493A1498FC}" dt="2020-06-13T15:07:25.411" v="477"/>
-          <ac:spMkLst>
-            <pc:docMk/>
-            <pc:sldMk cId="551053828" sldId="266"/>
-            <ac:spMk id="2" creationId="{63329D5D-282C-474A-9C08-CC80380FF5DC}"/>
-          </ac:spMkLst>
-        </pc:spChg>
-        <pc:spChg chg="mod">
-          <ac:chgData name="m.peracchi1@campus.unimib.it" userId="S::m.peracchi1@campus.unimib.it::17a51f64-c708-42b6-b317-b6230ee102c3" providerId="AD" clId="Web-{CD7FD6AF-7702-F390-A6CA-78493A1498FC}" dt="2020-06-13T15:11:15.473" v="563" actId="20577"/>
-          <ac:spMkLst>
-            <pc:docMk/>
-            <pc:sldMk cId="551053828" sldId="266"/>
-            <ac:spMk id="7" creationId="{D9B27462-9D8C-9845-A553-E885A976D6B4}"/>
-          </ac:spMkLst>
-        </pc:spChg>
-        <pc:graphicFrameChg chg="modGraphic">
-          <ac:chgData name="m.peracchi1@campus.unimib.it" userId="S::m.peracchi1@campus.unimib.it::17a51f64-c708-42b6-b317-b6230ee102c3" providerId="AD" clId="Web-{CD7FD6AF-7702-F390-A6CA-78493A1498FC}" dt="2020-06-13T15:06:17.203" v="465" actId="20577"/>
-          <ac:graphicFrameMkLst>
-            <pc:docMk/>
-            <pc:sldMk cId="551053828" sldId="266"/>
-            <ac:graphicFrameMk id="6" creationId="{56564CAF-C94F-4AE3-A09A-E011B5EA0594}"/>
-          </ac:graphicFrameMkLst>
-        </pc:graphicFrameChg>
-      </pc:sldChg>
-      <pc:sldChg chg="modSp">
-        <pc:chgData name="m.peracchi1@campus.unimib.it" userId="S::m.peracchi1@campus.unimib.it::17a51f64-c708-42b6-b317-b6230ee102c3" providerId="AD" clId="Web-{CD7FD6AF-7702-F390-A6CA-78493A1498FC}" dt="2020-06-13T15:10:39.596" v="558" actId="20577"/>
-        <pc:sldMkLst>
-          <pc:docMk/>
-          <pc:sldMk cId="1532972066" sldId="267"/>
-        </pc:sldMkLst>
-        <pc:spChg chg="mod">
-          <ac:chgData name="m.peracchi1@campus.unimib.it" userId="S::m.peracchi1@campus.unimib.it::17a51f64-c708-42b6-b317-b6230ee102c3" providerId="AD" clId="Web-{CD7FD6AF-7702-F390-A6CA-78493A1498FC}" dt="2020-06-13T15:08:24.493" v="481"/>
-          <ac:spMkLst>
-            <pc:docMk/>
-            <pc:sldMk cId="1532972066" sldId="267"/>
-            <ac:spMk id="2" creationId="{5D5A6BF5-C9B1-134E-8E0F-A0C6B7FBD28D}"/>
-          </ac:spMkLst>
-        </pc:spChg>
-        <pc:spChg chg="mod">
-          <ac:chgData name="m.peracchi1@campus.unimib.it" userId="S::m.peracchi1@campus.unimib.it::17a51f64-c708-42b6-b317-b6230ee102c3" providerId="AD" clId="Web-{CD7FD6AF-7702-F390-A6CA-78493A1498FC}" dt="2020-06-13T15:09:01.700" v="504" actId="20577"/>
-          <ac:spMkLst>
-            <pc:docMk/>
-            <pc:sldMk cId="1532972066" sldId="267"/>
-            <ac:spMk id="4" creationId="{C2FFF822-486D-DE48-8456-2674890B01CB}"/>
-          </ac:spMkLst>
-        </pc:spChg>
-        <pc:spChg chg="mod">
-          <ac:chgData name="m.peracchi1@campus.unimib.it" userId="S::m.peracchi1@campus.unimib.it::17a51f64-c708-42b6-b317-b6230ee102c3" providerId="AD" clId="Web-{CD7FD6AF-7702-F390-A6CA-78493A1498FC}" dt="2020-06-13T15:10:39.596" v="558" actId="20577"/>
-          <ac:spMkLst>
-            <pc:docMk/>
-            <pc:sldMk cId="1532972066" sldId="267"/>
-            <ac:spMk id="6" creationId="{45EA0B21-6B35-A24F-AC4B-10E95C67889D}"/>
-          </ac:spMkLst>
-        </pc:spChg>
-      </pc:sldChg>
-    </pc:docChg>
-  </pc:docChgLst>
-  <pc:docChgLst>
-    <pc:chgData name="m.peracchi1@campus.unimib.it" userId="S::m.peracchi1@campus.unimib.it::17a51f64-c708-42b6-b317-b6230ee102c3" providerId="AD" clId="Web-{B4F6B79A-B345-4920-B6B6-1EDAE3CCB1E2}"/>
-    <pc:docChg chg="modSld">
-      <pc:chgData name="m.peracchi1@campus.unimib.it" userId="S::m.peracchi1@campus.unimib.it::17a51f64-c708-42b6-b317-b6230ee102c3" providerId="AD" clId="Web-{B4F6B79A-B345-4920-B6B6-1EDAE3CCB1E2}" dt="2020-06-13T14:21:05.077" v="77" actId="20577"/>
-      <pc:docMkLst>
-        <pc:docMk/>
-      </pc:docMkLst>
-      <pc:sldChg chg="addSp modSp">
-        <pc:chgData name="m.peracchi1@campus.unimib.it" userId="S::m.peracchi1@campus.unimib.it::17a51f64-c708-42b6-b317-b6230ee102c3" providerId="AD" clId="Web-{B4F6B79A-B345-4920-B6B6-1EDAE3CCB1E2}" dt="2020-06-13T14:20:42.311" v="75" actId="20577"/>
-        <pc:sldMkLst>
-          <pc:docMk/>
-          <pc:sldMk cId="970307074" sldId="257"/>
-        </pc:sldMkLst>
-        <pc:spChg chg="mod">
-          <ac:chgData name="m.peracchi1@campus.unimib.it" userId="S::m.peracchi1@campus.unimib.it::17a51f64-c708-42b6-b317-b6230ee102c3" providerId="AD" clId="Web-{B4F6B79A-B345-4920-B6B6-1EDAE3CCB1E2}" dt="2020-06-13T14:18:14.219" v="37" actId="1076"/>
-          <ac:spMkLst>
-            <pc:docMk/>
-            <pc:sldMk cId="970307074" sldId="257"/>
-            <ac:spMk id="2" creationId="{6FE05FC1-FB38-AF4E-80BC-A57908209CF0}"/>
-          </ac:spMkLst>
-        </pc:spChg>
-        <pc:spChg chg="mod">
-          <ac:chgData name="m.peracchi1@campus.unimib.it" userId="S::m.peracchi1@campus.unimib.it::17a51f64-c708-42b6-b317-b6230ee102c3" providerId="AD" clId="Web-{B4F6B79A-B345-4920-B6B6-1EDAE3CCB1E2}" dt="2020-06-13T14:18:28.656" v="39" actId="1076"/>
-          <ac:spMkLst>
-            <pc:docMk/>
-            <pc:sldMk cId="970307074" sldId="257"/>
-            <ac:spMk id="3" creationId="{973D395C-7E87-3B45-80CC-F7C4DF406E0C}"/>
-          </ac:spMkLst>
-        </pc:spChg>
-        <pc:spChg chg="add mod">
-          <ac:chgData name="m.peracchi1@campus.unimib.it" userId="S::m.peracchi1@campus.unimib.it::17a51f64-c708-42b6-b317-b6230ee102c3" providerId="AD" clId="Web-{B4F6B79A-B345-4920-B6B6-1EDAE3CCB1E2}" dt="2020-06-13T14:20:42.311" v="75" actId="20577"/>
-          <ac:spMkLst>
-            <pc:docMk/>
-            <pc:sldMk cId="970307074" sldId="257"/>
-            <ac:spMk id="5" creationId="{EE310572-4DEF-44E7-9AE7-C09B0C9237D8}"/>
-          </ac:spMkLst>
-        </pc:spChg>
-      </pc:sldChg>
-    </pc:docChg>
-  </pc:docChgLst>
-</pc:chgInfo>
-</file>
-
 <file path=ppt/diagrams/colors1.xml><?xml version="1.0" encoding="utf-8"?>
-<dgm:colorsDef xmlns:dgm="http://schemas.openxmlformats.org/drawingml/2006/diagram" xmlns:a="http://schemas.openxmlformats.org/drawingml/2006/main" uniqueId="urn:microsoft.com/office/officeart/2005/8/colors/colorful5">
+<dgm:colorsDef xmlns:dgm="http://schemas.openxmlformats.org/drawingml/2006/diagram" xmlns:a="http://schemas.openxmlformats.org/drawingml/2006/main" uniqueId="urn:microsoft.com/office/officeart/2005/8/colors/accent1_5">
   <dgm:title val=""/>
   <dgm:desc val=""/>
   <dgm:catLst>
-    <dgm:cat type="colorful" pri="10500"/>
+    <dgm:cat type="accent1" pri="11500"/>
   </dgm:catLst>
   <dgm:styleLbl name="node0">
-    <dgm:fillClrLst meth="repeat">
-      <a:schemeClr val="accent4"/>
+    <dgm:fillClrLst meth="cycle">
+      <a:schemeClr val="accent1">
+        <a:alpha val="80000"/>
+      </a:schemeClr>
     </dgm:fillClrLst>
     <dgm:linClrLst meth="repeat">
       <a:schemeClr val="lt1"/>
@@ -945,8 +185,12 @@
   </dgm:styleLbl>
   <dgm:styleLbl name="node1">
     <dgm:fillClrLst>
-      <a:schemeClr val="accent5"/>
-      <a:schemeClr val="accent6"/>
+      <a:schemeClr val="accent1">
+        <a:alpha val="90000"/>
+      </a:schemeClr>
+      <a:schemeClr val="accent1">
+        <a:alpha val="50000"/>
+      </a:schemeClr>
     </dgm:fillClrLst>
     <dgm:linClrLst meth="repeat">
       <a:schemeClr val="lt1"/>
@@ -958,12 +202,20 @@
   </dgm:styleLbl>
   <dgm:styleLbl name="alignNode1">
     <dgm:fillClrLst>
-      <a:schemeClr val="accent5"/>
-      <a:schemeClr val="accent6"/>
+      <a:schemeClr val="accent1">
+        <a:alpha val="90000"/>
+      </a:schemeClr>
+      <a:schemeClr val="accent1">
+        <a:alpha val="50000"/>
+      </a:schemeClr>
     </dgm:fillClrLst>
     <dgm:linClrLst>
-      <a:schemeClr val="accent5"/>
-      <a:schemeClr val="accent6"/>
+      <a:schemeClr val="accent1">
+        <a:alpha val="90000"/>
+      </a:schemeClr>
+      <a:schemeClr val="accent1">
+        <a:alpha val="50000"/>
+      </a:schemeClr>
     </dgm:linClrLst>
     <dgm:effectClrLst/>
     <dgm:txLinClrLst/>
@@ -972,8 +224,13 @@
   </dgm:styleLbl>
   <dgm:styleLbl name="lnNode1">
     <dgm:fillClrLst>
-      <a:schemeClr val="accent5"/>
-      <a:schemeClr val="accent6"/>
+      <a:schemeClr val="accent1">
+        <a:shade val="90000"/>
+      </a:schemeClr>
+      <a:schemeClr val="accent1">
+        <a:alpha val="50000"/>
+        <a:tint val="50000"/>
+      </a:schemeClr>
     </dgm:fillClrLst>
     <dgm:linClrLst meth="repeat">
       <a:schemeClr val="lt1"/>
@@ -985,11 +242,12 @@
   </dgm:styleLbl>
   <dgm:styleLbl name="vennNode1">
     <dgm:fillClrLst>
-      <a:schemeClr val="accent5">
+      <a:schemeClr val="accent1">
+        <a:shade val="80000"/>
         <a:alpha val="50000"/>
       </a:schemeClr>
-      <a:schemeClr val="accent6">
-        <a:alpha val="50000"/>
+      <a:schemeClr val="accent1">
+        <a:alpha val="80000"/>
       </a:schemeClr>
     </dgm:fillClrLst>
     <dgm:linClrLst meth="repeat">
@@ -1002,7 +260,9 @@
   </dgm:styleLbl>
   <dgm:styleLbl name="node2">
     <dgm:fillClrLst>
-      <a:schemeClr val="accent6"/>
+      <a:schemeClr val="accent1">
+        <a:alpha val="70000"/>
+      </a:schemeClr>
     </dgm:fillClrLst>
     <dgm:linClrLst meth="repeat">
       <a:schemeClr val="lt1"/>
@@ -1014,7 +274,9 @@
   </dgm:styleLbl>
   <dgm:styleLbl name="node3">
     <dgm:fillClrLst>
-      <a:schemeClr val="accent1"/>
+      <a:schemeClr val="accent1">
+        <a:alpha val="50000"/>
+      </a:schemeClr>
     </dgm:fillClrLst>
     <dgm:linClrLst meth="repeat">
       <a:schemeClr val="lt1"/>
@@ -1026,7 +288,9 @@
   </dgm:styleLbl>
   <dgm:styleLbl name="node4">
     <dgm:fillClrLst>
-      <a:schemeClr val="accent2"/>
+      <a:schemeClr val="accent1">
+        <a:alpha val="30000"/>
+      </a:schemeClr>
     </dgm:fillClrLst>
     <dgm:linClrLst meth="repeat">
       <a:schemeClr val="lt1"/>
@@ -1038,11 +302,13 @@
   </dgm:styleLbl>
   <dgm:styleLbl name="fgImgPlace1">
     <dgm:fillClrLst>
-      <a:schemeClr val="accent5">
+      <a:schemeClr val="accent1">
         <a:tint val="50000"/>
+        <a:alpha val="90000"/>
       </a:schemeClr>
-      <a:schemeClr val="accent6">
-        <a:tint val="50000"/>
+      <a:schemeClr val="accent1">
+        <a:tint val="20000"/>
+        <a:alpha val="50000"/>
       </a:schemeClr>
     </dgm:fillClrLst>
     <dgm:linClrLst meth="repeat">
@@ -1057,10 +323,10 @@
   </dgm:styleLbl>
   <dgm:styleLbl name="alignImgPlace1">
     <dgm:fillClrLst>
-      <a:schemeClr val="accent5">
+      <a:schemeClr val="accent1">
         <a:tint val="50000"/>
       </a:schemeClr>
-      <a:schemeClr val="accent6">
+      <a:schemeClr val="accent1">
         <a:tint val="20000"/>
       </a:schemeClr>
     </dgm:fillClrLst>
@@ -1076,10 +342,10 @@
   </dgm:styleLbl>
   <dgm:styleLbl name="bgImgPlace1">
     <dgm:fillClrLst>
-      <a:schemeClr val="accent5">
+      <a:schemeClr val="accent1">
         <a:tint val="50000"/>
       </a:schemeClr>
-      <a:schemeClr val="accent6">
+      <a:schemeClr val="accent1">
         <a:tint val="20000"/>
       </a:schemeClr>
     </dgm:fillClrLst>
@@ -1095,11 +361,20 @@
   </dgm:styleLbl>
   <dgm:styleLbl name="sibTrans2D1">
     <dgm:fillClrLst>
-      <a:schemeClr val="accent5"/>
-      <a:schemeClr val="accent6"/>
+      <a:schemeClr val="accent1">
+        <a:shade val="90000"/>
+      </a:schemeClr>
+      <a:schemeClr val="accent1">
+        <a:tint val="50000"/>
+      </a:schemeClr>
     </dgm:fillClrLst>
-    <dgm:linClrLst meth="repeat">
-      <a:schemeClr val="lt1"/>
+    <dgm:linClrLst>
+      <a:schemeClr val="accent1">
+        <a:shade val="90000"/>
+      </a:schemeClr>
+      <a:schemeClr val="accent1">
+        <a:tint val="50000"/>
+      </a:schemeClr>
     </dgm:linClrLst>
     <dgm:effectClrLst/>
     <dgm:txLinClrLst/>
@@ -1108,39 +383,64 @@
   </dgm:styleLbl>
   <dgm:styleLbl name="fgSibTrans2D1">
     <dgm:fillClrLst>
-      <a:schemeClr val="accent5"/>
-      <a:schemeClr val="accent6"/>
+      <a:schemeClr val="accent1">
+        <a:shade val="90000"/>
+      </a:schemeClr>
+      <a:schemeClr val="accent1">
+        <a:tint val="50000"/>
+      </a:schemeClr>
     </dgm:fillClrLst>
-    <dgm:linClrLst meth="repeat">
-      <a:schemeClr val="lt1"/>
+    <dgm:linClrLst>
+      <a:schemeClr val="accent1">
+        <a:shade val="90000"/>
+      </a:schemeClr>
+      <a:schemeClr val="accent1">
+        <a:tint val="50000"/>
+      </a:schemeClr>
     </dgm:linClrLst>
     <dgm:effectClrLst/>
     <dgm:txLinClrLst/>
-    <dgm:txFillClrLst meth="repeat">
-      <a:schemeClr val="lt1"/>
-    </dgm:txFillClrLst>
+    <dgm:txFillClrLst/>
     <dgm:txEffectClrLst/>
   </dgm:styleLbl>
   <dgm:styleLbl name="bgSibTrans2D1">
     <dgm:fillClrLst>
-      <a:schemeClr val="accent5"/>
-      <a:schemeClr val="accent6"/>
+      <a:schemeClr val="accent1">
+        <a:shade val="90000"/>
+      </a:schemeClr>
+      <a:schemeClr val="accent1">
+        <a:tint val="50000"/>
+      </a:schemeClr>
     </dgm:fillClrLst>
-    <dgm:linClrLst meth="repeat">
-      <a:schemeClr val="lt1"/>
+    <dgm:linClrLst>
+      <a:schemeClr val="accent1">
+        <a:shade val="90000"/>
+      </a:schemeClr>
+      <a:schemeClr val="accent1">
+        <a:tint val="50000"/>
+      </a:schemeClr>
     </dgm:linClrLst>
     <dgm:effectClrLst/>
     <dgm:txLinClrLst/>
-    <dgm:txFillClrLst meth="repeat">
-      <a:schemeClr val="lt1"/>
-    </dgm:txFillClrLst>
+    <dgm:txFillClrLst/>
     <dgm:txEffectClrLst/>
   </dgm:styleLbl>
   <dgm:styleLbl name="sibTrans1D1">
-    <dgm:fillClrLst/>
+    <dgm:fillClrLst>
+      <a:schemeClr val="accent1">
+        <a:shade val="90000"/>
+      </a:schemeClr>
+      <a:schemeClr val="accent1">
+        <a:tint val="50000"/>
+      </a:schemeClr>
+    </dgm:fillClrLst>
     <dgm:linClrLst>
-      <a:schemeClr val="accent5"/>
-      <a:schemeClr val="accent6"/>
+      <a:schemeClr val="accent1">
+        <a:shade val="90000"/>
+      </a:schemeClr>
+      <a:schemeClr val="accent1">
+        <a:tint val="50000"/>
+      </a:schemeClr>
     </dgm:linClrLst>
     <dgm:effectClrLst/>
     <dgm:txLinClrLst/>
@@ -1151,12 +451,10 @@
   </dgm:styleLbl>
   <dgm:styleLbl name="callout">
     <dgm:fillClrLst meth="repeat">
-      <a:schemeClr val="accent5"/>
+      <a:schemeClr val="accent1"/>
     </dgm:fillClrLst>
     <dgm:linClrLst meth="repeat">
-      <a:schemeClr val="accent5">
-        <a:tint val="50000"/>
-      </a:schemeClr>
+      <a:schemeClr val="accent1"/>
     </dgm:linClrLst>
     <dgm:effectClrLst/>
     <dgm:txLinClrLst/>
@@ -1167,12 +465,12 @@
   </dgm:styleLbl>
   <dgm:styleLbl name="asst0">
     <dgm:fillClrLst meth="repeat">
-      <a:schemeClr val="accent5"/>
+      <a:schemeClr val="accent1">
+        <a:alpha val="90000"/>
+      </a:schemeClr>
     </dgm:fillClrLst>
     <dgm:linClrLst meth="repeat">
-      <a:schemeClr val="lt1">
-        <a:shade val="80000"/>
-      </a:schemeClr>
+      <a:schemeClr val="lt1"/>
     </dgm:linClrLst>
     <dgm:effectClrLst/>
     <dgm:txLinClrLst/>
@@ -1181,12 +479,12 @@
   </dgm:styleLbl>
   <dgm:styleLbl name="asst1">
     <dgm:fillClrLst meth="repeat">
-      <a:schemeClr val="accent6"/>
+      <a:schemeClr val="accent1">
+        <a:alpha val="90000"/>
+      </a:schemeClr>
     </dgm:fillClrLst>
     <dgm:linClrLst meth="repeat">
-      <a:schemeClr val="lt1">
-        <a:shade val="80000"/>
-      </a:schemeClr>
+      <a:schemeClr val="lt1"/>
     </dgm:linClrLst>
     <dgm:effectClrLst/>
     <dgm:txLinClrLst/>
@@ -1195,7 +493,9 @@
   </dgm:styleLbl>
   <dgm:styleLbl name="asst2">
     <dgm:fillClrLst>
-      <a:schemeClr val="accent1"/>
+      <a:schemeClr val="accent1">
+        <a:alpha val="90000"/>
+      </a:schemeClr>
     </dgm:fillClrLst>
     <dgm:linClrLst meth="repeat">
       <a:schemeClr val="lt1"/>
@@ -1207,7 +507,9 @@
   </dgm:styleLbl>
   <dgm:styleLbl name="asst3">
     <dgm:fillClrLst>
-      <a:schemeClr val="accent2"/>
+      <a:schemeClr val="accent1">
+        <a:alpha val="70000"/>
+      </a:schemeClr>
     </dgm:fillClrLst>
     <dgm:linClrLst meth="repeat">
       <a:schemeClr val="lt1"/>
@@ -1219,7 +521,9 @@
   </dgm:styleLbl>
   <dgm:styleLbl name="asst4">
     <dgm:fillClrLst>
-      <a:schemeClr val="accent3"/>
+      <a:schemeClr val="accent1">
+        <a:alpha val="50000"/>
+      </a:schemeClr>
     </dgm:fillClrLst>
     <dgm:linClrLst meth="repeat">
       <a:schemeClr val="lt1"/>
@@ -1231,24 +535,30 @@
   </dgm:styleLbl>
   <dgm:styleLbl name="parChTrans2D1">
     <dgm:fillClrLst meth="repeat">
-      <a:schemeClr val="accent5"/>
+      <a:schemeClr val="accent1">
+        <a:shade val="80000"/>
+      </a:schemeClr>
     </dgm:fillClrLst>
     <dgm:linClrLst meth="repeat">
-      <a:schemeClr val="lt1"/>
+      <a:schemeClr val="accent1">
+        <a:shade val="80000"/>
+      </a:schemeClr>
     </dgm:linClrLst>
     <dgm:effectClrLst/>
     <dgm:txLinClrLst/>
-    <dgm:txFillClrLst meth="repeat">
-      <a:schemeClr val="lt1"/>
-    </dgm:txFillClrLst>
+    <dgm:txFillClrLst/>
     <dgm:txEffectClrLst/>
   </dgm:styleLbl>
   <dgm:styleLbl name="parChTrans2D2">
     <dgm:fillClrLst meth="repeat">
-      <a:schemeClr val="accent6"/>
+      <a:schemeClr val="accent1">
+        <a:tint val="90000"/>
+      </a:schemeClr>
     </dgm:fillClrLst>
     <dgm:linClrLst meth="repeat">
-      <a:schemeClr val="lt1"/>
+      <a:schemeClr val="accent1">
+        <a:tint val="90000"/>
+      </a:schemeClr>
     </dgm:linClrLst>
     <dgm:effectClrLst/>
     <dgm:txLinClrLst/>
@@ -1257,10 +567,14 @@
   </dgm:styleLbl>
   <dgm:styleLbl name="parChTrans2D3">
     <dgm:fillClrLst meth="repeat">
-      <a:schemeClr val="accent6"/>
+      <a:schemeClr val="accent1">
+        <a:tint val="70000"/>
+      </a:schemeClr>
     </dgm:fillClrLst>
     <dgm:linClrLst meth="repeat">
-      <a:schemeClr val="lt1"/>
+      <a:schemeClr val="accent1">
+        <a:tint val="70000"/>
+      </a:schemeClr>
     </dgm:linClrLst>
     <dgm:effectClrLst/>
     <dgm:txLinClrLst/>
@@ -1269,24 +583,32 @@
   </dgm:styleLbl>
   <dgm:styleLbl name="parChTrans2D4">
     <dgm:fillClrLst meth="repeat">
-      <a:schemeClr val="accent1"/>
+      <a:schemeClr val="accent1">
+        <a:tint val="50000"/>
+      </a:schemeClr>
     </dgm:fillClrLst>
     <dgm:linClrLst meth="repeat">
-      <a:schemeClr val="lt1"/>
+      <a:schemeClr val="accent1">
+        <a:tint val="50000"/>
+      </a:schemeClr>
     </dgm:linClrLst>
     <dgm:effectClrLst/>
     <dgm:txLinClrLst/>
     <dgm:txFillClrLst meth="repeat">
-      <a:schemeClr val="lt1"/>
+      <a:schemeClr val="dk1"/>
     </dgm:txFillClrLst>
     <dgm:txEffectClrLst/>
   </dgm:styleLbl>
   <dgm:styleLbl name="parChTrans1D1">
     <dgm:fillClrLst meth="repeat">
-      <a:schemeClr val="accent5"/>
+      <a:schemeClr val="accent1">
+        <a:shade val="80000"/>
+      </a:schemeClr>
     </dgm:fillClrLst>
     <dgm:linClrLst meth="repeat">
-      <a:schemeClr val="accent5"/>
+      <a:schemeClr val="accent1">
+        <a:shade val="80000"/>
+      </a:schemeClr>
     </dgm:linClrLst>
     <dgm:effectClrLst/>
     <dgm:txLinClrLst/>
@@ -1297,12 +619,14 @@
   </dgm:styleLbl>
   <dgm:styleLbl name="parChTrans1D2">
     <dgm:fillClrLst meth="repeat">
-      <a:schemeClr val="accent6">
+      <a:schemeClr val="accent1">
         <a:tint val="90000"/>
       </a:schemeClr>
     </dgm:fillClrLst>
     <dgm:linClrLst meth="repeat">
-      <a:schemeClr val="accent6"/>
+      <a:schemeClr val="accent1">
+        <a:tint val="90000"/>
+      </a:schemeClr>
     </dgm:linClrLst>
     <dgm:effectClrLst/>
     <dgm:txLinClrLst/>
@@ -1313,12 +637,14 @@
   </dgm:styleLbl>
   <dgm:styleLbl name="parChTrans1D3">
     <dgm:fillClrLst meth="repeat">
-      <a:schemeClr val="accent6">
+      <a:schemeClr val="accent1">
         <a:tint val="70000"/>
       </a:schemeClr>
     </dgm:fillClrLst>
     <dgm:linClrLst meth="repeat">
-      <a:schemeClr val="accent1"/>
+      <a:schemeClr val="accent1">
+        <a:tint val="70000"/>
+      </a:schemeClr>
     </dgm:linClrLst>
     <dgm:effectClrLst/>
     <dgm:txLinClrLst/>
@@ -1329,12 +655,14 @@
   </dgm:styleLbl>
   <dgm:styleLbl name="parChTrans1D4">
     <dgm:fillClrLst meth="repeat">
-      <a:schemeClr val="accent6">
+      <a:schemeClr val="accent1">
         <a:tint val="50000"/>
       </a:schemeClr>
     </dgm:fillClrLst>
     <dgm:linClrLst meth="repeat">
-      <a:schemeClr val="accent2"/>
+      <a:schemeClr val="accent1">
+        <a:tint val="50000"/>
+      </a:schemeClr>
     </dgm:linClrLst>
     <dgm:effectClrLst/>
     <dgm:txLinClrLst/>
@@ -1350,8 +678,12 @@
       </a:schemeClr>
     </dgm:fillClrLst>
     <dgm:linClrLst>
-      <a:schemeClr val="accent5"/>
-      <a:schemeClr val="accent6"/>
+      <a:schemeClr val="accent1">
+        <a:alpha val="90000"/>
+      </a:schemeClr>
+      <a:schemeClr val="accent1">
+        <a:alpha val="50000"/>
+      </a:schemeClr>
     </dgm:linClrLst>
     <dgm:effectClrLst/>
     <dgm:txLinClrLst/>
@@ -1367,8 +699,12 @@
       </a:schemeClr>
     </dgm:fillClrLst>
     <dgm:linClrLst>
-      <a:schemeClr val="accent5"/>
-      <a:schemeClr val="accent6"/>
+      <a:schemeClr val="accent1">
+        <a:alpha val="90000"/>
+      </a:schemeClr>
+      <a:schemeClr val="accent1">
+        <a:alpha val="50000"/>
+      </a:schemeClr>
     </dgm:linClrLst>
     <dgm:effectClrLst/>
     <dgm:txLinClrLst/>
@@ -1384,8 +720,12 @@
       </a:schemeClr>
     </dgm:fillClrLst>
     <dgm:linClrLst>
-      <a:schemeClr val="accent5"/>
-      <a:schemeClr val="accent6"/>
+      <a:schemeClr val="accent1">
+        <a:alpha val="90000"/>
+      </a:schemeClr>
+      <a:schemeClr val="accent1">
+        <a:alpha val="50000"/>
+      </a:schemeClr>
     </dgm:linClrLst>
     <dgm:effectClrLst/>
     <dgm:txLinClrLst/>
@@ -1400,8 +740,13 @@
         <a:alpha val="40000"/>
       </a:schemeClr>
     </dgm:fillClrLst>
-    <dgm:linClrLst meth="repeat">
-      <a:schemeClr val="accent5"/>
+    <dgm:linClrLst>
+      <a:schemeClr val="accent1">
+        <a:alpha val="90000"/>
+      </a:schemeClr>
+      <a:schemeClr val="accent1">
+        <a:alpha val="50000"/>
+      </a:schemeClr>
     </dgm:linClrLst>
     <dgm:effectClrLst/>
     <dgm:txLinClrLst/>
@@ -1417,8 +762,12 @@
       </a:schemeClr>
     </dgm:fillClrLst>
     <dgm:linClrLst>
-      <a:schemeClr val="accent5"/>
-      <a:schemeClr val="accent6"/>
+      <a:schemeClr val="accent1">
+        <a:alpha val="90000"/>
+      </a:schemeClr>
+      <a:schemeClr val="accent1">
+        <a:alpha val="50000"/>
+      </a:schemeClr>
     </dgm:linClrLst>
     <dgm:effectClrLst/>
     <dgm:txLinClrLst/>
@@ -1432,8 +781,12 @@
       <a:schemeClr val="lt1"/>
     </dgm:fillClrLst>
     <dgm:linClrLst>
-      <a:schemeClr val="accent5"/>
-      <a:schemeClr val="accent6"/>
+      <a:schemeClr val="accent1">
+        <a:alpha val="90000"/>
+      </a:schemeClr>
+      <a:schemeClr val="accent1">
+        <a:alpha val="50000"/>
+      </a:schemeClr>
     </dgm:linClrLst>
     <dgm:effectClrLst/>
     <dgm:txLinClrLst/>
@@ -1446,9 +799,8 @@
     <dgm:fillClrLst meth="repeat">
       <a:schemeClr val="lt1"/>
     </dgm:fillClrLst>
-    <dgm:linClrLst>
-      <a:schemeClr val="accent5"/>
-      <a:schemeClr val="accent6"/>
+    <dgm:linClrLst meth="repeat">
+      <a:schemeClr val="accent1"/>
     </dgm:linClrLst>
     <dgm:effectClrLst/>
     <dgm:txLinClrLst/>
@@ -1461,9 +813,8 @@
     <dgm:fillClrLst meth="repeat">
       <a:schemeClr val="lt1"/>
     </dgm:fillClrLst>
-    <dgm:linClrLst>
-      <a:schemeClr val="accent5"/>
-      <a:schemeClr val="accent6"/>
+    <dgm:linClrLst meth="repeat">
+      <a:schemeClr val="accent1"/>
     </dgm:linClrLst>
     <dgm:effectClrLst/>
     <dgm:txLinClrLst/>
@@ -1474,23 +825,19 @@
   </dgm:styleLbl>
   <dgm:styleLbl name="fgAccFollowNode1">
     <dgm:fillClrLst>
-      <a:schemeClr val="accent5">
+      <a:schemeClr val="accent1">
+        <a:alpha val="90000"/>
         <a:tint val="40000"/>
-        <a:alpha val="90000"/>
       </a:schemeClr>
-      <a:schemeClr val="accent6">
+      <a:schemeClr val="accent1">
+        <a:alpha val="50000"/>
         <a:tint val="40000"/>
-        <a:alpha val="90000"/>
       </a:schemeClr>
     </dgm:fillClrLst>
-    <dgm:linClrLst>
-      <a:schemeClr val="accent5">
+    <dgm:linClrLst meth="repeat">
+      <a:schemeClr val="accent1">
+        <a:alpha val="90000"/>
         <a:tint val="40000"/>
-        <a:alpha val="90000"/>
-      </a:schemeClr>
-      <a:schemeClr val="accent5">
-        <a:tint val="40000"/>
-        <a:alpha val="90000"/>
       </a:schemeClr>
     </dgm:linClrLst>
     <dgm:effectClrLst/>
@@ -1501,24 +848,16 @@
     <dgm:txEffectClrLst/>
   </dgm:styleLbl>
   <dgm:styleLbl name="alignAccFollowNode1">
-    <dgm:fillClrLst>
-      <a:schemeClr val="accent5">
+    <dgm:fillClrLst meth="repeat">
+      <a:schemeClr val="accent1">
+        <a:alpha val="90000"/>
         <a:tint val="40000"/>
-        <a:alpha val="90000"/>
-      </a:schemeClr>
-      <a:schemeClr val="accent6">
-        <a:tint val="40000"/>
-        <a:alpha val="90000"/>
       </a:schemeClr>
     </dgm:fillClrLst>
-    <dgm:linClrLst>
-      <a:schemeClr val="accent5">
+    <dgm:linClrLst meth="repeat">
+      <a:schemeClr val="accent1">
+        <a:alpha val="90000"/>
         <a:tint val="40000"/>
-        <a:alpha val="90000"/>
-      </a:schemeClr>
-      <a:schemeClr val="accent6">
-        <a:tint val="40000"/>
-        <a:alpha val="90000"/>
       </a:schemeClr>
     </dgm:linClrLst>
     <dgm:effectClrLst/>
@@ -1529,25 +868,14 @@
     <dgm:txEffectClrLst/>
   </dgm:styleLbl>
   <dgm:styleLbl name="bgAccFollowNode1">
-    <dgm:fillClrLst>
-      <a:schemeClr val="accent5">
+    <dgm:fillClrLst meth="repeat">
+      <a:schemeClr val="accent1">
+        <a:alpha val="90000"/>
         <a:tint val="40000"/>
-        <a:alpha val="90000"/>
-      </a:schemeClr>
-      <a:schemeClr val="accent6">
-        <a:tint val="40000"/>
-        <a:alpha val="90000"/>
       </a:schemeClr>
     </dgm:fillClrLst>
-    <dgm:linClrLst>
-      <a:schemeClr val="accent5">
-        <a:tint val="40000"/>
-        <a:alpha val="90000"/>
-      </a:schemeClr>
-      <a:schemeClr val="accent6">
-        <a:tint val="40000"/>
-        <a:alpha val="90000"/>
-      </a:schemeClr>
+    <dgm:linClrLst meth="repeat">
+      <a:schemeClr val="lt1"/>
     </dgm:linClrLst>
     <dgm:effectClrLst/>
     <dgm:txLinClrLst/>
@@ -1562,8 +890,10 @@
         <a:alpha val="90000"/>
       </a:schemeClr>
     </dgm:fillClrLst>
-    <dgm:linClrLst>
-      <a:schemeClr val="accent4"/>
+    <dgm:linClrLst meth="repeat">
+      <a:schemeClr val="accent1">
+        <a:shade val="80000"/>
+      </a:schemeClr>
     </dgm:linClrLst>
     <dgm:effectClrLst/>
     <dgm:txLinClrLst/>
@@ -1578,8 +908,10 @@
         <a:alpha val="90000"/>
       </a:schemeClr>
     </dgm:fillClrLst>
-    <dgm:linClrLst>
-      <a:schemeClr val="accent6"/>
+    <dgm:linClrLst meth="repeat">
+      <a:schemeClr val="accent1">
+        <a:tint val="90000"/>
+      </a:schemeClr>
     </dgm:linClrLst>
     <dgm:effectClrLst/>
     <dgm:txLinClrLst/>
@@ -1594,8 +926,10 @@
         <a:alpha val="90000"/>
       </a:schemeClr>
     </dgm:fillClrLst>
-    <dgm:linClrLst>
-      <a:schemeClr val="accent1"/>
+    <dgm:linClrLst meth="repeat">
+      <a:schemeClr val="accent1">
+        <a:tint val="70000"/>
+      </a:schemeClr>
     </dgm:linClrLst>
     <dgm:effectClrLst/>
     <dgm:txLinClrLst/>
@@ -1610,8 +944,10 @@
         <a:alpha val="90000"/>
       </a:schemeClr>
     </dgm:fillClrLst>
-    <dgm:linClrLst>
-      <a:schemeClr val="accent2"/>
+    <dgm:linClrLst meth="repeat">
+      <a:schemeClr val="accent1">
+        <a:tint val="50000"/>
+      </a:schemeClr>
     </dgm:linClrLst>
     <dgm:effectClrLst/>
     <dgm:txLinClrLst/>
@@ -1622,7 +958,7 @@
   </dgm:styleLbl>
   <dgm:styleLbl name="bgShp">
     <dgm:fillClrLst meth="repeat">
-      <a:schemeClr val="accent5">
+      <a:schemeClr val="accent1">
         <a:tint val="40000"/>
       </a:schemeClr>
     </dgm:fillClrLst>
@@ -1638,7 +974,7 @@
   </dgm:styleLbl>
   <dgm:styleLbl name="dkBgShp">
     <dgm:fillClrLst meth="repeat">
-      <a:schemeClr val="accent5">
+      <a:schemeClr val="accent1">
         <a:shade val="90000"/>
       </a:schemeClr>
     </dgm:fillClrLst>
@@ -1654,13 +990,13 @@
   </dgm:styleLbl>
   <dgm:styleLbl name="trBgShp">
     <dgm:fillClrLst meth="repeat">
-      <a:schemeClr val="accent5">
+      <a:schemeClr val="accent1">
         <a:tint val="50000"/>
         <a:alpha val="40000"/>
       </a:schemeClr>
     </dgm:fillClrLst>
     <dgm:linClrLst meth="repeat">
-      <a:schemeClr val="accent5"/>
+      <a:schemeClr val="accent1"/>
     </dgm:linClrLst>
     <dgm:effectClrLst/>
     <dgm:txLinClrLst/>
@@ -1671,7 +1007,7 @@
   </dgm:styleLbl>
   <dgm:styleLbl name="fgShp">
     <dgm:fillClrLst meth="repeat">
-      <a:schemeClr val="accent5">
+      <a:schemeClr val="accent1">
         <a:tint val="40000"/>
       </a:schemeClr>
     </dgm:fillClrLst>
@@ -2631,7 +1967,7 @@
 <dgm:dataModel xmlns:dgm="http://schemas.openxmlformats.org/drawingml/2006/diagram" xmlns:a="http://schemas.openxmlformats.org/drawingml/2006/main">
   <dgm:ptLst>
     <dgm:pt modelId="{89D3D8B0-0F1F-4859-8360-834871EA05CB}" type="doc">
-      <dgm:prSet loTypeId="urn:microsoft.com/office/officeart/2005/8/layout/hierarchy1" loCatId="hierarchy" qsTypeId="urn:microsoft.com/office/officeart/2005/8/quickstyle/simple4" qsCatId="simple" csTypeId="urn:microsoft.com/office/officeart/2005/8/colors/colorful5" csCatId="colorful" phldr="1"/>
+      <dgm:prSet loTypeId="urn:microsoft.com/office/officeart/2005/8/layout/hierarchy1" loCatId="hierarchy" qsTypeId="urn:microsoft.com/office/officeart/2005/8/quickstyle/simple4" qsCatId="simple" csTypeId="urn:microsoft.com/office/officeart/2005/8/colors/accent1_5" csCatId="accent1" phldr="1"/>
       <dgm:spPr/>
       <dgm:t>
         <a:bodyPr/>
@@ -2657,7 +1993,7 @@
           </a:r>
           <a:r>
             <a:rPr lang="it-IT" dirty="0"/>
-            <a:t> regolare:</a:t>
+            <a:t> regolare</a:t>
           </a:r>
           <a:endParaRPr lang="en-US" dirty="0"/>
         </a:p>
@@ -3015,9 +2351,6 @@
             <a:fillRect/>
           </a:stretch>
         </a:blipFill>
-        <a:ln>
-          <a:noFill/>
-        </a:ln>
       </dgm:spPr>
       <dgm:extLst>
         <a:ext uri="{E40237B7-FDA0-4F09-8148-C483321AD2D9}">
@@ -3068,9 +2401,6 @@
             <a:fillRect/>
           </a:stretch>
         </a:blipFill>
-        <a:ln>
-          <a:noFill/>
-        </a:ln>
       </dgm:spPr>
       <dgm:extLst>
         <a:ext uri="{E40237B7-FDA0-4F09-8148-C483321AD2D9}">
@@ -3164,7 +2494,8 @@
         <a:noFill/>
         <a:ln w="6350" cap="flat" cmpd="sng" algn="ctr">
           <a:solidFill>
-            <a:schemeClr val="accent6">
+            <a:schemeClr val="accent1">
+              <a:tint val="90000"/>
               <a:hueOff val="0"/>
               <a:satOff val="0"/>
               <a:lumOff val="0"/>
@@ -3225,7 +2556,8 @@
         <a:noFill/>
         <a:ln w="6350" cap="flat" cmpd="sng" algn="ctr">
           <a:solidFill>
-            <a:schemeClr val="accent6">
+            <a:schemeClr val="accent1">
+              <a:tint val="90000"/>
               <a:hueOff val="0"/>
               <a:satOff val="0"/>
               <a:lumOff val="0"/>
@@ -3268,7 +2600,8 @@
         <a:gradFill rotWithShape="0">
           <a:gsLst>
             <a:gs pos="0">
-              <a:schemeClr val="accent4">
+              <a:schemeClr val="accent1">
+                <a:alpha val="80000"/>
                 <a:hueOff val="0"/>
                 <a:satOff val="0"/>
                 <a:lumOff val="0"/>
@@ -3279,7 +2612,8 @@
               </a:schemeClr>
             </a:gs>
             <a:gs pos="50000">
-              <a:schemeClr val="accent4">
+              <a:schemeClr val="accent1">
+                <a:alpha val="80000"/>
                 <a:hueOff val="0"/>
                 <a:satOff val="0"/>
                 <a:lumOff val="0"/>
@@ -3290,7 +2624,8 @@
               </a:schemeClr>
             </a:gs>
             <a:gs pos="100000">
-              <a:schemeClr val="accent4">
+              <a:schemeClr val="accent1">
+                <a:alpha val="80000"/>
                 <a:hueOff val="0"/>
                 <a:satOff val="0"/>
                 <a:lumOff val="0"/>
@@ -3349,7 +2684,8 @@
         </a:solidFill>
         <a:ln w="6350" cap="flat" cmpd="sng" algn="ctr">
           <a:solidFill>
-            <a:schemeClr val="accent4">
+            <a:schemeClr val="accent1">
+              <a:shade val="80000"/>
               <a:hueOff val="0"/>
               <a:satOff val="0"/>
               <a:lumOff val="0"/>
@@ -3399,7 +2735,7 @@
           </a:r>
           <a:r>
             <a:rPr lang="it-IT" sz="2000" kern="1200" dirty="0"/>
-            <a:t> regolare:</a:t>
+            <a:t> regolare</a:t>
           </a:r>
           <a:endParaRPr lang="en-US" sz="2000" kern="1200" dirty="0"/>
         </a:p>
@@ -3427,7 +2763,8 @@
         <a:gradFill rotWithShape="0">
           <a:gsLst>
             <a:gs pos="0">
-              <a:schemeClr val="accent6">
+              <a:schemeClr val="accent1">
+                <a:alpha val="70000"/>
                 <a:hueOff val="0"/>
                 <a:satOff val="0"/>
                 <a:lumOff val="0"/>
@@ -3438,7 +2775,8 @@
               </a:schemeClr>
             </a:gs>
             <a:gs pos="50000">
-              <a:schemeClr val="accent6">
+              <a:schemeClr val="accent1">
+                <a:alpha val="70000"/>
                 <a:hueOff val="0"/>
                 <a:satOff val="0"/>
                 <a:lumOff val="0"/>
@@ -3449,7 +2787,8 @@
               </a:schemeClr>
             </a:gs>
             <a:gs pos="100000">
-              <a:schemeClr val="accent6">
+              <a:schemeClr val="accent1">
+                <a:alpha val="70000"/>
                 <a:hueOff val="0"/>
                 <a:satOff val="0"/>
                 <a:lumOff val="0"/>
@@ -3508,7 +2847,8 @@
         </a:solidFill>
         <a:ln w="6350" cap="flat" cmpd="sng" algn="ctr">
           <a:solidFill>
-            <a:schemeClr val="accent6">
+            <a:schemeClr val="accent1">
+              <a:tint val="90000"/>
               <a:hueOff val="0"/>
               <a:satOff val="0"/>
               <a:lumOff val="0"/>
@@ -3580,7 +2920,8 @@
         <a:gradFill rotWithShape="0">
           <a:gsLst>
             <a:gs pos="0">
-              <a:schemeClr val="accent6">
+              <a:schemeClr val="accent1">
+                <a:alpha val="70000"/>
                 <a:hueOff val="0"/>
                 <a:satOff val="0"/>
                 <a:lumOff val="0"/>
@@ -3591,7 +2932,8 @@
               </a:schemeClr>
             </a:gs>
             <a:gs pos="50000">
-              <a:schemeClr val="accent6">
+              <a:schemeClr val="accent1">
+                <a:alpha val="70000"/>
                 <a:hueOff val="0"/>
                 <a:satOff val="0"/>
                 <a:lumOff val="0"/>
@@ -3602,7 +2944,8 @@
               </a:schemeClr>
             </a:gs>
             <a:gs pos="100000">
-              <a:schemeClr val="accent6">
+              <a:schemeClr val="accent1">
+                <a:alpha val="70000"/>
                 <a:hueOff val="0"/>
                 <a:satOff val="0"/>
                 <a:lumOff val="0"/>
@@ -3661,7 +3004,8 @@
         </a:solidFill>
         <a:ln w="6350" cap="flat" cmpd="sng" algn="ctr">
           <a:solidFill>
-            <a:schemeClr val="accent6">
+            <a:schemeClr val="accent1">
+              <a:tint val="90000"/>
               <a:hueOff val="0"/>
               <a:satOff val="0"/>
               <a:lumOff val="0"/>
@@ -3796,7 +3140,15 @@
           </a:stretch>
         </a:blipFill>
         <a:ln w="12700" cap="flat" cmpd="sng" algn="ctr">
-          <a:noFill/>
+          <a:solidFill>
+            <a:schemeClr val="lt1">
+              <a:alpha val="0"/>
+              <a:hueOff val="0"/>
+              <a:satOff val="0"/>
+              <a:lumOff val="0"/>
+              <a:alphaOff val="0"/>
+            </a:schemeClr>
+          </a:solidFill>
           <a:prstDash val="solid"/>
           <a:miter lim="800000"/>
         </a:ln>
@@ -3950,7 +3302,15 @@
           </a:stretch>
         </a:blipFill>
         <a:ln w="12700" cap="flat" cmpd="sng" algn="ctr">
-          <a:noFill/>
+          <a:solidFill>
+            <a:schemeClr val="lt1">
+              <a:alpha val="0"/>
+              <a:hueOff val="0"/>
+              <a:satOff val="0"/>
+              <a:lumOff val="0"/>
+              <a:alphaOff val="0"/>
+            </a:schemeClr>
+          </a:solidFill>
           <a:prstDash val="solid"/>
           <a:miter lim="800000"/>
         </a:ln>
@@ -6967,7 +6327,7 @@
           <a:p>
             <a:fld id="{5030D8C6-8935-5E47-AB3F-62EA49D23738}" type="datetimeFigureOut">
               <a:rPr lang="it-IT" smtClean="0"/>
-              <a:t>15/06/20</a:t>
+              <a:t>16/06/2020</a:t>
             </a:fld>
             <a:endParaRPr lang="it-IT"/>
           </a:p>
@@ -7390,7 +6750,7 @@
           <a:p>
             <a:fld id="{5927EEF2-1028-B14B-8880-BF80AABFFD88}" type="datetime1">
               <a:rPr lang="it-IT" smtClean="0"/>
-              <a:t>15/06/20</a:t>
+              <a:t>16/06/2020</a:t>
             </a:fld>
             <a:endParaRPr lang="en-US" dirty="0"/>
           </a:p>
@@ -7764,7 +7124,7 @@
           <a:p>
             <a:fld id="{ADD2F0E7-99DD-7248-B3AF-B22FE1EEB9A3}" type="datetime1">
               <a:rPr lang="it-IT" smtClean="0"/>
-              <a:t>15/06/20</a:t>
+              <a:t>16/06/2020</a:t>
             </a:fld>
             <a:endParaRPr lang="en-US"/>
           </a:p>
@@ -7977,7 +7337,7 @@
           <a:p>
             <a:fld id="{3A6E445A-5A43-BE4E-8F7D-463728FB0AE3}" type="datetime1">
               <a:rPr lang="it-IT" smtClean="0"/>
-              <a:t>15/06/20</a:t>
+              <a:t>16/06/2020</a:t>
             </a:fld>
             <a:endParaRPr lang="en-US"/>
           </a:p>
@@ -8451,7 +7811,7 @@
           <a:p>
             <a:fld id="{CF66A625-8208-F44C-B62F-756814EDEBC2}" type="datetime1">
               <a:rPr lang="it-IT" smtClean="0"/>
-              <a:t>15/06/20</a:t>
+              <a:t>16/06/2020</a:t>
             </a:fld>
             <a:endParaRPr lang="en-US"/>
           </a:p>
@@ -8909,7 +8269,7 @@
           <a:p>
             <a:fld id="{23D1705C-4E0B-4F4E-BF63-BA798587F4D7}" type="datetime1">
               <a:rPr lang="it-IT" smtClean="0"/>
-              <a:t>15/06/20</a:t>
+              <a:t>16/06/2020</a:t>
             </a:fld>
             <a:endParaRPr lang="en-US"/>
           </a:p>
@@ -9445,7 +8805,7 @@
           <a:p>
             <a:fld id="{B4541556-65D6-E34D-AE1E-5A50024DA286}" type="datetime1">
               <a:rPr lang="it-IT" smtClean="0"/>
-              <a:t>15/06/20</a:t>
+              <a:t>16/06/2020</a:t>
             </a:fld>
             <a:endParaRPr lang="en-US"/>
           </a:p>
@@ -10148,7 +9508,7 @@
           <a:p>
             <a:fld id="{10E37808-EBF4-024B-8551-FAEF55DCED40}" type="datetime1">
               <a:rPr lang="it-IT" smtClean="0"/>
-              <a:t>15/06/20</a:t>
+              <a:t>16/06/2020</a:t>
             </a:fld>
             <a:endParaRPr lang="en-US"/>
           </a:p>
@@ -10481,7 +9841,7 @@
           <a:p>
             <a:fld id="{7518B78B-0BD1-2647-B2B6-B165EA2248D3}" type="datetime1">
               <a:rPr lang="it-IT" smtClean="0"/>
-              <a:t>15/06/20</a:t>
+              <a:t>16/06/2020</a:t>
             </a:fld>
             <a:endParaRPr lang="en-US"/>
           </a:p>
@@ -10598,7 +9958,7 @@
           <a:p>
             <a:fld id="{E390B5C8-FF7F-A946-973B-6F279F61853F}" type="datetime1">
               <a:rPr lang="it-IT" smtClean="0"/>
-              <a:t>15/06/20</a:t>
+              <a:t>16/06/2020</a:t>
             </a:fld>
             <a:endParaRPr lang="en-US"/>
           </a:p>
@@ -11097,7 +10457,7 @@
           <a:p>
             <a:fld id="{694A84A1-2BCC-134B-A487-D400AFE4DC7A}" type="datetime1">
               <a:rPr lang="it-IT" smtClean="0"/>
-              <a:t>15/06/20</a:t>
+              <a:t>16/06/2020</a:t>
             </a:fld>
             <a:endParaRPr lang="en-US" dirty="0"/>
           </a:p>
@@ -11578,7 +10938,7 @@
           <a:p>
             <a:fld id="{4771BB6F-DA11-6548-A837-D909066AA708}" type="datetime1">
               <a:rPr lang="it-IT" smtClean="0"/>
-              <a:t>15/06/20</a:t>
+              <a:t>16/06/2020</a:t>
             </a:fld>
             <a:endParaRPr lang="en-US"/>
           </a:p>
@@ -11825,7 +11185,7 @@
           <a:p>
             <a:fld id="{F37B283B-76FB-0647-A01F-CF48E4565E8B}" type="datetime1">
               <a:rPr lang="it-IT" smtClean="0"/>
-              <a:t>15/06/20</a:t>
+              <a:t>16/06/2020</a:t>
             </a:fld>
             <a:endParaRPr lang="en-US"/>
           </a:p>
@@ -12459,8 +11819,28 @@
           <a:lstStyle/>
           <a:p>
             <a:r>
+              <a:rPr lang="it-IT" sz="4800" b="1" dirty="0">
+                <a:solidFill>
+                  <a:schemeClr val="accent1"/>
+                </a:solidFill>
+              </a:rPr>
+              <a:t>YouTube </a:t>
+            </a:r>
+            <a:r>
               <a:rPr lang="it-IT" sz="4800" dirty="0"/>
-              <a:t>YouTube al tempo del Covid-19	</a:t>
+              <a:t>al tempo del </a:t>
+            </a:r>
+            <a:r>
+              <a:rPr lang="it-IT" sz="4800" b="1" dirty="0">
+                <a:solidFill>
+                  <a:schemeClr val="accent1"/>
+                </a:solidFill>
+              </a:rPr>
+              <a:t>Covid-19</a:t>
+            </a:r>
+            <a:r>
+              <a:rPr lang="it-IT" sz="4800" dirty="0"/>
+              <a:t>	</a:t>
             </a:r>
           </a:p>
         </p:txBody>
@@ -12800,14 +12180,127 @@
         </p:nvSpPr>
         <p:spPr>
           <a:xfrm>
-            <a:off x="1115568" y="2478024"/>
-            <a:ext cx="4980432" cy="3694176"/>
+            <a:off x="2409530" y="2478024"/>
+            <a:ext cx="3269527" cy="2989686"/>
           </a:xfrm>
+          <a:custGeom>
+            <a:avLst/>
+            <a:gdLst>
+              <a:gd name="connsiteX0" fmla="*/ 0 w 3269527"/>
+              <a:gd name="connsiteY0" fmla="*/ 0 h 2989686"/>
+              <a:gd name="connsiteX1" fmla="*/ 3269527 w 3269527"/>
+              <a:gd name="connsiteY1" fmla="*/ 0 h 2989686"/>
+              <a:gd name="connsiteX2" fmla="*/ 3269527 w 3269527"/>
+              <a:gd name="connsiteY2" fmla="*/ 2989686 h 2989686"/>
+              <a:gd name="connsiteX3" fmla="*/ 0 w 3269527"/>
+              <a:gd name="connsiteY3" fmla="*/ 2989686 h 2989686"/>
+              <a:gd name="connsiteX4" fmla="*/ 0 w 3269527"/>
+              <a:gd name="connsiteY4" fmla="*/ 0 h 2989686"/>
+            </a:gdLst>
+            <a:ahLst/>
+            <a:cxnLst>
+              <a:cxn ang="0">
+                <a:pos x="connsiteX0" y="connsiteY0"/>
+              </a:cxn>
+              <a:cxn ang="0">
+                <a:pos x="connsiteX1" y="connsiteY1"/>
+              </a:cxn>
+              <a:cxn ang="0">
+                <a:pos x="connsiteX2" y="connsiteY2"/>
+              </a:cxn>
+              <a:cxn ang="0">
+                <a:pos x="connsiteX3" y="connsiteY3"/>
+              </a:cxn>
+              <a:cxn ang="0">
+                <a:pos x="connsiteX4" y="connsiteY4"/>
+              </a:cxn>
+            </a:cxnLst>
+            <a:rect l="l" t="t" r="r" b="b"/>
+            <a:pathLst>
+              <a:path w="3269527" h="2989686" fill="none" extrusionOk="0">
+                <a:moveTo>
+                  <a:pt x="0" y="0"/>
+                </a:moveTo>
+                <a:cubicBezTo>
+                  <a:pt x="897747" y="-149972"/>
+                  <a:pt x="2160776" y="85198"/>
+                  <a:pt x="3269527" y="0"/>
+                </a:cubicBezTo>
+                <a:cubicBezTo>
+                  <a:pt x="3438938" y="408617"/>
+                  <a:pt x="3355081" y="2231772"/>
+                  <a:pt x="3269527" y="2989686"/>
+                </a:cubicBezTo>
+                <a:cubicBezTo>
+                  <a:pt x="1805907" y="3081062"/>
+                  <a:pt x="826664" y="2983629"/>
+                  <a:pt x="0" y="2989686"/>
+                </a:cubicBezTo>
+                <a:cubicBezTo>
+                  <a:pt x="-92943" y="1949305"/>
+                  <a:pt x="-168235" y="351823"/>
+                  <a:pt x="0" y="0"/>
+                </a:cubicBezTo>
+                <a:close/>
+              </a:path>
+              <a:path w="3269527" h="2989686" stroke="0" extrusionOk="0">
+                <a:moveTo>
+                  <a:pt x="0" y="0"/>
+                </a:moveTo>
+                <a:cubicBezTo>
+                  <a:pt x="1218525" y="-113254"/>
+                  <a:pt x="2729482" y="102601"/>
+                  <a:pt x="3269527" y="0"/>
+                </a:cubicBezTo>
+                <a:cubicBezTo>
+                  <a:pt x="3216702" y="303003"/>
+                  <a:pt x="3392701" y="2666878"/>
+                  <a:pt x="3269527" y="2989686"/>
+                </a:cubicBezTo>
+                <a:cubicBezTo>
+                  <a:pt x="2174144" y="3045496"/>
+                  <a:pt x="455944" y="3158644"/>
+                  <a:pt x="0" y="2989686"/>
+                </a:cubicBezTo>
+                <a:cubicBezTo>
+                  <a:pt x="-144930" y="2423009"/>
+                  <a:pt x="-18259" y="496010"/>
+                  <a:pt x="0" y="0"/>
+                </a:cubicBezTo>
+                <a:close/>
+              </a:path>
+            </a:pathLst>
+          </a:custGeom>
+          <a:ln w="28575">
+            <a:solidFill>
+              <a:schemeClr val="accent1"/>
+            </a:solidFill>
+            <a:prstDash val="dash"/>
+            <a:extLst>
+              <a:ext uri="{C807C97D-BFC1-408E-A445-0C87EB9F89A2}">
+                <ask:lineSketchStyleProps xmlns:ask="http://schemas.microsoft.com/office/drawing/2018/sketchyshapes" sd="3499211612">
+                  <ask:type>
+                    <ask:lineSketchCurved/>
+                  </ask:type>
+                </ask:lineSketchStyleProps>
+              </a:ext>
+            </a:extLst>
+          </a:ln>
         </p:spPr>
         <p:txBody>
-          <a:bodyPr/>
+          <a:bodyPr vert="horz" lIns="91440" tIns="45720" rIns="91440" bIns="45720" rtlCol="0" anchor="t">
+            <a:normAutofit/>
+          </a:bodyPr>
           <a:lstStyle/>
           <a:p>
+            <a:r>
+              <a:rPr lang="it-IT" dirty="0">
+                <a:solidFill>
+                  <a:schemeClr val="accent1"/>
+                </a:solidFill>
+              </a:rPr>
+              <a:t> </a:t>
+            </a:r>
             <a:r>
               <a:rPr lang="it-IT" dirty="0"/>
               <a:t>Title</a:t>
@@ -12815,11 +12308,36 @@
           </a:p>
           <a:p>
             <a:r>
+              <a:rPr lang="it-IT" dirty="0">
+                <a:solidFill>
+                  <a:schemeClr val="accent1"/>
+                </a:solidFill>
+              </a:rPr>
+              <a:t> </a:t>
+            </a:r>
+            <a:r>
+              <a:rPr lang="it-IT" dirty="0" err="1"/>
+              <a:t>View</a:t>
+            </a:r>
+            <a:r>
               <a:rPr lang="it-IT" dirty="0"/>
-              <a:t>View count</a:t>
-            </a:r>
-          </a:p>
-          <a:p>
+              <a:t> </a:t>
+            </a:r>
+            <a:r>
+              <a:rPr lang="it-IT" dirty="0" err="1"/>
+              <a:t>count</a:t>
+            </a:r>
+            <a:endParaRPr lang="it-IT" dirty="0"/>
+          </a:p>
+          <a:p>
+            <a:r>
+              <a:rPr lang="it-IT" dirty="0">
+                <a:solidFill>
+                  <a:schemeClr val="accent1"/>
+                </a:solidFill>
+              </a:rPr>
+              <a:t> </a:t>
+            </a:r>
             <a:r>
               <a:rPr lang="it-IT" dirty="0"/>
               <a:t>Like</a:t>
@@ -12827,15 +12345,41 @@
           </a:p>
           <a:p>
             <a:r>
+              <a:rPr lang="it-IT" dirty="0">
+                <a:solidFill>
+                  <a:schemeClr val="accent1"/>
+                </a:solidFill>
+              </a:rPr>
+              <a:t> </a:t>
+            </a:r>
+            <a:r>
+              <a:rPr lang="it-IT" dirty="0" err="1"/>
+              <a:t>Dislike</a:t>
+            </a:r>
+            <a:endParaRPr lang="it-IT" dirty="0"/>
+          </a:p>
+          <a:p>
+            <a:r>
+              <a:rPr lang="it-IT" dirty="0">
+                <a:solidFill>
+                  <a:schemeClr val="accent1"/>
+                </a:solidFill>
+              </a:rPr>
+              <a:t> </a:t>
+            </a:r>
+            <a:r>
+              <a:rPr lang="it-IT" dirty="0" err="1"/>
+              <a:t>Comment</a:t>
+            </a:r>
+            <a:r>
               <a:rPr lang="it-IT" dirty="0"/>
-              <a:t>Dislike</a:t>
-            </a:r>
-          </a:p>
-          <a:p>
-            <a:r>
-              <a:rPr lang="it-IT" dirty="0"/>
-              <a:t>Comment Count</a:t>
-            </a:r>
+              <a:t> </a:t>
+            </a:r>
+            <a:r>
+              <a:rPr lang="it-IT" dirty="0" err="1"/>
+              <a:t>Count</a:t>
+            </a:r>
+            <a:endParaRPr lang="it-IT" dirty="0"/>
           </a:p>
           <a:p>
             <a:endParaRPr lang="it-IT" dirty="0"/>
@@ -12927,15 +12471,118 @@
         </p:nvSpPr>
         <p:spPr>
           <a:xfrm>
-            <a:off x="6199632" y="2478024"/>
-            <a:ext cx="4980432" cy="3694176"/>
+            <a:off x="6904122" y="2478024"/>
+            <a:ext cx="3255149" cy="2989686"/>
           </a:xfrm>
-          <a:prstGeom prst="rect">
+          <a:custGeom>
             <a:avLst/>
-          </a:prstGeom>
+            <a:gdLst>
+              <a:gd name="connsiteX0" fmla="*/ 0 w 3255149"/>
+              <a:gd name="connsiteY0" fmla="*/ 0 h 2989686"/>
+              <a:gd name="connsiteX1" fmla="*/ 3255149 w 3255149"/>
+              <a:gd name="connsiteY1" fmla="*/ 0 h 2989686"/>
+              <a:gd name="connsiteX2" fmla="*/ 3255149 w 3255149"/>
+              <a:gd name="connsiteY2" fmla="*/ 2989686 h 2989686"/>
+              <a:gd name="connsiteX3" fmla="*/ 0 w 3255149"/>
+              <a:gd name="connsiteY3" fmla="*/ 2989686 h 2989686"/>
+              <a:gd name="connsiteX4" fmla="*/ 0 w 3255149"/>
+              <a:gd name="connsiteY4" fmla="*/ 0 h 2989686"/>
+            </a:gdLst>
+            <a:ahLst/>
+            <a:cxnLst>
+              <a:cxn ang="0">
+                <a:pos x="connsiteX0" y="connsiteY0"/>
+              </a:cxn>
+              <a:cxn ang="0">
+                <a:pos x="connsiteX1" y="connsiteY1"/>
+              </a:cxn>
+              <a:cxn ang="0">
+                <a:pos x="connsiteX2" y="connsiteY2"/>
+              </a:cxn>
+              <a:cxn ang="0">
+                <a:pos x="connsiteX3" y="connsiteY3"/>
+              </a:cxn>
+              <a:cxn ang="0">
+                <a:pos x="connsiteX4" y="connsiteY4"/>
+              </a:cxn>
+            </a:cxnLst>
+            <a:rect l="l" t="t" r="r" b="b"/>
+            <a:pathLst>
+              <a:path w="3255149" h="2989686" fill="none" extrusionOk="0">
+                <a:moveTo>
+                  <a:pt x="0" y="0"/>
+                </a:moveTo>
+                <a:cubicBezTo>
+                  <a:pt x="342226" y="-59067"/>
+                  <a:pt x="2186269" y="-129691"/>
+                  <a:pt x="3255149" y="0"/>
+                </a:cubicBezTo>
+                <a:cubicBezTo>
+                  <a:pt x="3219471" y="1272209"/>
+                  <a:pt x="3180603" y="2332388"/>
+                  <a:pt x="3255149" y="2989686"/>
+                </a:cubicBezTo>
+                <a:cubicBezTo>
+                  <a:pt x="1936786" y="3120674"/>
+                  <a:pt x="1382069" y="2897717"/>
+                  <a:pt x="0" y="2989686"/>
+                </a:cubicBezTo>
+                <a:cubicBezTo>
+                  <a:pt x="168807" y="2459853"/>
+                  <a:pt x="-137122" y="679292"/>
+                  <a:pt x="0" y="0"/>
+                </a:cubicBezTo>
+                <a:close/>
+              </a:path>
+              <a:path w="3255149" h="2989686" stroke="0" extrusionOk="0">
+                <a:moveTo>
+                  <a:pt x="0" y="0"/>
+                </a:moveTo>
+                <a:cubicBezTo>
+                  <a:pt x="1261974" y="124235"/>
+                  <a:pt x="2015331" y="-150204"/>
+                  <a:pt x="3255149" y="0"/>
+                </a:cubicBezTo>
+                <a:cubicBezTo>
+                  <a:pt x="3368459" y="491252"/>
+                  <a:pt x="3103121" y="2346057"/>
+                  <a:pt x="3255149" y="2989686"/>
+                </a:cubicBezTo>
+                <a:cubicBezTo>
+                  <a:pt x="2386192" y="2960926"/>
+                  <a:pt x="463762" y="3019247"/>
+                  <a:pt x="0" y="2989686"/>
+                </a:cubicBezTo>
+                <a:cubicBezTo>
+                  <a:pt x="101116" y="2243071"/>
+                  <a:pt x="-1037" y="1260030"/>
+                  <a:pt x="0" y="0"/>
+                </a:cubicBezTo>
+                <a:close/>
+              </a:path>
+            </a:pathLst>
+          </a:custGeom>
+          <a:ln w="28575">
+            <a:solidFill>
+              <a:schemeClr val="accent1"/>
+            </a:solidFill>
+            <a:prstDash val="dash"/>
+            <a:extLst>
+              <a:ext uri="{C807C97D-BFC1-408E-A445-0C87EB9F89A2}">
+                <ask:lineSketchStyleProps xmlns:ask="http://schemas.microsoft.com/office/drawing/2018/sketchyshapes" sd="283741067">
+                  <a:prstGeom prst="rect">
+                    <a:avLst/>
+                  </a:prstGeom>
+                  <ask:type>
+                    <ask:lineSketchCurved/>
+                  </ask:type>
+                </ask:lineSketchStyleProps>
+              </a:ext>
+            </a:extLst>
+          </a:ln>
         </p:spPr>
         <p:txBody>
-          <a:bodyPr vert="horz" lIns="91440" tIns="45720" rIns="91440" bIns="45720" rtlCol="0">
+          <a:bodyPr vert="horz" lIns="91440" tIns="45720" rIns="91440" bIns="45720" rtlCol="0" anchor="t">
             <a:normAutofit/>
           </a:bodyPr>
           <a:lstStyle>
@@ -13104,11 +12751,31 @@
           </a:lstStyle>
           <a:p>
             <a:r>
+              <a:rPr lang="it-IT" dirty="0">
+                <a:solidFill>
+                  <a:schemeClr val="accent1"/>
+                </a:solidFill>
+              </a:rPr>
+              <a:t> </a:t>
+            </a:r>
+            <a:r>
+              <a:rPr lang="it-IT" dirty="0" err="1"/>
+              <a:t>Category</a:t>
+            </a:r>
+            <a:r>
               <a:rPr lang="it-IT" dirty="0"/>
-              <a:t>Category Name</a:t>
-            </a:r>
-          </a:p>
-          <a:p>
+              <a:t> Name</a:t>
+            </a:r>
+          </a:p>
+          <a:p>
+            <a:r>
+              <a:rPr lang="it-IT" dirty="0">
+                <a:solidFill>
+                  <a:schemeClr val="accent1"/>
+                </a:solidFill>
+              </a:rPr>
+              <a:t> </a:t>
+            </a:r>
             <a:r>
               <a:rPr lang="it-IT" dirty="0"/>
               <a:t>Channel Title</a:t>
@@ -13116,17 +12783,45 @@
           </a:p>
           <a:p>
             <a:r>
+              <a:rPr lang="it-IT" dirty="0">
+                <a:solidFill>
+                  <a:schemeClr val="accent1"/>
+                </a:solidFill>
+              </a:rPr>
+              <a:t> </a:t>
+            </a:r>
+            <a:r>
               <a:rPr lang="it-IT" dirty="0"/>
               <a:t>Country Name</a:t>
             </a:r>
           </a:p>
           <a:p>
             <a:r>
+              <a:rPr lang="it-IT" dirty="0">
+                <a:solidFill>
+                  <a:schemeClr val="accent1"/>
+                </a:solidFill>
+              </a:rPr>
+              <a:t> </a:t>
+            </a:r>
+            <a:r>
+              <a:rPr lang="it-IT" dirty="0" err="1"/>
+              <a:t>Covid</a:t>
+            </a:r>
+            <a:r>
               <a:rPr lang="it-IT" dirty="0"/>
-              <a:t>Covid Title</a:t>
-            </a:r>
-          </a:p>
-          <a:p>
+              <a:t> Title</a:t>
+            </a:r>
+          </a:p>
+          <a:p>
+            <a:r>
+              <a:rPr lang="it-IT" dirty="0">
+                <a:solidFill>
+                  <a:schemeClr val="accent1"/>
+                </a:solidFill>
+              </a:rPr>
+              <a:t> </a:t>
+            </a:r>
             <a:r>
               <a:rPr lang="it-IT" dirty="0"/>
               <a:t>New Cases</a:t>
@@ -13219,7 +12914,7 @@
           <a:p>
             <a:r>
               <a:rPr lang="it-IT" sz="4400" dirty="0"/>
-              <a:t>Un occhio alle infografiche</a:t>
+              <a:t>Le infografiche</a:t>
             </a:r>
           </a:p>
         </p:txBody>
@@ -13240,11 +12935,17 @@
             <p:ph type="body" idx="1"/>
           </p:nvPr>
         </p:nvSpPr>
-        <p:spPr/>
+        <p:spPr>
+          <a:xfrm>
+            <a:off x="1115570" y="2243253"/>
+            <a:ext cx="4520815" cy="550743"/>
+          </a:xfrm>
+        </p:spPr>
         <p:txBody>
           <a:bodyPr/>
           <a:lstStyle/>
           <a:p>
+            <a:pPr algn="ctr"/>
             <a:r>
               <a:rPr lang="it-IT" dirty="0"/>
               <a:t>Prima infografica</a:t>
@@ -13268,11 +12969,17 @@
             <p:ph type="body" sz="quarter" idx="3"/>
           </p:nvPr>
         </p:nvSpPr>
-        <p:spPr/>
+        <p:spPr>
+          <a:xfrm>
+            <a:off x="6345936" y="2243253"/>
+            <a:ext cx="5455345" cy="550743"/>
+          </a:xfrm>
+        </p:spPr>
         <p:txBody>
           <a:bodyPr/>
           <a:lstStyle/>
           <a:p>
+            <a:pPr algn="ctr"/>
             <a:r>
               <a:rPr lang="it-IT" dirty="0"/>
               <a:t>Seconda infografica</a:t>
@@ -13361,8 +13068,8 @@
         </p:blipFill>
         <p:spPr>
           <a:xfrm>
-            <a:off x="6345238" y="3232477"/>
-            <a:ext cx="4938712" cy="2910821"/>
+            <a:off x="6345238" y="2916176"/>
+            <a:ext cx="5456296" cy="3227122"/>
           </a:xfrm>
         </p:spPr>
       </p:pic>
@@ -13390,8 +13097,8 @@
         </p:blipFill>
         <p:spPr>
           <a:xfrm>
-            <a:off x="1542664" y="3203575"/>
-            <a:ext cx="4083822" cy="2968625"/>
+            <a:off x="1111344" y="2916028"/>
+            <a:ext cx="4515142" cy="3227418"/>
           </a:xfrm>
         </p:spPr>
       </p:pic>
@@ -13460,7 +13167,15 @@
           <a:p>
             <a:r>
               <a:rPr lang="it-IT" dirty="0"/>
-              <a:t>Questionari sulla qualità</a:t>
+              <a:t>Questionari sulla </a:t>
+            </a:r>
+            <a:r>
+              <a:rPr lang="it-IT" b="1" dirty="0">
+                <a:solidFill>
+                  <a:schemeClr val="accent1"/>
+                </a:solidFill>
+              </a:rPr>
+              <a:t>qualità</a:t>
             </a:r>
           </a:p>
         </p:txBody>
@@ -13547,9 +13262,542 @@
         </p:blipFill>
         <p:spPr>
           <a:xfrm>
-            <a:off x="908304" y="2648197"/>
-            <a:ext cx="5206842" cy="3524003"/>
+            <a:off x="563248" y="2389405"/>
+            <a:ext cx="5537521" cy="3782795"/>
           </a:xfrm>
+          <a:ln w="28575">
+            <a:solidFill>
+              <a:schemeClr val="accent1"/>
+            </a:solidFill>
+            <a:prstDash val="sysDot"/>
+            <a:extLst>
+              <a:ext uri="{C807C97D-BFC1-408E-A445-0C87EB9F89A2}">
+                <ask:lineSketchStyleProps xmlns:ask="http://schemas.microsoft.com/office/drawing/2018/sketchyshapes" sd="1546443433">
+                  <a:custGeom>
+                    <a:avLst/>
+                    <a:gdLst>
+                      <a:gd name="connsiteX0" fmla="*/ 0 w 5537521"/>
+                      <a:gd name="connsiteY0" fmla="*/ 0 h 3782795"/>
+                      <a:gd name="connsiteX1" fmla="*/ 498377 w 5537521"/>
+                      <a:gd name="connsiteY1" fmla="*/ 0 h 3782795"/>
+                      <a:gd name="connsiteX2" fmla="*/ 941379 w 5537521"/>
+                      <a:gd name="connsiteY2" fmla="*/ 0 h 3782795"/>
+                      <a:gd name="connsiteX3" fmla="*/ 1439755 w 5537521"/>
+                      <a:gd name="connsiteY3" fmla="*/ 0 h 3782795"/>
+                      <a:gd name="connsiteX4" fmla="*/ 1993508 w 5537521"/>
+                      <a:gd name="connsiteY4" fmla="*/ 0 h 3782795"/>
+                      <a:gd name="connsiteX5" fmla="*/ 2602635 w 5537521"/>
+                      <a:gd name="connsiteY5" fmla="*/ 0 h 3782795"/>
+                      <a:gd name="connsiteX6" fmla="*/ 3211762 w 5537521"/>
+                      <a:gd name="connsiteY6" fmla="*/ 0 h 3782795"/>
+                      <a:gd name="connsiteX7" fmla="*/ 3654764 w 5537521"/>
+                      <a:gd name="connsiteY7" fmla="*/ 0 h 3782795"/>
+                      <a:gd name="connsiteX8" fmla="*/ 4153141 w 5537521"/>
+                      <a:gd name="connsiteY8" fmla="*/ 0 h 3782795"/>
+                      <a:gd name="connsiteX9" fmla="*/ 4540767 w 5537521"/>
+                      <a:gd name="connsiteY9" fmla="*/ 0 h 3782795"/>
+                      <a:gd name="connsiteX10" fmla="*/ 5537521 w 5537521"/>
+                      <a:gd name="connsiteY10" fmla="*/ 0 h 3782795"/>
+                      <a:gd name="connsiteX11" fmla="*/ 5537521 w 5537521"/>
+                      <a:gd name="connsiteY11" fmla="*/ 578227 h 3782795"/>
+                      <a:gd name="connsiteX12" fmla="*/ 5537521 w 5537521"/>
+                      <a:gd name="connsiteY12" fmla="*/ 1194282 h 3782795"/>
+                      <a:gd name="connsiteX13" fmla="*/ 5537521 w 5537521"/>
+                      <a:gd name="connsiteY13" fmla="*/ 1621198 h 3782795"/>
+                      <a:gd name="connsiteX14" fmla="*/ 5537521 w 5537521"/>
+                      <a:gd name="connsiteY14" fmla="*/ 2237253 h 3782795"/>
+                      <a:gd name="connsiteX15" fmla="*/ 5537521 w 5537521"/>
+                      <a:gd name="connsiteY15" fmla="*/ 2853308 h 3782795"/>
+                      <a:gd name="connsiteX16" fmla="*/ 5537521 w 5537521"/>
+                      <a:gd name="connsiteY16" fmla="*/ 3782795 h 3782795"/>
+                      <a:gd name="connsiteX17" fmla="*/ 5039144 w 5537521"/>
+                      <a:gd name="connsiteY17" fmla="*/ 3782795 h 3782795"/>
+                      <a:gd name="connsiteX18" fmla="*/ 4485392 w 5537521"/>
+                      <a:gd name="connsiteY18" fmla="*/ 3782795 h 3782795"/>
+                      <a:gd name="connsiteX19" fmla="*/ 4042390 w 5537521"/>
+                      <a:gd name="connsiteY19" fmla="*/ 3782795 h 3782795"/>
+                      <a:gd name="connsiteX20" fmla="*/ 3433263 w 5537521"/>
+                      <a:gd name="connsiteY20" fmla="*/ 3782795 h 3782795"/>
+                      <a:gd name="connsiteX21" fmla="*/ 2990261 w 5537521"/>
+                      <a:gd name="connsiteY21" fmla="*/ 3782795 h 3782795"/>
+                      <a:gd name="connsiteX22" fmla="*/ 2436509 w 5537521"/>
+                      <a:gd name="connsiteY22" fmla="*/ 3782795 h 3782795"/>
+                      <a:gd name="connsiteX23" fmla="*/ 2048883 w 5537521"/>
+                      <a:gd name="connsiteY23" fmla="*/ 3782795 h 3782795"/>
+                      <a:gd name="connsiteX24" fmla="*/ 1605881 w 5537521"/>
+                      <a:gd name="connsiteY24" fmla="*/ 3782795 h 3782795"/>
+                      <a:gd name="connsiteX25" fmla="*/ 941379 w 5537521"/>
+                      <a:gd name="connsiteY25" fmla="*/ 3782795 h 3782795"/>
+                      <a:gd name="connsiteX26" fmla="*/ 0 w 5537521"/>
+                      <a:gd name="connsiteY26" fmla="*/ 3782795 h 3782795"/>
+                      <a:gd name="connsiteX27" fmla="*/ 0 w 5537521"/>
+                      <a:gd name="connsiteY27" fmla="*/ 3355880 h 3782795"/>
+                      <a:gd name="connsiteX28" fmla="*/ 0 w 5537521"/>
+                      <a:gd name="connsiteY28" fmla="*/ 2739824 h 3782795"/>
+                      <a:gd name="connsiteX29" fmla="*/ 0 w 5537521"/>
+                      <a:gd name="connsiteY29" fmla="*/ 2123769 h 3782795"/>
+                      <a:gd name="connsiteX30" fmla="*/ 0 w 5537521"/>
+                      <a:gd name="connsiteY30" fmla="*/ 1583370 h 3782795"/>
+                      <a:gd name="connsiteX31" fmla="*/ 0 w 5537521"/>
+                      <a:gd name="connsiteY31" fmla="*/ 1005143 h 3782795"/>
+                      <a:gd name="connsiteX32" fmla="*/ 0 w 5537521"/>
+                      <a:gd name="connsiteY32" fmla="*/ 0 h 3782795"/>
+                    </a:gdLst>
+                    <a:ahLst/>
+                    <a:cxnLst>
+                      <a:cxn ang="0">
+                        <a:pos x="connsiteX0" y="connsiteY0"/>
+                      </a:cxn>
+                      <a:cxn ang="0">
+                        <a:pos x="connsiteX1" y="connsiteY1"/>
+                      </a:cxn>
+                      <a:cxn ang="0">
+                        <a:pos x="connsiteX2" y="connsiteY2"/>
+                      </a:cxn>
+                      <a:cxn ang="0">
+                        <a:pos x="connsiteX3" y="connsiteY3"/>
+                      </a:cxn>
+                      <a:cxn ang="0">
+                        <a:pos x="connsiteX4" y="connsiteY4"/>
+                      </a:cxn>
+                      <a:cxn ang="0">
+                        <a:pos x="connsiteX5" y="connsiteY5"/>
+                      </a:cxn>
+                      <a:cxn ang="0">
+                        <a:pos x="connsiteX6" y="connsiteY6"/>
+                      </a:cxn>
+                      <a:cxn ang="0">
+                        <a:pos x="connsiteX7" y="connsiteY7"/>
+                      </a:cxn>
+                      <a:cxn ang="0">
+                        <a:pos x="connsiteX8" y="connsiteY8"/>
+                      </a:cxn>
+                      <a:cxn ang="0">
+                        <a:pos x="connsiteX9" y="connsiteY9"/>
+                      </a:cxn>
+                      <a:cxn ang="0">
+                        <a:pos x="connsiteX10" y="connsiteY10"/>
+                      </a:cxn>
+                      <a:cxn ang="0">
+                        <a:pos x="connsiteX11" y="connsiteY11"/>
+                      </a:cxn>
+                      <a:cxn ang="0">
+                        <a:pos x="connsiteX12" y="connsiteY12"/>
+                      </a:cxn>
+                      <a:cxn ang="0">
+                        <a:pos x="connsiteX13" y="connsiteY13"/>
+                      </a:cxn>
+                      <a:cxn ang="0">
+                        <a:pos x="connsiteX14" y="connsiteY14"/>
+                      </a:cxn>
+                      <a:cxn ang="0">
+                        <a:pos x="connsiteX15" y="connsiteY15"/>
+                      </a:cxn>
+                      <a:cxn ang="0">
+                        <a:pos x="connsiteX16" y="connsiteY16"/>
+                      </a:cxn>
+                      <a:cxn ang="0">
+                        <a:pos x="connsiteX17" y="connsiteY17"/>
+                      </a:cxn>
+                      <a:cxn ang="0">
+                        <a:pos x="connsiteX18" y="connsiteY18"/>
+                      </a:cxn>
+                      <a:cxn ang="0">
+                        <a:pos x="connsiteX19" y="connsiteY19"/>
+                      </a:cxn>
+                      <a:cxn ang="0">
+                        <a:pos x="connsiteX20" y="connsiteY20"/>
+                      </a:cxn>
+                      <a:cxn ang="0">
+                        <a:pos x="connsiteX21" y="connsiteY21"/>
+                      </a:cxn>
+                      <a:cxn ang="0">
+                        <a:pos x="connsiteX22" y="connsiteY22"/>
+                      </a:cxn>
+                      <a:cxn ang="0">
+                        <a:pos x="connsiteX23" y="connsiteY23"/>
+                      </a:cxn>
+                      <a:cxn ang="0">
+                        <a:pos x="connsiteX24" y="connsiteY24"/>
+                      </a:cxn>
+                      <a:cxn ang="0">
+                        <a:pos x="connsiteX25" y="connsiteY25"/>
+                      </a:cxn>
+                      <a:cxn ang="0">
+                        <a:pos x="connsiteX26" y="connsiteY26"/>
+                      </a:cxn>
+                      <a:cxn ang="0">
+                        <a:pos x="connsiteX27" y="connsiteY27"/>
+                      </a:cxn>
+                      <a:cxn ang="0">
+                        <a:pos x="connsiteX28" y="connsiteY28"/>
+                      </a:cxn>
+                      <a:cxn ang="0">
+                        <a:pos x="connsiteX29" y="connsiteY29"/>
+                      </a:cxn>
+                      <a:cxn ang="0">
+                        <a:pos x="connsiteX30" y="connsiteY30"/>
+                      </a:cxn>
+                      <a:cxn ang="0">
+                        <a:pos x="connsiteX31" y="connsiteY31"/>
+                      </a:cxn>
+                      <a:cxn ang="0">
+                        <a:pos x="connsiteX32" y="connsiteY32"/>
+                      </a:cxn>
+                    </a:cxnLst>
+                    <a:rect l="l" t="t" r="r" b="b"/>
+                    <a:pathLst>
+                      <a:path w="5537521" h="3782795" fill="none" extrusionOk="0">
+                        <a:moveTo>
+                          <a:pt x="0" y="0"/>
+                        </a:moveTo>
+                        <a:cubicBezTo>
+                          <a:pt x="115154" y="-4330"/>
+                          <a:pt x="258390" y="36003"/>
+                          <a:pt x="498377" y="0"/>
+                        </a:cubicBezTo>
+                        <a:cubicBezTo>
+                          <a:pt x="738364" y="-36003"/>
+                          <a:pt x="770848" y="37777"/>
+                          <a:pt x="941379" y="0"/>
+                        </a:cubicBezTo>
+                        <a:cubicBezTo>
+                          <a:pt x="1111910" y="-37777"/>
+                          <a:pt x="1294472" y="19825"/>
+                          <a:pt x="1439755" y="0"/>
+                        </a:cubicBezTo>
+                        <a:cubicBezTo>
+                          <a:pt x="1585038" y="-19825"/>
+                          <a:pt x="1724702" y="17736"/>
+                          <a:pt x="1993508" y="0"/>
+                        </a:cubicBezTo>
+                        <a:cubicBezTo>
+                          <a:pt x="2262314" y="-17736"/>
+                          <a:pt x="2474005" y="26946"/>
+                          <a:pt x="2602635" y="0"/>
+                        </a:cubicBezTo>
+                        <a:cubicBezTo>
+                          <a:pt x="2731265" y="-26946"/>
+                          <a:pt x="2929590" y="49824"/>
+                          <a:pt x="3211762" y="0"/>
+                        </a:cubicBezTo>
+                        <a:cubicBezTo>
+                          <a:pt x="3493934" y="-49824"/>
+                          <a:pt x="3474938" y="18647"/>
+                          <a:pt x="3654764" y="0"/>
+                        </a:cubicBezTo>
+                        <a:cubicBezTo>
+                          <a:pt x="3834590" y="-18647"/>
+                          <a:pt x="4051611" y="45828"/>
+                          <a:pt x="4153141" y="0"/>
+                        </a:cubicBezTo>
+                        <a:cubicBezTo>
+                          <a:pt x="4254671" y="-45828"/>
+                          <a:pt x="4440198" y="5423"/>
+                          <a:pt x="4540767" y="0"/>
+                        </a:cubicBezTo>
+                        <a:cubicBezTo>
+                          <a:pt x="4641336" y="-5423"/>
+                          <a:pt x="5111864" y="82044"/>
+                          <a:pt x="5537521" y="0"/>
+                        </a:cubicBezTo>
+                        <a:cubicBezTo>
+                          <a:pt x="5601301" y="121920"/>
+                          <a:pt x="5468183" y="432361"/>
+                          <a:pt x="5537521" y="578227"/>
+                        </a:cubicBezTo>
+                        <a:cubicBezTo>
+                          <a:pt x="5606859" y="724093"/>
+                          <a:pt x="5534023" y="979995"/>
+                          <a:pt x="5537521" y="1194282"/>
+                        </a:cubicBezTo>
+                        <a:cubicBezTo>
+                          <a:pt x="5541019" y="1408569"/>
+                          <a:pt x="5497141" y="1466470"/>
+                          <a:pt x="5537521" y="1621198"/>
+                        </a:cubicBezTo>
+                        <a:cubicBezTo>
+                          <a:pt x="5577901" y="1775926"/>
+                          <a:pt x="5469138" y="1961576"/>
+                          <a:pt x="5537521" y="2237253"/>
+                        </a:cubicBezTo>
+                        <a:cubicBezTo>
+                          <a:pt x="5605904" y="2512930"/>
+                          <a:pt x="5519142" y="2668067"/>
+                          <a:pt x="5537521" y="2853308"/>
+                        </a:cubicBezTo>
+                        <a:cubicBezTo>
+                          <a:pt x="5555900" y="3038549"/>
+                          <a:pt x="5502678" y="3531262"/>
+                          <a:pt x="5537521" y="3782795"/>
+                        </a:cubicBezTo>
+                        <a:cubicBezTo>
+                          <a:pt x="5378724" y="3827869"/>
+                          <a:pt x="5245583" y="3728128"/>
+                          <a:pt x="5039144" y="3782795"/>
+                        </a:cubicBezTo>
+                        <a:cubicBezTo>
+                          <a:pt x="4832705" y="3837462"/>
+                          <a:pt x="4704468" y="3751304"/>
+                          <a:pt x="4485392" y="3782795"/>
+                        </a:cubicBezTo>
+                        <a:cubicBezTo>
+                          <a:pt x="4266316" y="3814286"/>
+                          <a:pt x="4243507" y="3755674"/>
+                          <a:pt x="4042390" y="3782795"/>
+                        </a:cubicBezTo>
+                        <a:cubicBezTo>
+                          <a:pt x="3841273" y="3809916"/>
+                          <a:pt x="3618512" y="3766503"/>
+                          <a:pt x="3433263" y="3782795"/>
+                        </a:cubicBezTo>
+                        <a:cubicBezTo>
+                          <a:pt x="3248014" y="3799087"/>
+                          <a:pt x="3151369" y="3770432"/>
+                          <a:pt x="2990261" y="3782795"/>
+                        </a:cubicBezTo>
+                        <a:cubicBezTo>
+                          <a:pt x="2829153" y="3795158"/>
+                          <a:pt x="2643591" y="3765375"/>
+                          <a:pt x="2436509" y="3782795"/>
+                        </a:cubicBezTo>
+                        <a:cubicBezTo>
+                          <a:pt x="2229427" y="3800215"/>
+                          <a:pt x="2185267" y="3739737"/>
+                          <a:pt x="2048883" y="3782795"/>
+                        </a:cubicBezTo>
+                        <a:cubicBezTo>
+                          <a:pt x="1912499" y="3825853"/>
+                          <a:pt x="1780382" y="3773007"/>
+                          <a:pt x="1605881" y="3782795"/>
+                        </a:cubicBezTo>
+                        <a:cubicBezTo>
+                          <a:pt x="1431380" y="3792583"/>
+                          <a:pt x="1239129" y="3766516"/>
+                          <a:pt x="941379" y="3782795"/>
+                        </a:cubicBezTo>
+                        <a:cubicBezTo>
+                          <a:pt x="643629" y="3799074"/>
+                          <a:pt x="459727" y="3763142"/>
+                          <a:pt x="0" y="3782795"/>
+                        </a:cubicBezTo>
+                        <a:cubicBezTo>
+                          <a:pt x="-407" y="3592073"/>
+                          <a:pt x="27437" y="3490240"/>
+                          <a:pt x="0" y="3355880"/>
+                        </a:cubicBezTo>
+                        <a:cubicBezTo>
+                          <a:pt x="-27437" y="3221521"/>
+                          <a:pt x="34072" y="2942416"/>
+                          <a:pt x="0" y="2739824"/>
+                        </a:cubicBezTo>
+                        <a:cubicBezTo>
+                          <a:pt x="-34072" y="2537232"/>
+                          <a:pt x="16434" y="2261628"/>
+                          <a:pt x="0" y="2123769"/>
+                        </a:cubicBezTo>
+                        <a:cubicBezTo>
+                          <a:pt x="-16434" y="1985911"/>
+                          <a:pt x="28531" y="1775619"/>
+                          <a:pt x="0" y="1583370"/>
+                        </a:cubicBezTo>
+                        <a:cubicBezTo>
+                          <a:pt x="-28531" y="1391121"/>
+                          <a:pt x="61073" y="1192701"/>
+                          <a:pt x="0" y="1005143"/>
+                        </a:cubicBezTo>
+                        <a:cubicBezTo>
+                          <a:pt x="-61073" y="817585"/>
+                          <a:pt x="21542" y="302921"/>
+                          <a:pt x="0" y="0"/>
+                        </a:cubicBezTo>
+                        <a:close/>
+                      </a:path>
+                      <a:path w="5537521" h="3782795" stroke="0" extrusionOk="0">
+                        <a:moveTo>
+                          <a:pt x="0" y="0"/>
+                        </a:moveTo>
+                        <a:cubicBezTo>
+                          <a:pt x="84578" y="-42639"/>
+                          <a:pt x="289214" y="27554"/>
+                          <a:pt x="387626" y="0"/>
+                        </a:cubicBezTo>
+                        <a:cubicBezTo>
+                          <a:pt x="486038" y="-27554"/>
+                          <a:pt x="631512" y="50226"/>
+                          <a:pt x="830628" y="0"/>
+                        </a:cubicBezTo>
+                        <a:cubicBezTo>
+                          <a:pt x="1029744" y="-50226"/>
+                          <a:pt x="1170152" y="36868"/>
+                          <a:pt x="1273630" y="0"/>
+                        </a:cubicBezTo>
+                        <a:cubicBezTo>
+                          <a:pt x="1377108" y="-36868"/>
+                          <a:pt x="1602647" y="48911"/>
+                          <a:pt x="1716632" y="0"/>
+                        </a:cubicBezTo>
+                        <a:cubicBezTo>
+                          <a:pt x="1830617" y="-48911"/>
+                          <a:pt x="2040714" y="21042"/>
+                          <a:pt x="2159633" y="0"/>
+                        </a:cubicBezTo>
+                        <a:cubicBezTo>
+                          <a:pt x="2278552" y="-21042"/>
+                          <a:pt x="2636915" y="57109"/>
+                          <a:pt x="2824136" y="0"/>
+                        </a:cubicBezTo>
+                        <a:cubicBezTo>
+                          <a:pt x="3011357" y="-57109"/>
+                          <a:pt x="3063754" y="28820"/>
+                          <a:pt x="3267137" y="0"/>
+                        </a:cubicBezTo>
+                        <a:cubicBezTo>
+                          <a:pt x="3470520" y="-28820"/>
+                          <a:pt x="3614470" y="47788"/>
+                          <a:pt x="3710139" y="0"/>
+                        </a:cubicBezTo>
+                        <a:cubicBezTo>
+                          <a:pt x="3805808" y="-47788"/>
+                          <a:pt x="4079716" y="20381"/>
+                          <a:pt x="4374642" y="0"/>
+                        </a:cubicBezTo>
+                        <a:cubicBezTo>
+                          <a:pt x="4669568" y="-20381"/>
+                          <a:pt x="4628877" y="36664"/>
+                          <a:pt x="4817643" y="0"/>
+                        </a:cubicBezTo>
+                        <a:cubicBezTo>
+                          <a:pt x="5006409" y="-36664"/>
+                          <a:pt x="5197651" y="3141"/>
+                          <a:pt x="5537521" y="0"/>
+                        </a:cubicBezTo>
+                        <a:cubicBezTo>
+                          <a:pt x="5583956" y="225695"/>
+                          <a:pt x="5497828" y="309585"/>
+                          <a:pt x="5537521" y="464743"/>
+                        </a:cubicBezTo>
+                        <a:cubicBezTo>
+                          <a:pt x="5577214" y="619901"/>
+                          <a:pt x="5526941" y="725297"/>
+                          <a:pt x="5537521" y="891659"/>
+                        </a:cubicBezTo>
+                        <a:cubicBezTo>
+                          <a:pt x="5548101" y="1058021"/>
+                          <a:pt x="5466577" y="1298192"/>
+                          <a:pt x="5537521" y="1507714"/>
+                        </a:cubicBezTo>
+                        <a:cubicBezTo>
+                          <a:pt x="5608465" y="1717236"/>
+                          <a:pt x="5479531" y="1802918"/>
+                          <a:pt x="5537521" y="2010285"/>
+                        </a:cubicBezTo>
+                        <a:cubicBezTo>
+                          <a:pt x="5595511" y="2217652"/>
+                          <a:pt x="5513877" y="2315584"/>
+                          <a:pt x="5537521" y="2588513"/>
+                        </a:cubicBezTo>
+                        <a:cubicBezTo>
+                          <a:pt x="5561165" y="2861442"/>
+                          <a:pt x="5499214" y="2929093"/>
+                          <a:pt x="5537521" y="3015428"/>
+                        </a:cubicBezTo>
+                        <a:cubicBezTo>
+                          <a:pt x="5575828" y="3101763"/>
+                          <a:pt x="5491964" y="3493620"/>
+                          <a:pt x="5537521" y="3782795"/>
+                        </a:cubicBezTo>
+                        <a:cubicBezTo>
+                          <a:pt x="5384976" y="3814078"/>
+                          <a:pt x="5213055" y="3779760"/>
+                          <a:pt x="5039144" y="3782795"/>
+                        </a:cubicBezTo>
+                        <a:cubicBezTo>
+                          <a:pt x="4865233" y="3785830"/>
+                          <a:pt x="4659693" y="3738444"/>
+                          <a:pt x="4540767" y="3782795"/>
+                        </a:cubicBezTo>
+                        <a:cubicBezTo>
+                          <a:pt x="4421841" y="3827146"/>
+                          <a:pt x="4192215" y="3748566"/>
+                          <a:pt x="3987015" y="3782795"/>
+                        </a:cubicBezTo>
+                        <a:cubicBezTo>
+                          <a:pt x="3781815" y="3817024"/>
+                          <a:pt x="3593595" y="3739907"/>
+                          <a:pt x="3433263" y="3782795"/>
+                        </a:cubicBezTo>
+                        <a:cubicBezTo>
+                          <a:pt x="3272931" y="3825683"/>
+                          <a:pt x="3047208" y="3737830"/>
+                          <a:pt x="2824136" y="3782795"/>
+                        </a:cubicBezTo>
+                        <a:cubicBezTo>
+                          <a:pt x="2601064" y="3827760"/>
+                          <a:pt x="2464965" y="3728415"/>
+                          <a:pt x="2325759" y="3782795"/>
+                        </a:cubicBezTo>
+                        <a:cubicBezTo>
+                          <a:pt x="2186553" y="3837175"/>
+                          <a:pt x="1958458" y="3718564"/>
+                          <a:pt x="1661256" y="3782795"/>
+                        </a:cubicBezTo>
+                        <a:cubicBezTo>
+                          <a:pt x="1364054" y="3847026"/>
+                          <a:pt x="1302530" y="3768590"/>
+                          <a:pt x="996754" y="3782795"/>
+                        </a:cubicBezTo>
+                        <a:cubicBezTo>
+                          <a:pt x="690978" y="3797000"/>
+                          <a:pt x="289601" y="3715445"/>
+                          <a:pt x="0" y="3782795"/>
+                        </a:cubicBezTo>
+                        <a:cubicBezTo>
+                          <a:pt x="-42167" y="3647722"/>
+                          <a:pt x="29292" y="3560887"/>
+                          <a:pt x="0" y="3355880"/>
+                        </a:cubicBezTo>
+                        <a:cubicBezTo>
+                          <a:pt x="-29292" y="3150874"/>
+                          <a:pt x="10390" y="3086157"/>
+                          <a:pt x="0" y="2928964"/>
+                        </a:cubicBezTo>
+                        <a:cubicBezTo>
+                          <a:pt x="-10390" y="2771771"/>
+                          <a:pt x="35922" y="2508070"/>
+                          <a:pt x="0" y="2388565"/>
+                        </a:cubicBezTo>
+                        <a:cubicBezTo>
+                          <a:pt x="-35922" y="2269060"/>
+                          <a:pt x="57274" y="2077951"/>
+                          <a:pt x="0" y="1848166"/>
+                        </a:cubicBezTo>
+                        <a:cubicBezTo>
+                          <a:pt x="-57274" y="1618381"/>
+                          <a:pt x="3430" y="1479788"/>
+                          <a:pt x="0" y="1383422"/>
+                        </a:cubicBezTo>
+                        <a:cubicBezTo>
+                          <a:pt x="-3430" y="1287056"/>
+                          <a:pt x="38666" y="1067175"/>
+                          <a:pt x="0" y="880851"/>
+                        </a:cubicBezTo>
+                        <a:cubicBezTo>
+                          <a:pt x="-38666" y="694527"/>
+                          <a:pt x="70088" y="220930"/>
+                          <a:pt x="0" y="0"/>
+                        </a:cubicBezTo>
+                        <a:close/>
+                      </a:path>
+                    </a:pathLst>
+                  </a:custGeom>
+                  <ask:type>
+                    <ask:lineSketchNone/>
+                  </ask:type>
+                </ask:lineSketchStyleProps>
+              </a:ext>
+            </a:extLst>
+          </a:ln>
         </p:spPr>
       </p:pic>
       <p:pic>
@@ -13576,9 +13824,15 @@
         </p:blipFill>
         <p:spPr>
           <a:xfrm>
-            <a:off x="6419913" y="2648197"/>
-            <a:ext cx="4863783" cy="3524003"/>
+            <a:off x="6419913" y="2389405"/>
+            <a:ext cx="5208839" cy="3782795"/>
           </a:xfrm>
+          <a:ln w="28575">
+            <a:solidFill>
+              <a:schemeClr val="accent1"/>
+            </a:solidFill>
+            <a:prstDash val="sysDot"/>
+          </a:ln>
         </p:spPr>
       </p:pic>
     </p:spTree>
@@ -14235,8 +14489,8 @@
         </p:nvSpPr>
         <p:spPr>
           <a:xfrm>
-            <a:off x="477981" y="1122363"/>
-            <a:ext cx="4023360" cy="3204134"/>
+            <a:off x="477981" y="2818891"/>
+            <a:ext cx="3692681" cy="1507606"/>
           </a:xfrm>
         </p:spPr>
         <p:txBody>
@@ -14246,8 +14500,31 @@
           <a:lstStyle/>
           <a:p>
             <a:r>
-              <a:rPr lang="en-US" sz="4800"/>
-              <a:t>Esecuzione dei task</a:t>
+              <a:rPr lang="en-US" sz="4400" dirty="0" err="1"/>
+              <a:t>Esecuzione</a:t>
+            </a:r>
+            <a:r>
+              <a:rPr lang="en-US" sz="4400" dirty="0"/>
+              <a:t> </a:t>
+            </a:r>
+            <a:br>
+              <a:rPr lang="en-US" sz="4400" dirty="0"/>
+            </a:br>
+            <a:r>
+              <a:rPr lang="en-US" sz="4400" dirty="0" err="1"/>
+              <a:t>dei</a:t>
+            </a:r>
+            <a:r>
+              <a:rPr lang="en-US" sz="4400" dirty="0"/>
+              <a:t> </a:t>
+            </a:r>
+            <a:r>
+              <a:rPr lang="en-US" sz="4400" b="1" dirty="0">
+                <a:solidFill>
+                  <a:schemeClr val="accent1"/>
+                </a:solidFill>
+              </a:rPr>
+              <a:t>task</a:t>
             </a:r>
           </a:p>
         </p:txBody>
@@ -14469,6 +14746,12 @@
           <a:prstGeom prst="rect">
             <a:avLst/>
           </a:prstGeom>
+          <a:ln w="28575">
+            <a:solidFill>
+              <a:schemeClr val="accent1"/>
+            </a:solidFill>
+            <a:prstDash val="sysDot"/>
+          </a:ln>
         </p:spPr>
       </p:pic>
       <p:sp>
@@ -14720,9 +15003,30 @@
           <a:lstStyle/>
           <a:p>
             <a:r>
-              <a:rPr lang="en-US" sz="5200"/>
-              <a:t>Correlazioni tra le variabili</a:t>
-            </a:r>
+              <a:rPr lang="en-US" sz="4400" b="1" err="1">
+                <a:solidFill>
+                  <a:schemeClr val="accent1"/>
+                </a:solidFill>
+              </a:rPr>
+              <a:t>Correlazioni</a:t>
+            </a:r>
+            <a:r>
+              <a:rPr lang="en-US" sz="4400" dirty="0"/>
+              <a:t> </a:t>
+            </a:r>
+            <a:r>
+              <a:rPr lang="en-US" sz="4400" err="1"/>
+              <a:t>tra</a:t>
+            </a:r>
+            <a:r>
+              <a:rPr lang="en-US" sz="4400" dirty="0"/>
+              <a:t> le </a:t>
+            </a:r>
+            <a:r>
+              <a:rPr lang="en-US" sz="4400" err="1"/>
+              <a:t>variabili</a:t>
+            </a:r>
+            <a:endParaRPr lang="en-US" sz="4400"/>
           </a:p>
         </p:txBody>
       </p:sp>
@@ -15199,13 +15503,25 @@
             <p:ph type="body" idx="1"/>
           </p:nvPr>
         </p:nvSpPr>
-        <p:spPr/>
+        <p:spPr>
+          <a:xfrm>
+            <a:off x="1115568" y="2602687"/>
+            <a:ext cx="4937760" cy="593875"/>
+          </a:xfrm>
+        </p:spPr>
         <p:txBody>
-          <a:bodyPr/>
+          <a:bodyPr>
+            <a:normAutofit/>
+          </a:bodyPr>
           <a:lstStyle/>
           <a:p>
-            <a:r>
-              <a:rPr lang="it-IT" dirty="0"/>
+            <a:pPr algn="ctr"/>
+            <a:r>
+              <a:rPr lang="it-IT" sz="2800" dirty="0">
+                <a:solidFill>
+                  <a:schemeClr val="accent1"/>
+                </a:solidFill>
+              </a:rPr>
               <a:t>Conclusioni</a:t>
             </a:r>
           </a:p>
@@ -15263,13 +15579,25 @@
             <p:ph type="body" sz="quarter" idx="3"/>
           </p:nvPr>
         </p:nvSpPr>
-        <p:spPr/>
+        <p:spPr>
+          <a:xfrm>
+            <a:off x="6360313" y="2602688"/>
+            <a:ext cx="4923383" cy="593874"/>
+          </a:xfrm>
+        </p:spPr>
         <p:txBody>
-          <a:bodyPr/>
+          <a:bodyPr>
+            <a:normAutofit/>
+          </a:bodyPr>
           <a:lstStyle/>
           <a:p>
-            <a:r>
-              <a:rPr lang="it-IT" dirty="0"/>
+            <a:pPr algn="ctr"/>
+            <a:r>
+              <a:rPr lang="it-IT" sz="2800" dirty="0">
+                <a:solidFill>
+                  <a:schemeClr val="accent1"/>
+                </a:solidFill>
+              </a:rPr>
               <a:t>Sviluppi futuri</a:t>
             </a:r>
           </a:p>
@@ -16185,13 +16513,29 @@
           <a:p>
             <a:r>
               <a:rPr lang="it-IT" dirty="0"/>
-              <a:t>Circa 3Gb</a:t>
+              <a:t>Circa </a:t>
+            </a:r>
+            <a:r>
+              <a:rPr lang="it-IT" b="1" dirty="0">
+                <a:solidFill>
+                  <a:schemeClr val="accent1"/>
+                </a:solidFill>
+              </a:rPr>
+              <a:t>3Gb</a:t>
             </a:r>
           </a:p>
           <a:p>
             <a:r>
               <a:rPr lang="it-IT" dirty="0"/>
-              <a:t>Formato JSON</a:t>
+              <a:t>Formato </a:t>
+            </a:r>
+            <a:r>
+              <a:rPr lang="it-IT" b="1" dirty="0">
+                <a:solidFill>
+                  <a:schemeClr val="accent1"/>
+                </a:solidFill>
+              </a:rPr>
+              <a:t>JSON</a:t>
             </a:r>
           </a:p>
         </p:txBody>
@@ -16261,13 +16605,29 @@
           <a:p>
             <a:r>
               <a:rPr lang="it-IT" dirty="0"/>
-              <a:t>Circa 10Mb</a:t>
+              <a:t>Circa </a:t>
+            </a:r>
+            <a:r>
+              <a:rPr lang="it-IT" b="1" dirty="0">
+                <a:solidFill>
+                  <a:schemeClr val="accent1"/>
+                </a:solidFill>
+              </a:rPr>
+              <a:t>10Mb</a:t>
             </a:r>
           </a:p>
           <a:p>
             <a:r>
               <a:rPr lang="it-IT" dirty="0"/>
-              <a:t>Formato CSV</a:t>
+              <a:t>Formato </a:t>
+            </a:r>
+            <a:r>
+              <a:rPr lang="it-IT" b="1" dirty="0">
+                <a:solidFill>
+                  <a:schemeClr val="accent1"/>
+                </a:solidFill>
+              </a:rPr>
+              <a:t>CSV</a:t>
             </a:r>
           </a:p>
         </p:txBody>
@@ -16728,13 +17088,37 @@
           <a:p>
             <a:r>
               <a:rPr lang="it-IT" sz="2000" dirty="0"/>
-              <a:t>Utilizzo di Kafka non necessario, ma importante nel caso di aggiunta di un secondo topic o di un’analisi real-time.</a:t>
-            </a:r>
-          </a:p>
-          <a:p>
+              <a:t>Utilizzo di </a:t>
+            </a:r>
+            <a:r>
+              <a:rPr lang="it-IT" sz="2000" b="1" dirty="0">
+                <a:solidFill>
+                  <a:schemeClr val="accent1"/>
+                </a:solidFill>
+              </a:rPr>
+              <a:t>Kafka</a:t>
+            </a:r>
             <a:r>
               <a:rPr lang="it-IT" sz="2000" dirty="0"/>
-              <a:t>Dati salvati sia su MongoDB che in JSON localmente.</a:t>
+              <a:t> non necessario, ma importante nel caso di aggiunta di un secondo topic o di un’analisi real-time.</a:t>
+            </a:r>
+          </a:p>
+          <a:p>
+            <a:r>
+              <a:rPr lang="it-IT" sz="2000" dirty="0"/>
+              <a:t>Dati salvati sia su </a:t>
+            </a:r>
+            <a:r>
+              <a:rPr lang="it-IT" sz="2000" b="1" dirty="0">
+                <a:solidFill>
+                  <a:schemeClr val="accent1"/>
+                </a:solidFill>
+              </a:rPr>
+              <a:t>MongoDB</a:t>
+            </a:r>
+            <a:r>
+              <a:rPr lang="it-IT" sz="2000" dirty="0"/>
+              <a:t> che in JSON localmente.</a:t>
             </a:r>
           </a:p>
         </p:txBody>
@@ -17327,7 +17711,11 @@
           </a:p>
           <a:p>
             <a:r>
-              <a:rPr lang="it-IT" sz="2000" b="1" i="1" dirty="0"/>
+              <a:rPr lang="it-IT" sz="2000" b="1" i="1" dirty="0">
+                <a:solidFill>
+                  <a:srgbClr val="000000"/>
+                </a:solidFill>
+              </a:rPr>
               <a:t>Efficienza</a:t>
             </a:r>
             <a:r>
@@ -17463,12 +17851,19 @@
             <a:pPr algn="l"/>
             <a:r>
               <a:rPr lang="it-IT" sz="4400" b="1" dirty="0">
+                <a:solidFill>
+                  <a:schemeClr val="accent1"/>
+                </a:solidFill>
                 <a:ea typeface="+mn-lt"/>
                 <a:cs typeface="+mn-lt"/>
               </a:rPr>
               <a:t>Sharding</a:t>
             </a:r>
-            <a:endParaRPr lang="it-IT" sz="4400" dirty="0"/>
+            <a:endParaRPr lang="it-IT" sz="4400" dirty="0">
+              <a:solidFill>
+                <a:schemeClr val="accent1"/>
+              </a:solidFill>
+            </a:endParaRPr>
           </a:p>
         </p:txBody>
       </p:sp>
@@ -17562,40 +17957,60 @@
         </p:nvSpPr>
         <p:spPr/>
         <p:txBody>
-          <a:bodyPr/>
+          <a:bodyPr vert="horz" lIns="91440" tIns="45720" rIns="91440" bIns="45720" rtlCol="0" anchor="t">
+            <a:normAutofit/>
+          </a:bodyPr>
           <a:lstStyle/>
           <a:p>
             <a:r>
               <a:rPr lang="it-IT" dirty="0"/>
-              <a:t>Dati estratti da OurWorldInData</a:t>
+              <a:t>Dati estratti da </a:t>
+            </a:r>
+            <a:r>
+              <a:rPr lang="it-IT" b="1" dirty="0">
+                <a:solidFill>
+                  <a:schemeClr val="accent1"/>
+                </a:solidFill>
+              </a:rPr>
+              <a:t>OurWorldInData</a:t>
             </a:r>
           </a:p>
           <a:p>
             <a:r>
               <a:rPr lang="it-IT" dirty="0"/>
-              <a:t>Estratte solo le </a:t>
-            </a:r>
-            <a:r>
-              <a:rPr lang="it-IT" dirty="0" err="1"/>
-              <a:t>feature</a:t>
-            </a:r>
+              <a:t>Estrazione solo delle feature di interesse.</a:t>
+            </a:r>
+          </a:p>
+          <a:p>
             <a:r>
               <a:rPr lang="it-IT" dirty="0"/>
-              <a:t> di interesse.</a:t>
-            </a:r>
-          </a:p>
-          <a:p>
-            <a:r>
-              <a:rPr lang="it-IT" dirty="0"/>
-              <a:t>Pulizia dei </a:t>
-            </a:r>
-            <a:r>
-              <a:rPr lang="it-IT" dirty="0" err="1"/>
-              <a:t>NaN</a:t>
+              <a:t>Operazioni di </a:t>
+            </a:r>
+            <a:r>
+              <a:rPr lang="it-IT" b="1" dirty="0" err="1">
+                <a:solidFill>
+                  <a:schemeClr val="accent1"/>
+                </a:solidFill>
+              </a:rPr>
+              <a:t>pre</a:t>
+            </a:r>
+            <a:r>
+              <a:rPr lang="it-IT" b="1" dirty="0">
+                <a:solidFill>
+                  <a:schemeClr val="accent1"/>
+                </a:solidFill>
+              </a:rPr>
+              <a:t>-processing</a:t>
             </a:r>
             <a:r>
               <a:rPr lang="it-IT" dirty="0"/>
               <a:t>.</a:t>
+            </a:r>
+          </a:p>
+          <a:p>
+            <a:r>
+              <a:rPr lang="it-IT" dirty="0"/>
+              <a:t>Selezione del periodo e dei paesi considerati nella nostra analisi</a:t>
             </a:r>
           </a:p>
         </p:txBody>
@@ -18350,7 +18765,7 @@
           </a:prstGeom>
         </p:spPr>
         <p:txBody>
-          <a:bodyPr rot="0" spcFirstLastPara="0" vertOverflow="overflow" horzOverflow="overflow" vert="horz" lIns="91440" tIns="45720" rIns="91440" bIns="45720" numCol="1" spcCol="0" rtlCol="0" fromWordArt="0" anchorCtr="0" forceAA="0" compatLnSpc="1">
+          <a:bodyPr rot="0" spcFirstLastPara="0" vertOverflow="overflow" horzOverflow="overflow" vert="horz" lIns="91440" tIns="45720" rIns="91440" bIns="45720" numCol="1" spcCol="0" rtlCol="0" fromWordArt="0" anchor="t" anchorCtr="0" forceAA="0" compatLnSpc="1">
             <a:prstTxWarp prst="textNoShape">
               <a:avLst/>
             </a:prstTxWarp>
@@ -18366,7 +18781,15 @@
               <a:buChar char="•"/>
             </a:pPr>
             <a:r>
-              <a:rPr lang="it-IT" sz="3600" b="1"/>
+              <a:rPr lang="it-IT" sz="3600" b="1" dirty="0">
+                <a:solidFill>
+                  <a:schemeClr val="accent1"/>
+                </a:solidFill>
+              </a:rPr>
+              <a:t> </a:t>
+            </a:r>
+            <a:r>
+              <a:rPr lang="it-IT" sz="3600" b="1" dirty="0"/>
               <a:t>Temporale</a:t>
             </a:r>
           </a:p>
@@ -18492,7 +18915,7 @@
           </a:bodyPr>
           <a:lstStyle/>
           <a:p>
-            <a:pPr marL="285750" indent="-285750" algn="l">
+            <a:pPr marL="285750" indent="-285750">
               <a:spcAft>
                 <a:spcPts val="600"/>
               </a:spcAft>
@@ -18500,10 +18923,17 @@
               <a:buChar char="•"/>
             </a:pPr>
             <a:r>
+              <a:rPr lang="it-IT" sz="3600" b="1" dirty="0">
+                <a:solidFill>
+                  <a:schemeClr val="accent1"/>
+                </a:solidFill>
+              </a:rPr>
+              <a:t> </a:t>
+            </a:r>
+            <a:r>
               <a:rPr lang="it-IT" sz="3600" b="1" dirty="0"/>
               <a:t>Spaziale</a:t>
             </a:r>
-            <a:endParaRPr lang="it-IT" sz="3600" b="1"/>
           </a:p>
         </p:txBody>
       </p:sp>
@@ -19239,9 +19669,18 @@
               <a:t>Attenzione al </a:t>
             </a:r>
             <a:r>
-              <a:rPr lang="it-IT" sz="2000" b="1" dirty="0"/>
-              <a:t>CLICKBAIT</a:t>
-            </a:r>
+              <a:rPr lang="it-IT" sz="2000" b="1" err="1">
+                <a:solidFill>
+                  <a:schemeClr val="accent1"/>
+                </a:solidFill>
+              </a:rPr>
+              <a:t>Clickbait</a:t>
+            </a:r>
+            <a:endParaRPr lang="it-IT" sz="2000" b="1">
+              <a:solidFill>
+                <a:schemeClr val="accent1"/>
+              </a:solidFill>
+            </a:endParaRPr>
           </a:p>
           <a:p>
             <a:pPr marL="285750" indent="-285750">
@@ -19269,8 +19708,16 @@
               <a:t>Campi </a:t>
             </a:r>
             <a:r>
-              <a:rPr lang="it-IT" sz="2000" i="1" dirty="0"/>
-              <a:t>Booleani </a:t>
+              <a:rPr lang="it-IT" sz="2000" b="1" dirty="0">
+                <a:solidFill>
+                  <a:schemeClr val="accent1"/>
+                </a:solidFill>
+              </a:rPr>
+              <a:t>Booleani</a:t>
+            </a:r>
+            <a:r>
+              <a:rPr lang="it-IT" sz="2000" b="1" dirty="0"/>
+              <a:t> </a:t>
             </a:r>
             <a:r>
               <a:rPr lang="it-IT" sz="2000" b="1" i="1" dirty="0"/>
@@ -19308,7 +19755,7 @@
             <p:ph idx="1"/>
             <p:extLst>
               <p:ext uri="{D42A27DB-BD31-4B8C-83A1-F6EECF244321}">
-                <p14:modId xmlns:p14="http://schemas.microsoft.com/office/powerpoint/2010/main" val="4089542421"/>
+                <p14:modId xmlns:p14="http://schemas.microsoft.com/office/powerpoint/2010/main" val="3443215816"/>
               </p:ext>
             </p:extLst>
           </p:nvPr>
@@ -19767,7 +20214,7 @@
             <p:ph idx="1"/>
             <p:extLst>
               <p:ext uri="{D42A27DB-BD31-4B8C-83A1-F6EECF244321}">
-                <p14:modId xmlns:p14="http://schemas.microsoft.com/office/powerpoint/2010/main" val="2830015245"/>
+                <p14:modId xmlns:p14="http://schemas.microsoft.com/office/powerpoint/2010/main" val="3824122216"/>
               </p:ext>
             </p:extLst>
           </p:nvPr>

</xml_diff>